<commit_message>
updated ER and schema
</commit_message>
<xml_diff>
--- a/ERdiagram.pptx
+++ b/ERdiagram.pptx
@@ -3615,7 +3615,7 @@
         <p:spPr>
           <a:xfrm>
             <a:off x="1301221" y="1901308"/>
-            <a:ext cx="1102766" cy="870503"/>
+            <a:ext cx="1086270" cy="1438894"/>
           </a:xfrm>
           <a:prstGeom prst="bentConnector3">
             <a:avLst/>
@@ -4196,8 +4196,8 @@
         </p:nvCxnSpPr>
         <p:spPr>
           <a:xfrm>
-            <a:off x="4049733" y="2771811"/>
-            <a:ext cx="653925" cy="809329"/>
+            <a:off x="4033237" y="3340202"/>
+            <a:ext cx="670421" cy="240938"/>
           </a:xfrm>
           <a:prstGeom prst="bentConnector3">
             <a:avLst/>
@@ -4530,7 +4530,7 @@
         </p:nvSpPr>
         <p:spPr>
           <a:xfrm>
-            <a:off x="2068018" y="2443755"/>
+            <a:off x="2063853" y="3047811"/>
             <a:ext cx="369012" cy="369332"/>
           </a:xfrm>
           <a:prstGeom prst="rect">
@@ -6990,7 +6990,7 @@
         </p:nvSpPr>
         <p:spPr>
           <a:xfrm>
-            <a:off x="2403987" y="2452238"/>
+            <a:off x="2387491" y="3020629"/>
             <a:ext cx="1645746" cy="639145"/>
           </a:xfrm>
           <a:prstGeom prst="flowChartDecision">
@@ -8384,8 +8384,8 @@
         </p:nvSpPr>
         <p:spPr>
           <a:xfrm>
-            <a:off x="3220406" y="3256057"/>
-            <a:ext cx="760452" cy="396775"/>
+            <a:off x="3322244" y="2350265"/>
+            <a:ext cx="1158328" cy="396775"/>
           </a:xfrm>
           <a:prstGeom prst="ellipse">
             <a:avLst/>
@@ -8424,12 +8424,12 @@
           <a:p>
             <a:pPr algn="ctr"/>
             <a:r>
-              <a:rPr lang="en-US" sz="1400" dirty="0" smtClean="0">
+              <a:rPr lang="en-US" sz="1400" dirty="0" err="1" smtClean="0">
                 <a:solidFill>
                   <a:schemeClr val="tx1"/>
                 </a:solidFill>
               </a:rPr>
-              <a:t>year</a:t>
+              <a:t>enddate</a:t>
             </a:r>
             <a:endParaRPr lang="en-US" sz="1400" dirty="0">
               <a:solidFill>
@@ -8481,15 +8481,15 @@
         <p:nvCxnSpPr>
           <p:cNvPr id="24" name="Straight Connector 23"/>
           <p:cNvCxnSpPr>
-            <a:stCxn id="107" idx="2"/>
-            <a:endCxn id="138" idx="1"/>
+            <a:stCxn id="107" idx="0"/>
+            <a:endCxn id="138" idx="3"/>
           </p:cNvCxnSpPr>
           <p:nvPr/>
         </p:nvCxnSpPr>
         <p:spPr>
-          <a:xfrm>
-            <a:off x="3226860" y="3091383"/>
-            <a:ext cx="104912" cy="222780"/>
+          <a:xfrm flipV="1">
+            <a:off x="3210364" y="2688934"/>
+            <a:ext cx="281513" cy="331695"/>
           </a:xfrm>
           <a:prstGeom prst="line">
             <a:avLst/>
@@ -8523,7 +8523,7 @@
         </p:nvSpPr>
         <p:spPr>
           <a:xfrm>
-            <a:off x="4100331" y="2397100"/>
+            <a:off x="4009360" y="3018742"/>
             <a:ext cx="288709" cy="369332"/>
           </a:xfrm>
           <a:prstGeom prst="rect">
@@ -8657,7 +8657,7 @@
         </p:nvSpPr>
         <p:spPr>
           <a:xfrm>
-            <a:off x="814950" y="644662"/>
+            <a:off x="933028" y="568627"/>
             <a:ext cx="921388" cy="386142"/>
           </a:xfrm>
           <a:prstGeom prst="ellipse">
@@ -8895,8 +8895,8 @@
         </p:nvCxnSpPr>
         <p:spPr>
           <a:xfrm flipH="1">
-            <a:off x="761354" y="974255"/>
-            <a:ext cx="188530" cy="514241"/>
+            <a:off x="761354" y="898220"/>
+            <a:ext cx="306608" cy="590276"/>
           </a:xfrm>
           <a:prstGeom prst="line">
             <a:avLst/>
@@ -9036,6 +9036,107 @@
           <a:xfrm flipH="1">
             <a:off x="5068321" y="1578814"/>
             <a:ext cx="354806" cy="206141"/>
+          </a:xfrm>
+          <a:prstGeom prst="line">
+            <a:avLst/>
+          </a:prstGeom>
+          <a:ln>
+            <a:solidFill>
+              <a:schemeClr val="tx1"/>
+            </a:solidFill>
+          </a:ln>
+        </p:spPr>
+        <p:style>
+          <a:lnRef idx="1">
+            <a:schemeClr val="accent1"/>
+          </a:lnRef>
+          <a:fillRef idx="0">
+            <a:schemeClr val="accent1"/>
+          </a:fillRef>
+          <a:effectRef idx="0">
+            <a:schemeClr val="accent1"/>
+          </a:effectRef>
+          <a:fontRef idx="minor">
+            <a:schemeClr val="tx1"/>
+          </a:fontRef>
+        </p:style>
+      </p:cxnSp>
+      <p:sp>
+        <p:nvSpPr>
+          <p:cNvPr id="131" name="Oval 130"/>
+          <p:cNvSpPr/>
+          <p:nvPr/>
+        </p:nvSpPr>
+        <p:spPr>
+          <a:xfrm>
+            <a:off x="1923798" y="2383282"/>
+            <a:ext cx="1268587" cy="396775"/>
+          </a:xfrm>
+          <a:prstGeom prst="ellipse">
+            <a:avLst/>
+          </a:prstGeom>
+          <a:solidFill>
+            <a:schemeClr val="accent1">
+              <a:lumMod val="40000"/>
+              <a:lumOff val="60000"/>
+            </a:schemeClr>
+          </a:solidFill>
+          <a:ln>
+            <a:solidFill>
+              <a:schemeClr val="tx1"/>
+            </a:solidFill>
+          </a:ln>
+        </p:spPr>
+        <p:style>
+          <a:lnRef idx="2">
+            <a:schemeClr val="accent1">
+              <a:shade val="50000"/>
+            </a:schemeClr>
+          </a:lnRef>
+          <a:fillRef idx="1">
+            <a:schemeClr val="accent1"/>
+          </a:fillRef>
+          <a:effectRef idx="0">
+            <a:schemeClr val="accent1"/>
+          </a:effectRef>
+          <a:fontRef idx="minor">
+            <a:schemeClr val="lt1"/>
+          </a:fontRef>
+        </p:style>
+        <p:txBody>
+          <a:bodyPr rtlCol="0" anchor="ctr"/>
+          <a:lstStyle/>
+          <a:p>
+            <a:pPr algn="ctr"/>
+            <a:r>
+              <a:rPr lang="en-US" sz="1400" dirty="0" err="1" smtClean="0">
+                <a:solidFill>
+                  <a:schemeClr val="tx1"/>
+                </a:solidFill>
+              </a:rPr>
+              <a:t>startdate</a:t>
+            </a:r>
+            <a:endParaRPr lang="en-US" sz="1400" dirty="0">
+              <a:solidFill>
+                <a:schemeClr val="tx1"/>
+              </a:solidFill>
+            </a:endParaRPr>
+          </a:p>
+        </p:txBody>
+      </p:sp>
+      <p:cxnSp>
+        <p:nvCxnSpPr>
+          <p:cNvPr id="25" name="Straight Connector 24"/>
+          <p:cNvCxnSpPr>
+            <a:stCxn id="131" idx="5"/>
+            <a:endCxn id="107" idx="0"/>
+          </p:cNvCxnSpPr>
+          <p:nvPr/>
+        </p:nvCxnSpPr>
+        <p:spPr>
+          <a:xfrm>
+            <a:off x="3006605" y="2721951"/>
+            <a:ext cx="203759" cy="298678"/>
           </a:xfrm>
           <a:prstGeom prst="line">
             <a:avLst/>

</xml_diff>

<commit_message>
updated ER diagram to new spec
</commit_message>
<xml_diff>
--- a/ERdiagram.pptx
+++ b/ERdiagram.pptx
@@ -198,7 +198,7 @@
           <a:p>
             <a:fld id="{CE1FD266-E70F-468C-B73B-9637A32255C0}" type="datetimeFigureOut">
               <a:rPr lang="en-US" smtClean="0"/>
-              <a:t>4/23/2015</a:t>
+              <a:t>4/30/2015</a:t>
             </a:fld>
             <a:endParaRPr lang="en-US"/>
           </a:p>
@@ -765,7 +765,7 @@
           <a:p>
             <a:fld id="{3B86C474-5A3B-4572-83DF-E10892B0A5A0}" type="datetimeFigureOut">
               <a:rPr lang="en-US" smtClean="0"/>
-              <a:t>4/23/2015</a:t>
+              <a:t>4/30/2015</a:t>
             </a:fld>
             <a:endParaRPr lang="en-US"/>
           </a:p>
@@ -935,7 +935,7 @@
           <a:p>
             <a:fld id="{3B86C474-5A3B-4572-83DF-E10892B0A5A0}" type="datetimeFigureOut">
               <a:rPr lang="en-US" smtClean="0"/>
-              <a:t>4/23/2015</a:t>
+              <a:t>4/30/2015</a:t>
             </a:fld>
             <a:endParaRPr lang="en-US"/>
           </a:p>
@@ -1115,7 +1115,7 @@
           <a:p>
             <a:fld id="{3B86C474-5A3B-4572-83DF-E10892B0A5A0}" type="datetimeFigureOut">
               <a:rPr lang="en-US" smtClean="0"/>
-              <a:t>4/23/2015</a:t>
+              <a:t>4/30/2015</a:t>
             </a:fld>
             <a:endParaRPr lang="en-US"/>
           </a:p>
@@ -1285,7 +1285,7 @@
           <a:p>
             <a:fld id="{3B86C474-5A3B-4572-83DF-E10892B0A5A0}" type="datetimeFigureOut">
               <a:rPr lang="en-US" smtClean="0"/>
-              <a:t>4/23/2015</a:t>
+              <a:t>4/30/2015</a:t>
             </a:fld>
             <a:endParaRPr lang="en-US"/>
           </a:p>
@@ -1531,7 +1531,7 @@
           <a:p>
             <a:fld id="{3B86C474-5A3B-4572-83DF-E10892B0A5A0}" type="datetimeFigureOut">
               <a:rPr lang="en-US" smtClean="0"/>
-              <a:t>4/23/2015</a:t>
+              <a:t>4/30/2015</a:t>
             </a:fld>
             <a:endParaRPr lang="en-US"/>
           </a:p>
@@ -1763,7 +1763,7 @@
           <a:p>
             <a:fld id="{3B86C474-5A3B-4572-83DF-E10892B0A5A0}" type="datetimeFigureOut">
               <a:rPr lang="en-US" smtClean="0"/>
-              <a:t>4/23/2015</a:t>
+              <a:t>4/30/2015</a:t>
             </a:fld>
             <a:endParaRPr lang="en-US"/>
           </a:p>
@@ -2130,7 +2130,7 @@
           <a:p>
             <a:fld id="{3B86C474-5A3B-4572-83DF-E10892B0A5A0}" type="datetimeFigureOut">
               <a:rPr lang="en-US" smtClean="0"/>
-              <a:t>4/23/2015</a:t>
+              <a:t>4/30/2015</a:t>
             </a:fld>
             <a:endParaRPr lang="en-US"/>
           </a:p>
@@ -2248,7 +2248,7 @@
           <a:p>
             <a:fld id="{3B86C474-5A3B-4572-83DF-E10892B0A5A0}" type="datetimeFigureOut">
               <a:rPr lang="en-US" smtClean="0"/>
-              <a:t>4/23/2015</a:t>
+              <a:t>4/30/2015</a:t>
             </a:fld>
             <a:endParaRPr lang="en-US"/>
           </a:p>
@@ -2343,7 +2343,7 @@
           <a:p>
             <a:fld id="{3B86C474-5A3B-4572-83DF-E10892B0A5A0}" type="datetimeFigureOut">
               <a:rPr lang="en-US" smtClean="0"/>
-              <a:t>4/23/2015</a:t>
+              <a:t>4/30/2015</a:t>
             </a:fld>
             <a:endParaRPr lang="en-US"/>
           </a:p>
@@ -2620,7 +2620,7 @@
           <a:p>
             <a:fld id="{3B86C474-5A3B-4572-83DF-E10892B0A5A0}" type="datetimeFigureOut">
               <a:rPr lang="en-US" smtClean="0"/>
-              <a:t>4/23/2015</a:t>
+              <a:t>4/30/2015</a:t>
             </a:fld>
             <a:endParaRPr lang="en-US"/>
           </a:p>
@@ -2873,7 +2873,7 @@
           <a:p>
             <a:fld id="{3B86C474-5A3B-4572-83DF-E10892B0A5A0}" type="datetimeFigureOut">
               <a:rPr lang="en-US" smtClean="0"/>
-              <a:t>4/23/2015</a:t>
+              <a:t>4/30/2015</a:t>
             </a:fld>
             <a:endParaRPr lang="en-US"/>
           </a:p>
@@ -3086,7 +3086,7 @@
           <a:p>
             <a:fld id="{3B86C474-5A3B-4572-83DF-E10892B0A5A0}" type="datetimeFigureOut">
               <a:rPr lang="en-US" smtClean="0"/>
-              <a:t>4/23/2015</a:t>
+              <a:t>4/30/2015</a:t>
             </a:fld>
             <a:endParaRPr lang="en-US"/>
           </a:p>
@@ -3493,20 +3493,22 @@
       </p:grpSpPr>
       <p:cxnSp>
         <p:nvCxnSpPr>
-          <p:cNvPr id="3" name="Straight Connector 2"/>
+          <p:cNvPr id="60" name="Elbow Connector 59"/>
           <p:cNvCxnSpPr>
-            <a:stCxn id="179" idx="0"/>
-            <a:endCxn id="130" idx="7"/>
+            <a:stCxn id="162" idx="3"/>
+            <a:endCxn id="277" idx="1"/>
           </p:cNvCxnSpPr>
           <p:nvPr/>
         </p:nvCxnSpPr>
         <p:spPr>
-          <a:xfrm flipH="1">
-            <a:off x="4221087" y="3168328"/>
-            <a:ext cx="1036934" cy="872028"/>
-          </a:xfrm>
-          <a:prstGeom prst="line">
-            <a:avLst/>
+          <a:xfrm flipV="1">
+            <a:off x="8494152" y="1766572"/>
+            <a:ext cx="1265573" cy="1840049"/>
+          </a:xfrm>
+          <a:prstGeom prst="bentConnector3">
+            <a:avLst>
+              <a:gd name="adj1" fmla="val 20834"/>
+            </a:avLst>
           </a:prstGeom>
           <a:ln>
             <a:solidFill>
@@ -3531,56 +3533,20 @@
       </p:cxnSp>
       <p:cxnSp>
         <p:nvCxnSpPr>
-          <p:cNvPr id="188" name="Elbow Connector 187"/>
-          <p:cNvCxnSpPr/>
+          <p:cNvPr id="3" name="Straight Connector 2"/>
+          <p:cNvCxnSpPr>
+            <a:stCxn id="179" idx="2"/>
+            <a:endCxn id="130" idx="0"/>
+          </p:cNvCxnSpPr>
           <p:nvPr/>
         </p:nvCxnSpPr>
         <p:spPr>
-          <a:xfrm rot="16200000" flipH="1">
-            <a:off x="9461764" y="2632559"/>
-            <a:ext cx="2997064" cy="1694107"/>
-          </a:xfrm>
-          <a:prstGeom prst="bentConnector3">
-            <a:avLst>
-              <a:gd name="adj1" fmla="val 50000"/>
-            </a:avLst>
-          </a:prstGeom>
-          <a:ln>
-            <a:solidFill>
-              <a:schemeClr val="tx1"/>
-            </a:solidFill>
-          </a:ln>
-        </p:spPr>
-        <p:style>
-          <a:lnRef idx="1">
-            <a:schemeClr val="accent1"/>
-          </a:lnRef>
-          <a:fillRef idx="0">
-            <a:schemeClr val="accent1"/>
-          </a:fillRef>
-          <a:effectRef idx="0">
-            <a:schemeClr val="accent1"/>
-          </a:effectRef>
-          <a:fontRef idx="minor">
-            <a:schemeClr val="tx1"/>
-          </a:fontRef>
-        </p:style>
-      </p:cxnSp>
-      <p:cxnSp>
-        <p:nvCxnSpPr>
-          <p:cNvPr id="423" name="Elbow Connector 422"/>
-          <p:cNvCxnSpPr/>
-          <p:nvPr/>
-        </p:nvCxnSpPr>
-        <p:spPr>
-          <a:xfrm rot="16200000" flipH="1">
-            <a:off x="9486931" y="2607392"/>
-            <a:ext cx="2997064" cy="1694107"/>
-          </a:xfrm>
-          <a:prstGeom prst="bentConnector3">
-            <a:avLst>
-              <a:gd name="adj1" fmla="val 50000"/>
-            </a:avLst>
+          <a:xfrm flipH="1">
+            <a:off x="5715423" y="4006258"/>
+            <a:ext cx="90453" cy="841931"/>
+          </a:xfrm>
+          <a:prstGeom prst="line">
+            <a:avLst/>
           </a:prstGeom>
           <a:ln>
             <a:solidFill>
@@ -3643,13 +3609,13 @@
       </p:cxnSp>
       <p:sp>
         <p:nvSpPr>
-          <p:cNvPr id="292" name="Rectangle 291"/>
+          <p:cNvPr id="276" name="Rectangle 275"/>
           <p:cNvSpPr/>
           <p:nvPr/>
         </p:nvSpPr>
         <p:spPr>
           <a:xfrm>
-            <a:off x="10306425" y="1365577"/>
+            <a:off x="10524334" y="1681389"/>
             <a:ext cx="227800" cy="173132"/>
           </a:xfrm>
           <a:prstGeom prst="rect">
@@ -3695,13 +3661,13 @@
       </p:sp>
       <p:sp>
         <p:nvSpPr>
-          <p:cNvPr id="293" name="Rectangle 292"/>
+          <p:cNvPr id="277" name="Rectangle 276"/>
           <p:cNvSpPr/>
           <p:nvPr/>
         </p:nvSpPr>
         <p:spPr>
           <a:xfrm>
-            <a:off x="10315882" y="1607560"/>
+            <a:off x="9759725" y="1680006"/>
             <a:ext cx="227800" cy="173132"/>
           </a:xfrm>
           <a:prstGeom prst="rect">
@@ -3745,370 +3711,6 @@
           </a:p>
         </p:txBody>
       </p:sp>
-      <p:sp>
-        <p:nvSpPr>
-          <p:cNvPr id="178" name="Rectangle 177"/>
-          <p:cNvSpPr/>
-          <p:nvPr/>
-        </p:nvSpPr>
-        <p:spPr>
-          <a:xfrm>
-            <a:off x="9447687" y="1329870"/>
-            <a:ext cx="227800" cy="173132"/>
-          </a:xfrm>
-          <a:prstGeom prst="rect">
-            <a:avLst/>
-          </a:prstGeom>
-          <a:solidFill>
-            <a:schemeClr val="bg1"/>
-          </a:solidFill>
-          <a:ln>
-            <a:solidFill>
-              <a:schemeClr val="tx1"/>
-            </a:solidFill>
-          </a:ln>
-        </p:spPr>
-        <p:style>
-          <a:lnRef idx="2">
-            <a:schemeClr val="accent1">
-              <a:shade val="50000"/>
-            </a:schemeClr>
-          </a:lnRef>
-          <a:fillRef idx="1">
-            <a:schemeClr val="accent1"/>
-          </a:fillRef>
-          <a:effectRef idx="0">
-            <a:schemeClr val="accent1"/>
-          </a:effectRef>
-          <a:fontRef idx="minor">
-            <a:schemeClr val="lt1"/>
-          </a:fontRef>
-        </p:style>
-        <p:txBody>
-          <a:bodyPr rtlCol="0" anchor="ctr"/>
-          <a:lstStyle/>
-          <a:p>
-            <a:pPr algn="ctr"/>
-            <a:endParaRPr lang="en-US">
-              <a:solidFill>
-                <a:schemeClr val="tx1"/>
-              </a:solidFill>
-            </a:endParaRPr>
-          </a:p>
-        </p:txBody>
-      </p:sp>
-      <p:sp>
-        <p:nvSpPr>
-          <p:cNvPr id="257" name="Rectangle 256"/>
-          <p:cNvSpPr/>
-          <p:nvPr/>
-        </p:nvSpPr>
-        <p:spPr>
-          <a:xfrm>
-            <a:off x="7419368" y="1200173"/>
-            <a:ext cx="227800" cy="173132"/>
-          </a:xfrm>
-          <a:prstGeom prst="rect">
-            <a:avLst/>
-          </a:prstGeom>
-          <a:solidFill>
-            <a:schemeClr val="bg1"/>
-          </a:solidFill>
-          <a:ln>
-            <a:solidFill>
-              <a:schemeClr val="tx1"/>
-            </a:solidFill>
-          </a:ln>
-        </p:spPr>
-        <p:style>
-          <a:lnRef idx="2">
-            <a:schemeClr val="accent1">
-              <a:shade val="50000"/>
-            </a:schemeClr>
-          </a:lnRef>
-          <a:fillRef idx="1">
-            <a:schemeClr val="accent1"/>
-          </a:fillRef>
-          <a:effectRef idx="0">
-            <a:schemeClr val="accent1"/>
-          </a:effectRef>
-          <a:fontRef idx="minor">
-            <a:schemeClr val="lt1"/>
-          </a:fontRef>
-        </p:style>
-        <p:txBody>
-          <a:bodyPr rtlCol="0" anchor="ctr"/>
-          <a:lstStyle/>
-          <a:p>
-            <a:pPr algn="ctr"/>
-            <a:endParaRPr lang="en-US">
-              <a:solidFill>
-                <a:schemeClr val="tx1"/>
-              </a:solidFill>
-            </a:endParaRPr>
-          </a:p>
-        </p:txBody>
-      </p:sp>
-      <p:sp>
-        <p:nvSpPr>
-          <p:cNvPr id="276" name="Rectangle 275"/>
-          <p:cNvSpPr/>
-          <p:nvPr/>
-        </p:nvSpPr>
-        <p:spPr>
-          <a:xfrm>
-            <a:off x="7407217" y="1695488"/>
-            <a:ext cx="227800" cy="173132"/>
-          </a:xfrm>
-          <a:prstGeom prst="rect">
-            <a:avLst/>
-          </a:prstGeom>
-          <a:solidFill>
-            <a:schemeClr val="bg1"/>
-          </a:solidFill>
-          <a:ln>
-            <a:solidFill>
-              <a:schemeClr val="tx1"/>
-            </a:solidFill>
-          </a:ln>
-        </p:spPr>
-        <p:style>
-          <a:lnRef idx="2">
-            <a:schemeClr val="accent1">
-              <a:shade val="50000"/>
-            </a:schemeClr>
-          </a:lnRef>
-          <a:fillRef idx="1">
-            <a:schemeClr val="accent1"/>
-          </a:fillRef>
-          <a:effectRef idx="0">
-            <a:schemeClr val="accent1"/>
-          </a:effectRef>
-          <a:fontRef idx="minor">
-            <a:schemeClr val="lt1"/>
-          </a:fontRef>
-        </p:style>
-        <p:txBody>
-          <a:bodyPr rtlCol="0" anchor="ctr"/>
-          <a:lstStyle/>
-          <a:p>
-            <a:pPr algn="ctr"/>
-            <a:endParaRPr lang="en-US">
-              <a:solidFill>
-                <a:schemeClr val="tx1"/>
-              </a:solidFill>
-            </a:endParaRPr>
-          </a:p>
-        </p:txBody>
-      </p:sp>
-      <p:sp>
-        <p:nvSpPr>
-          <p:cNvPr id="277" name="Rectangle 276"/>
-          <p:cNvSpPr/>
-          <p:nvPr/>
-        </p:nvSpPr>
-        <p:spPr>
-          <a:xfrm>
-            <a:off x="6642608" y="1694105"/>
-            <a:ext cx="227800" cy="173132"/>
-          </a:xfrm>
-          <a:prstGeom prst="rect">
-            <a:avLst/>
-          </a:prstGeom>
-          <a:solidFill>
-            <a:schemeClr val="bg1"/>
-          </a:solidFill>
-          <a:ln>
-            <a:solidFill>
-              <a:schemeClr val="tx1"/>
-            </a:solidFill>
-          </a:ln>
-        </p:spPr>
-        <p:style>
-          <a:lnRef idx="2">
-            <a:schemeClr val="accent1">
-              <a:shade val="50000"/>
-            </a:schemeClr>
-          </a:lnRef>
-          <a:fillRef idx="1">
-            <a:schemeClr val="accent1"/>
-          </a:fillRef>
-          <a:effectRef idx="0">
-            <a:schemeClr val="accent1"/>
-          </a:effectRef>
-          <a:fontRef idx="minor">
-            <a:schemeClr val="lt1"/>
-          </a:fontRef>
-        </p:style>
-        <p:txBody>
-          <a:bodyPr rtlCol="0" anchor="ctr"/>
-          <a:lstStyle/>
-          <a:p>
-            <a:pPr algn="ctr"/>
-            <a:endParaRPr lang="en-US">
-              <a:solidFill>
-                <a:schemeClr val="tx1"/>
-              </a:solidFill>
-            </a:endParaRPr>
-          </a:p>
-        </p:txBody>
-      </p:sp>
-      <p:sp>
-        <p:nvSpPr>
-          <p:cNvPr id="281" name="Rectangle 280"/>
-          <p:cNvSpPr/>
-          <p:nvPr/>
-        </p:nvSpPr>
-        <p:spPr>
-          <a:xfrm>
-            <a:off x="9734276" y="3967705"/>
-            <a:ext cx="227800" cy="173132"/>
-          </a:xfrm>
-          <a:prstGeom prst="rect">
-            <a:avLst/>
-          </a:prstGeom>
-          <a:solidFill>
-            <a:schemeClr val="bg1"/>
-          </a:solidFill>
-          <a:ln>
-            <a:solidFill>
-              <a:schemeClr val="tx1"/>
-            </a:solidFill>
-          </a:ln>
-        </p:spPr>
-        <p:style>
-          <a:lnRef idx="2">
-            <a:schemeClr val="accent1">
-              <a:shade val="50000"/>
-            </a:schemeClr>
-          </a:lnRef>
-          <a:fillRef idx="1">
-            <a:schemeClr val="accent1"/>
-          </a:fillRef>
-          <a:effectRef idx="0">
-            <a:schemeClr val="accent1"/>
-          </a:effectRef>
-          <a:fontRef idx="minor">
-            <a:schemeClr val="lt1"/>
-          </a:fontRef>
-        </p:style>
-        <p:txBody>
-          <a:bodyPr rtlCol="0" anchor="ctr"/>
-          <a:lstStyle/>
-          <a:p>
-            <a:pPr algn="ctr"/>
-            <a:endParaRPr lang="en-US">
-              <a:solidFill>
-                <a:schemeClr val="tx1"/>
-              </a:solidFill>
-            </a:endParaRPr>
-          </a:p>
-        </p:txBody>
-      </p:sp>
-      <p:sp>
-        <p:nvSpPr>
-          <p:cNvPr id="282" name="Rectangle 281"/>
-          <p:cNvSpPr/>
-          <p:nvPr/>
-        </p:nvSpPr>
-        <p:spPr>
-          <a:xfrm>
-            <a:off x="9724310" y="4402741"/>
-            <a:ext cx="227800" cy="173132"/>
-          </a:xfrm>
-          <a:prstGeom prst="rect">
-            <a:avLst/>
-          </a:prstGeom>
-          <a:solidFill>
-            <a:schemeClr val="bg1"/>
-          </a:solidFill>
-          <a:ln>
-            <a:solidFill>
-              <a:schemeClr val="tx1"/>
-            </a:solidFill>
-          </a:ln>
-        </p:spPr>
-        <p:style>
-          <a:lnRef idx="2">
-            <a:schemeClr val="accent1">
-              <a:shade val="50000"/>
-            </a:schemeClr>
-          </a:lnRef>
-          <a:fillRef idx="1">
-            <a:schemeClr val="accent1"/>
-          </a:fillRef>
-          <a:effectRef idx="0">
-            <a:schemeClr val="accent1"/>
-          </a:effectRef>
-          <a:fontRef idx="minor">
-            <a:schemeClr val="lt1"/>
-          </a:fontRef>
-        </p:style>
-        <p:txBody>
-          <a:bodyPr rtlCol="0" anchor="ctr"/>
-          <a:lstStyle/>
-          <a:p>
-            <a:pPr algn="ctr"/>
-            <a:endParaRPr lang="en-US">
-              <a:solidFill>
-                <a:schemeClr val="tx1"/>
-              </a:solidFill>
-            </a:endParaRPr>
-          </a:p>
-        </p:txBody>
-      </p:sp>
-      <p:sp>
-        <p:nvSpPr>
-          <p:cNvPr id="286" name="Rectangle 285"/>
-          <p:cNvSpPr/>
-          <p:nvPr/>
-        </p:nvSpPr>
-        <p:spPr>
-          <a:xfrm>
-            <a:off x="10024509" y="1782781"/>
-            <a:ext cx="227800" cy="173132"/>
-          </a:xfrm>
-          <a:prstGeom prst="rect">
-            <a:avLst/>
-          </a:prstGeom>
-          <a:solidFill>
-            <a:schemeClr val="bg1"/>
-          </a:solidFill>
-          <a:ln>
-            <a:solidFill>
-              <a:schemeClr val="tx1"/>
-            </a:solidFill>
-          </a:ln>
-        </p:spPr>
-        <p:style>
-          <a:lnRef idx="2">
-            <a:schemeClr val="accent1">
-              <a:shade val="50000"/>
-            </a:schemeClr>
-          </a:lnRef>
-          <a:fillRef idx="1">
-            <a:schemeClr val="accent1"/>
-          </a:fillRef>
-          <a:effectRef idx="0">
-            <a:schemeClr val="accent1"/>
-          </a:effectRef>
-          <a:fontRef idx="minor">
-            <a:schemeClr val="lt1"/>
-          </a:fontRef>
-        </p:style>
-        <p:txBody>
-          <a:bodyPr rtlCol="0" anchor="ctr"/>
-          <a:lstStyle/>
-          <a:p>
-            <a:pPr algn="ctr"/>
-            <a:endParaRPr lang="en-US">
-              <a:solidFill>
-                <a:schemeClr val="tx1"/>
-              </a:solidFill>
-            </a:endParaRPr>
-          </a:p>
-        </p:txBody>
-      </p:sp>
       <p:cxnSp>
         <p:nvCxnSpPr>
           <p:cNvPr id="53" name="Straight Connector 52"/>
@@ -4120,8 +3722,8 @@
         </p:nvCxnSpPr>
         <p:spPr>
           <a:xfrm flipH="1">
-            <a:off x="6259952" y="1867237"/>
-            <a:ext cx="496556" cy="725583"/>
+            <a:off x="9323346" y="1853138"/>
+            <a:ext cx="550279" cy="941441"/>
           </a:xfrm>
           <a:prstGeom prst="line">
             <a:avLst/>
@@ -4158,8 +3760,8 @@
         </p:nvCxnSpPr>
         <p:spPr>
           <a:xfrm flipH="1" flipV="1">
-            <a:off x="7521117" y="1868620"/>
-            <a:ext cx="449436" cy="724200"/>
+            <a:off x="10638234" y="1854521"/>
+            <a:ext cx="395713" cy="940058"/>
           </a:xfrm>
           <a:prstGeom prst="line">
             <a:avLst/>
@@ -4197,7 +3799,7 @@
         <p:spPr>
           <a:xfrm>
             <a:off x="4033237" y="3340202"/>
-            <a:ext cx="670421" cy="240938"/>
+            <a:ext cx="1218276" cy="253245"/>
           </a:xfrm>
           <a:prstGeom prst="bentConnector3">
             <a:avLst/>
@@ -4231,7 +3833,7 @@
         </p:nvSpPr>
         <p:spPr>
           <a:xfrm>
-            <a:off x="7933217" y="2474617"/>
+            <a:off x="10996611" y="2676376"/>
             <a:ext cx="306494" cy="369332"/>
           </a:xfrm>
           <a:prstGeom prst="rect">
@@ -4269,44 +3871,6 @@
           <a:xfrm flipH="1" flipV="1">
             <a:off x="389004" y="934756"/>
             <a:ext cx="372350" cy="553740"/>
-          </a:xfrm>
-          <a:prstGeom prst="line">
-            <a:avLst/>
-          </a:prstGeom>
-          <a:ln>
-            <a:solidFill>
-              <a:schemeClr val="tx1"/>
-            </a:solidFill>
-          </a:ln>
-        </p:spPr>
-        <p:style>
-          <a:lnRef idx="1">
-            <a:schemeClr val="accent1"/>
-          </a:lnRef>
-          <a:fillRef idx="0">
-            <a:schemeClr val="accent1"/>
-          </a:fillRef>
-          <a:effectRef idx="0">
-            <a:schemeClr val="accent1"/>
-          </a:effectRef>
-          <a:fontRef idx="minor">
-            <a:schemeClr val="tx1"/>
-          </a:fontRef>
-        </p:style>
-      </p:cxnSp>
-      <p:cxnSp>
-        <p:nvCxnSpPr>
-          <p:cNvPr id="345" name="Straight Connector 344"/>
-          <p:cNvCxnSpPr>
-            <a:stCxn id="5" idx="0"/>
-            <a:endCxn id="341" idx="4"/>
-          </p:cNvCxnSpPr>
-          <p:nvPr/>
-        </p:nvCxnSpPr>
-        <p:spPr>
-          <a:xfrm flipV="1">
-            <a:off x="761354" y="429974"/>
-            <a:ext cx="124101" cy="1058522"/>
           </a:xfrm>
           <a:prstGeom prst="line">
             <a:avLst/>
@@ -4412,15 +3976,15 @@
         <p:nvCxnSpPr>
           <p:cNvPr id="373" name="Straight Connector 372"/>
           <p:cNvCxnSpPr>
-            <a:stCxn id="371" idx="3"/>
+            <a:stCxn id="371" idx="2"/>
             <a:endCxn id="153" idx="3"/>
           </p:cNvCxnSpPr>
           <p:nvPr/>
         </p:nvCxnSpPr>
         <p:spPr>
-          <a:xfrm flipH="1">
-            <a:off x="1385317" y="3859426"/>
-            <a:ext cx="161960" cy="100022"/>
+          <a:xfrm flipH="1" flipV="1">
+            <a:off x="1366346" y="5000833"/>
+            <a:ext cx="495441" cy="136125"/>
           </a:xfrm>
           <a:prstGeom prst="line">
             <a:avLst/>
@@ -4457,8 +4021,8 @@
         </p:nvCxnSpPr>
         <p:spPr>
           <a:xfrm>
-            <a:off x="1385317" y="3959448"/>
-            <a:ext cx="386760" cy="168551"/>
+            <a:off x="1366346" y="5000833"/>
+            <a:ext cx="180936" cy="404719"/>
           </a:xfrm>
           <a:prstGeom prst="line">
             <a:avLst/>
@@ -4489,14 +4053,14 @@
           <p:cNvPr id="392" name="Straight Connector 391"/>
           <p:cNvCxnSpPr>
             <a:stCxn id="179" idx="2"/>
-            <a:endCxn id="390" idx="0"/>
+            <a:endCxn id="390" idx="1"/>
           </p:cNvCxnSpPr>
           <p:nvPr/>
         </p:nvCxnSpPr>
         <p:spPr>
-          <a:xfrm flipH="1">
-            <a:off x="5169046" y="3993951"/>
-            <a:ext cx="88975" cy="512049"/>
+          <a:xfrm>
+            <a:off x="5805876" y="4006258"/>
+            <a:ext cx="679348" cy="586089"/>
           </a:xfrm>
           <a:prstGeom prst="line">
             <a:avLst/>
@@ -4559,7 +4123,7 @@
         </p:nvSpPr>
         <p:spPr>
           <a:xfrm>
-            <a:off x="4238317" y="1707378"/>
+            <a:off x="5216176" y="1641330"/>
             <a:ext cx="306494" cy="369332"/>
           </a:xfrm>
           <a:prstGeom prst="rect">
@@ -4589,7 +4153,7 @@
         </p:nvSpPr>
         <p:spPr>
           <a:xfrm>
-            <a:off x="5618959" y="1721376"/>
+            <a:off x="6596818" y="1655328"/>
             <a:ext cx="301686" cy="369332"/>
           </a:xfrm>
           <a:prstGeom prst="rect">
@@ -4621,8 +4185,8 @@
         </p:nvCxnSpPr>
         <p:spPr>
           <a:xfrm>
-            <a:off x="6643617" y="728249"/>
-            <a:ext cx="511486" cy="320548"/>
+            <a:off x="9704477" y="645571"/>
+            <a:ext cx="567743" cy="389127"/>
           </a:xfrm>
           <a:prstGeom prst="line">
             <a:avLst/>
@@ -4659,7 +4223,7 @@
         </p:nvCxnSpPr>
         <p:spPr>
           <a:xfrm flipH="1">
-            <a:off x="7155103" y="473725"/>
+            <a:off x="10272220" y="459626"/>
             <a:ext cx="195339" cy="575072"/>
           </a:xfrm>
           <a:prstGeom prst="line">
@@ -4686,66 +4250,6 @@
           </a:fontRef>
         </p:style>
       </p:cxnSp>
-      <p:sp>
-        <p:nvSpPr>
-          <p:cNvPr id="442" name="TextBox 441"/>
-          <p:cNvSpPr txBox="1"/>
-          <p:nvPr/>
-        </p:nvSpPr>
-        <p:spPr>
-          <a:xfrm>
-            <a:off x="7799468" y="642086"/>
-            <a:ext cx="306494" cy="369332"/>
-          </a:xfrm>
-          <a:prstGeom prst="rect">
-            <a:avLst/>
-          </a:prstGeom>
-          <a:noFill/>
-        </p:spPr>
-        <p:txBody>
-          <a:bodyPr wrap="none" rtlCol="0">
-            <a:spAutoFit/>
-          </a:bodyPr>
-          <a:lstStyle/>
-          <a:p>
-            <a:r>
-              <a:rPr lang="en-US" dirty="0" smtClean="0"/>
-              <a:t>n</a:t>
-            </a:r>
-            <a:endParaRPr lang="en-US" dirty="0"/>
-          </a:p>
-        </p:txBody>
-      </p:sp>
-      <p:sp>
-        <p:nvSpPr>
-          <p:cNvPr id="443" name="TextBox 442"/>
-          <p:cNvSpPr txBox="1"/>
-          <p:nvPr/>
-        </p:nvSpPr>
-        <p:spPr>
-          <a:xfrm>
-            <a:off x="8936561" y="666813"/>
-            <a:ext cx="301686" cy="369332"/>
-          </a:xfrm>
-          <a:prstGeom prst="rect">
-            <a:avLst/>
-          </a:prstGeom>
-          <a:noFill/>
-        </p:spPr>
-        <p:txBody>
-          <a:bodyPr wrap="none" rtlCol="0">
-            <a:spAutoFit/>
-          </a:bodyPr>
-          <a:lstStyle/>
-          <a:p>
-            <a:r>
-              <a:rPr lang="en-US" dirty="0" smtClean="0"/>
-              <a:t>1</a:t>
-            </a:r>
-            <a:endParaRPr lang="en-US" dirty="0"/>
-          </a:p>
-        </p:txBody>
-      </p:sp>
       <p:cxnSp>
         <p:nvCxnSpPr>
           <p:cNvPr id="459" name="Straight Connector 458"/>
@@ -4757,8 +4261,8 @@
         </p:nvCxnSpPr>
         <p:spPr>
           <a:xfrm flipH="1">
-            <a:off x="1246936" y="5150938"/>
-            <a:ext cx="643440" cy="874714"/>
+            <a:off x="9230531" y="5520179"/>
+            <a:ext cx="905833" cy="421796"/>
           </a:xfrm>
           <a:prstGeom prst="line">
             <a:avLst/>
@@ -4794,9 +4298,9 @@
           <p:nvPr/>
         </p:nvCxnSpPr>
         <p:spPr>
-          <a:xfrm flipH="1">
-            <a:off x="1246936" y="5617912"/>
-            <a:ext cx="637641" cy="407740"/>
+          <a:xfrm flipH="1" flipV="1">
+            <a:off x="9230531" y="5941975"/>
+            <a:ext cx="900034" cy="45178"/>
           </a:xfrm>
           <a:prstGeom prst="line">
             <a:avLst/>
@@ -4832,9 +4336,9 @@
           <p:nvPr/>
         </p:nvCxnSpPr>
         <p:spPr>
-          <a:xfrm flipH="1">
-            <a:off x="1246936" y="6013525"/>
-            <a:ext cx="971681" cy="12127"/>
+          <a:xfrm flipH="1" flipV="1">
+            <a:off x="9230531" y="5941975"/>
+            <a:ext cx="537800" cy="520367"/>
           </a:xfrm>
           <a:prstGeom prst="line">
             <a:avLst/>
@@ -4860,158 +4364,6 @@
           </a:fontRef>
         </p:style>
       </p:cxnSp>
-      <p:cxnSp>
-        <p:nvCxnSpPr>
-          <p:cNvPr id="490" name="Straight Connector 489"/>
-          <p:cNvCxnSpPr>
-            <a:stCxn id="70" idx="1"/>
-            <a:endCxn id="479" idx="6"/>
-          </p:cNvCxnSpPr>
-          <p:nvPr/>
-        </p:nvCxnSpPr>
-        <p:spPr>
-          <a:xfrm flipH="1" flipV="1">
-            <a:off x="8517638" y="3993198"/>
-            <a:ext cx="515296" cy="270087"/>
-          </a:xfrm>
-          <a:prstGeom prst="line">
-            <a:avLst/>
-          </a:prstGeom>
-          <a:ln>
-            <a:solidFill>
-              <a:schemeClr val="tx1"/>
-            </a:solidFill>
-          </a:ln>
-        </p:spPr>
-        <p:style>
-          <a:lnRef idx="1">
-            <a:schemeClr val="accent1"/>
-          </a:lnRef>
-          <a:fillRef idx="0">
-            <a:schemeClr val="accent1"/>
-          </a:fillRef>
-          <a:effectRef idx="0">
-            <a:schemeClr val="accent1"/>
-          </a:effectRef>
-          <a:fontRef idx="minor">
-            <a:schemeClr val="tx1"/>
-          </a:fontRef>
-        </p:style>
-      </p:cxnSp>
-      <p:cxnSp>
-        <p:nvCxnSpPr>
-          <p:cNvPr id="492" name="Straight Connector 491"/>
-          <p:cNvCxnSpPr>
-            <a:stCxn id="71" idx="1"/>
-            <a:endCxn id="480" idx="6"/>
-          </p:cNvCxnSpPr>
-          <p:nvPr/>
-        </p:nvCxnSpPr>
-        <p:spPr>
-          <a:xfrm flipH="1">
-            <a:off x="8249824" y="6280637"/>
-            <a:ext cx="687850" cy="46987"/>
-          </a:xfrm>
-          <a:prstGeom prst="line">
-            <a:avLst/>
-          </a:prstGeom>
-          <a:ln>
-            <a:solidFill>
-              <a:schemeClr val="tx1"/>
-            </a:solidFill>
-          </a:ln>
-        </p:spPr>
-        <p:style>
-          <a:lnRef idx="1">
-            <a:schemeClr val="accent1"/>
-          </a:lnRef>
-          <a:fillRef idx="0">
-            <a:schemeClr val="accent1"/>
-          </a:fillRef>
-          <a:effectRef idx="0">
-            <a:schemeClr val="accent1"/>
-          </a:effectRef>
-          <a:fontRef idx="minor">
-            <a:schemeClr val="tx1"/>
-          </a:fontRef>
-        </p:style>
-      </p:cxnSp>
-      <p:cxnSp>
-        <p:nvCxnSpPr>
-          <p:cNvPr id="497" name="Straight Connector 496"/>
-          <p:cNvCxnSpPr>
-            <a:stCxn id="434" idx="4"/>
-            <a:endCxn id="9" idx="0"/>
-          </p:cNvCxnSpPr>
-          <p:nvPr/>
-        </p:nvCxnSpPr>
-        <p:spPr>
-          <a:xfrm>
-            <a:off x="9519664" y="423140"/>
-            <a:ext cx="475370" cy="761499"/>
-          </a:xfrm>
-          <a:prstGeom prst="line">
-            <a:avLst/>
-          </a:prstGeom>
-          <a:ln>
-            <a:solidFill>
-              <a:schemeClr val="tx1"/>
-            </a:solidFill>
-          </a:ln>
-        </p:spPr>
-        <p:style>
-          <a:lnRef idx="1">
-            <a:schemeClr val="accent1"/>
-          </a:lnRef>
-          <a:fillRef idx="0">
-            <a:schemeClr val="accent1"/>
-          </a:fillRef>
-          <a:effectRef idx="0">
-            <a:schemeClr val="accent1"/>
-          </a:effectRef>
-          <a:fontRef idx="minor">
-            <a:schemeClr val="tx1"/>
-          </a:fontRef>
-        </p:style>
-      </p:cxnSp>
-      <p:cxnSp>
-        <p:nvCxnSpPr>
-          <p:cNvPr id="499" name="Straight Connector 498"/>
-          <p:cNvCxnSpPr>
-            <a:stCxn id="495" idx="3"/>
-            <a:endCxn id="9" idx="0"/>
-          </p:cNvCxnSpPr>
-          <p:nvPr/>
-        </p:nvCxnSpPr>
-        <p:spPr>
-          <a:xfrm flipH="1">
-            <a:off x="9995034" y="752249"/>
-            <a:ext cx="278779" cy="432390"/>
-          </a:xfrm>
-          <a:prstGeom prst="line">
-            <a:avLst/>
-          </a:prstGeom>
-          <a:ln>
-            <a:solidFill>
-              <a:schemeClr val="tx1"/>
-            </a:solidFill>
-          </a:ln>
-        </p:spPr>
-        <p:style>
-          <a:lnRef idx="1">
-            <a:schemeClr val="accent1"/>
-          </a:lnRef>
-          <a:fillRef idx="0">
-            <a:schemeClr val="accent1"/>
-          </a:fillRef>
-          <a:effectRef idx="0">
-            <a:schemeClr val="accent1"/>
-          </a:effectRef>
-          <a:fontRef idx="minor">
-            <a:schemeClr val="tx1"/>
-          </a:fontRef>
-        </p:style>
-      </p:cxnSp>
       <p:sp>
         <p:nvSpPr>
           <p:cNvPr id="510" name="TextBox 509"/>
@@ -5020,7 +4372,7 @@
         </p:nvSpPr>
         <p:spPr>
           <a:xfrm>
-            <a:off x="760030" y="3224115"/>
+            <a:off x="741059" y="4265500"/>
             <a:ext cx="306494" cy="369332"/>
           </a:xfrm>
           <a:prstGeom prst="rect">
@@ -5050,7 +4402,7 @@
         </p:nvSpPr>
         <p:spPr>
           <a:xfrm>
-            <a:off x="732207" y="4344123"/>
+            <a:off x="713236" y="5385508"/>
             <a:ext cx="369012" cy="369332"/>
           </a:xfrm>
           <a:prstGeom prst="rect">
@@ -5068,243 +4420,6 @@
               <a:rPr lang="en-US" dirty="0"/>
               <a:t>m</a:t>
             </a:r>
-          </a:p>
-        </p:txBody>
-      </p:sp>
-      <p:sp>
-        <p:nvSpPr>
-          <p:cNvPr id="517" name="TextBox 516"/>
-          <p:cNvSpPr txBox="1"/>
-          <p:nvPr/>
-        </p:nvSpPr>
-        <p:spPr>
-          <a:xfrm>
-            <a:off x="8629268" y="1649848"/>
-            <a:ext cx="306494" cy="369332"/>
-          </a:xfrm>
-          <a:prstGeom prst="rect">
-            <a:avLst/>
-          </a:prstGeom>
-          <a:noFill/>
-        </p:spPr>
-        <p:txBody>
-          <a:bodyPr wrap="none" rtlCol="0">
-            <a:spAutoFit/>
-          </a:bodyPr>
-          <a:lstStyle/>
-          <a:p>
-            <a:r>
-              <a:rPr lang="en-US" dirty="0" smtClean="0"/>
-              <a:t>n</a:t>
-            </a:r>
-            <a:endParaRPr lang="en-US" dirty="0"/>
-          </a:p>
-        </p:txBody>
-      </p:sp>
-      <p:sp>
-        <p:nvSpPr>
-          <p:cNvPr id="518" name="TextBox 517"/>
-          <p:cNvSpPr txBox="1"/>
-          <p:nvPr/>
-        </p:nvSpPr>
-        <p:spPr>
-          <a:xfrm>
-            <a:off x="8632401" y="2436672"/>
-            <a:ext cx="301686" cy="369332"/>
-          </a:xfrm>
-          <a:prstGeom prst="rect">
-            <a:avLst/>
-          </a:prstGeom>
-          <a:noFill/>
-        </p:spPr>
-        <p:txBody>
-          <a:bodyPr wrap="none" rtlCol="0">
-            <a:spAutoFit/>
-          </a:bodyPr>
-          <a:lstStyle/>
-          <a:p>
-            <a:r>
-              <a:rPr lang="en-US" dirty="0" smtClean="0"/>
-              <a:t>1</a:t>
-            </a:r>
-            <a:endParaRPr lang="en-US" dirty="0"/>
-          </a:p>
-        </p:txBody>
-      </p:sp>
-      <p:sp>
-        <p:nvSpPr>
-          <p:cNvPr id="519" name="TextBox 518"/>
-          <p:cNvSpPr txBox="1"/>
-          <p:nvPr/>
-        </p:nvSpPr>
-        <p:spPr>
-          <a:xfrm>
-            <a:off x="9504893" y="4628988"/>
-            <a:ext cx="306494" cy="369332"/>
-          </a:xfrm>
-          <a:prstGeom prst="rect">
-            <a:avLst/>
-          </a:prstGeom>
-          <a:noFill/>
-        </p:spPr>
-        <p:txBody>
-          <a:bodyPr wrap="none" rtlCol="0">
-            <a:spAutoFit/>
-          </a:bodyPr>
-          <a:lstStyle/>
-          <a:p>
-            <a:r>
-              <a:rPr lang="en-US" dirty="0" smtClean="0"/>
-              <a:t>n</a:t>
-            </a:r>
-            <a:endParaRPr lang="en-US" dirty="0"/>
-          </a:p>
-        </p:txBody>
-      </p:sp>
-      <p:sp>
-        <p:nvSpPr>
-          <p:cNvPr id="520" name="TextBox 519"/>
-          <p:cNvSpPr txBox="1"/>
-          <p:nvPr/>
-        </p:nvSpPr>
-        <p:spPr>
-          <a:xfrm>
-            <a:off x="9546490" y="5514829"/>
-            <a:ext cx="301686" cy="369332"/>
-          </a:xfrm>
-          <a:prstGeom prst="rect">
-            <a:avLst/>
-          </a:prstGeom>
-          <a:noFill/>
-        </p:spPr>
-        <p:txBody>
-          <a:bodyPr wrap="none" rtlCol="0">
-            <a:spAutoFit/>
-          </a:bodyPr>
-          <a:lstStyle/>
-          <a:p>
-            <a:r>
-              <a:rPr lang="en-US" dirty="0"/>
-              <a:t>1</a:t>
-            </a:r>
-          </a:p>
-        </p:txBody>
-      </p:sp>
-      <p:sp>
-        <p:nvSpPr>
-          <p:cNvPr id="523" name="TextBox 522"/>
-          <p:cNvSpPr txBox="1"/>
-          <p:nvPr/>
-        </p:nvSpPr>
-        <p:spPr>
-          <a:xfrm>
-            <a:off x="10706172" y="4503925"/>
-            <a:ext cx="306494" cy="369332"/>
-          </a:xfrm>
-          <a:prstGeom prst="rect">
-            <a:avLst/>
-          </a:prstGeom>
-          <a:noFill/>
-        </p:spPr>
-        <p:txBody>
-          <a:bodyPr wrap="none" rtlCol="0">
-            <a:spAutoFit/>
-          </a:bodyPr>
-          <a:lstStyle/>
-          <a:p>
-            <a:r>
-              <a:rPr lang="en-US" dirty="0" smtClean="0"/>
-              <a:t>n</a:t>
-            </a:r>
-            <a:endParaRPr lang="en-US" dirty="0"/>
-          </a:p>
-        </p:txBody>
-      </p:sp>
-      <p:sp>
-        <p:nvSpPr>
-          <p:cNvPr id="524" name="TextBox 523"/>
-          <p:cNvSpPr txBox="1"/>
-          <p:nvPr/>
-        </p:nvSpPr>
-        <p:spPr>
-          <a:xfrm>
-            <a:off x="11875081" y="5565759"/>
-            <a:ext cx="301686" cy="369332"/>
-          </a:xfrm>
-          <a:prstGeom prst="rect">
-            <a:avLst/>
-          </a:prstGeom>
-          <a:noFill/>
-        </p:spPr>
-        <p:txBody>
-          <a:bodyPr wrap="none" rtlCol="0">
-            <a:spAutoFit/>
-          </a:bodyPr>
-          <a:lstStyle/>
-          <a:p>
-            <a:r>
-              <a:rPr lang="en-US" dirty="0"/>
-              <a:t>1</a:t>
-            </a:r>
-          </a:p>
-        </p:txBody>
-      </p:sp>
-      <p:sp>
-        <p:nvSpPr>
-          <p:cNvPr id="540" name="TextBox 539"/>
-          <p:cNvSpPr txBox="1"/>
-          <p:nvPr/>
-        </p:nvSpPr>
-        <p:spPr>
-          <a:xfrm>
-            <a:off x="10643654" y="3637437"/>
-            <a:ext cx="369012" cy="369332"/>
-          </a:xfrm>
-          <a:prstGeom prst="rect">
-            <a:avLst/>
-          </a:prstGeom>
-          <a:noFill/>
-        </p:spPr>
-        <p:txBody>
-          <a:bodyPr wrap="none" rtlCol="0">
-            <a:spAutoFit/>
-          </a:bodyPr>
-          <a:lstStyle/>
-          <a:p>
-            <a:r>
-              <a:rPr lang="en-US" dirty="0"/>
-              <a:t>m</a:t>
-            </a:r>
-          </a:p>
-        </p:txBody>
-      </p:sp>
-      <p:sp>
-        <p:nvSpPr>
-          <p:cNvPr id="541" name="TextBox 540"/>
-          <p:cNvSpPr txBox="1"/>
-          <p:nvPr/>
-        </p:nvSpPr>
-        <p:spPr>
-          <a:xfrm>
-            <a:off x="11863429" y="4724526"/>
-            <a:ext cx="306494" cy="369332"/>
-          </a:xfrm>
-          <a:prstGeom prst="rect">
-            <a:avLst/>
-          </a:prstGeom>
-          <a:noFill/>
-        </p:spPr>
-        <p:txBody>
-          <a:bodyPr wrap="none" rtlCol="0">
-            <a:spAutoFit/>
-          </a:bodyPr>
-          <a:lstStyle/>
-          <a:p>
-            <a:r>
-              <a:rPr lang="en-US" dirty="0" smtClean="0"/>
-              <a:t>n</a:t>
-            </a:r>
-            <a:endParaRPr lang="en-US" dirty="0"/>
           </a:p>
         </p:txBody>
       </p:sp>
@@ -5373,14 +4488,14 @@
       </p:sp>
       <p:sp>
         <p:nvSpPr>
-          <p:cNvPr id="341" name="Oval 340"/>
+          <p:cNvPr id="348" name="Oval 347"/>
           <p:cNvSpPr/>
           <p:nvPr/>
         </p:nvSpPr>
         <p:spPr>
           <a:xfrm>
-            <a:off x="432737" y="80350"/>
-            <a:ext cx="905435" cy="349624"/>
+            <a:off x="2391260" y="736275"/>
+            <a:ext cx="1003993" cy="349624"/>
           </a:xfrm>
           <a:prstGeom prst="ellipse">
             <a:avLst/>
@@ -5424,7 +4539,7 @@
                   <a:schemeClr val="tx1"/>
                 </a:solidFill>
               </a:rPr>
-              <a:t>photo</a:t>
+              <a:t>gender</a:t>
             </a:r>
             <a:endParaRPr lang="en-US" sz="1400" dirty="0">
               <a:solidFill>
@@ -5436,14 +4551,14 @@
       </p:sp>
       <p:sp>
         <p:nvSpPr>
-          <p:cNvPr id="348" name="Oval 347"/>
+          <p:cNvPr id="363" name="Oval 362"/>
           <p:cNvSpPr/>
           <p:nvPr/>
         </p:nvSpPr>
         <p:spPr>
           <a:xfrm>
-            <a:off x="2391260" y="736275"/>
-            <a:ext cx="1003993" cy="349624"/>
+            <a:off x="2747060" y="176035"/>
+            <a:ext cx="1178078" cy="386142"/>
           </a:xfrm>
           <a:prstGeom prst="ellipse">
             <a:avLst/>
@@ -5482,14 +4597,14 @@
           <a:p>
             <a:pPr algn="ctr"/>
             <a:r>
-              <a:rPr lang="en-US" sz="1400" dirty="0" smtClean="0">
+              <a:rPr lang="en-US" sz="1400" u="sng" dirty="0" err="1" smtClean="0">
                 <a:solidFill>
                   <a:schemeClr val="tx1"/>
                 </a:solidFill>
               </a:rPr>
-              <a:t>gender</a:t>
-            </a:r>
-            <a:endParaRPr lang="en-US" sz="1400" dirty="0">
+              <a:t>LeaderID</a:t>
+            </a:r>
+            <a:endParaRPr lang="en-US" sz="1400" u="sng" dirty="0">
               <a:solidFill>
                 <a:schemeClr val="tx1"/>
               </a:solidFill>
@@ -5499,14 +4614,14 @@
       </p:sp>
       <p:sp>
         <p:nvSpPr>
-          <p:cNvPr id="363" name="Oval 362"/>
+          <p:cNvPr id="368" name="Oval 367"/>
           <p:cNvSpPr/>
           <p:nvPr/>
         </p:nvSpPr>
         <p:spPr>
           <a:xfrm>
-            <a:off x="2747060" y="176035"/>
-            <a:ext cx="1178078" cy="386142"/>
+            <a:off x="10136364" y="5345367"/>
+            <a:ext cx="1308751" cy="349624"/>
           </a:xfrm>
           <a:prstGeom prst="ellipse">
             <a:avLst/>
@@ -5545,12 +4660,12 @@
           <a:p>
             <a:pPr algn="ctr"/>
             <a:r>
-              <a:rPr lang="en-US" sz="1400" u="sng" dirty="0" err="1" smtClean="0">
+              <a:rPr lang="en-US" sz="1400" u="sng" dirty="0" smtClean="0">
                 <a:solidFill>
                   <a:schemeClr val="tx1"/>
                 </a:solidFill>
               </a:rPr>
-              <a:t>LeaderID</a:t>
+              <a:t>username</a:t>
             </a:r>
             <a:endParaRPr lang="en-US" sz="1400" u="sng" dirty="0">
               <a:solidFill>
@@ -5562,14 +4677,14 @@
       </p:sp>
       <p:sp>
         <p:nvSpPr>
-          <p:cNvPr id="368" name="Oval 367"/>
+          <p:cNvPr id="370" name="Oval 369"/>
           <p:cNvSpPr/>
           <p:nvPr/>
         </p:nvSpPr>
         <p:spPr>
           <a:xfrm>
-            <a:off x="1890376" y="4976126"/>
-            <a:ext cx="1308751" cy="349624"/>
+            <a:off x="1412809" y="5354351"/>
+            <a:ext cx="918240" cy="349624"/>
           </a:xfrm>
           <a:prstGeom prst="ellipse">
             <a:avLst/>
@@ -5608,14 +4723,14 @@
           <a:p>
             <a:pPr algn="ctr"/>
             <a:r>
-              <a:rPr lang="en-US" sz="1400" u="sng" dirty="0" smtClean="0">
+              <a:rPr lang="en-US" sz="1400" dirty="0" smtClean="0">
                 <a:solidFill>
                   <a:schemeClr val="tx1"/>
                 </a:solidFill>
               </a:rPr>
-              <a:t>username</a:t>
-            </a:r>
-            <a:endParaRPr lang="en-US" sz="1400" u="sng" dirty="0">
+              <a:t>rating</a:t>
+            </a:r>
+            <a:endParaRPr lang="en-US" sz="1400" dirty="0">
               <a:solidFill>
                 <a:schemeClr val="tx1"/>
               </a:solidFill>
@@ -5625,14 +4740,14 @@
       </p:sp>
       <p:sp>
         <p:nvSpPr>
-          <p:cNvPr id="370" name="Oval 369"/>
+          <p:cNvPr id="371" name="Oval 370"/>
           <p:cNvSpPr/>
           <p:nvPr/>
         </p:nvSpPr>
         <p:spPr>
           <a:xfrm>
-            <a:off x="1637604" y="4076798"/>
-            <a:ext cx="918240" cy="349624"/>
+            <a:off x="1861787" y="4962146"/>
+            <a:ext cx="1427859" cy="349624"/>
           </a:xfrm>
           <a:prstGeom prst="ellipse">
             <a:avLst/>
@@ -5676,7 +4791,7 @@
                   <a:schemeClr val="tx1"/>
                 </a:solidFill>
               </a:rPr>
-              <a:t>rating</a:t>
+              <a:t>description</a:t>
             </a:r>
             <a:endParaRPr lang="en-US" sz="1400" dirty="0">
               <a:solidFill>
@@ -5688,14 +4803,14 @@
       </p:sp>
       <p:sp>
         <p:nvSpPr>
-          <p:cNvPr id="371" name="Oval 370"/>
+          <p:cNvPr id="378" name="Oval 377"/>
           <p:cNvSpPr/>
           <p:nvPr/>
         </p:nvSpPr>
         <p:spPr>
           <a:xfrm>
-            <a:off x="1338172" y="3561003"/>
-            <a:ext cx="1427859" cy="349624"/>
+            <a:off x="10130565" y="5812341"/>
+            <a:ext cx="1314550" cy="349624"/>
           </a:xfrm>
           <a:prstGeom prst="ellipse">
             <a:avLst/>
@@ -5739,7 +4854,7 @@
                   <a:schemeClr val="tx1"/>
                 </a:solidFill>
               </a:rPr>
-              <a:t>description</a:t>
+              <a:t>password</a:t>
             </a:r>
             <a:endParaRPr lang="en-US" sz="1400" dirty="0">
               <a:solidFill>
@@ -5751,76 +4866,13 @@
       </p:sp>
       <p:sp>
         <p:nvSpPr>
-          <p:cNvPr id="378" name="Oval 377"/>
-          <p:cNvSpPr/>
-          <p:nvPr/>
-        </p:nvSpPr>
-        <p:spPr>
-          <a:xfrm>
-            <a:off x="1884577" y="5443100"/>
-            <a:ext cx="1314550" cy="349624"/>
-          </a:xfrm>
-          <a:prstGeom prst="ellipse">
-            <a:avLst/>
-          </a:prstGeom>
-          <a:solidFill>
-            <a:schemeClr val="accent1">
-              <a:lumMod val="40000"/>
-              <a:lumOff val="60000"/>
-            </a:schemeClr>
-          </a:solidFill>
-          <a:ln>
-            <a:solidFill>
-              <a:schemeClr val="tx1"/>
-            </a:solidFill>
-          </a:ln>
-        </p:spPr>
-        <p:style>
-          <a:lnRef idx="2">
-            <a:schemeClr val="accent1">
-              <a:shade val="50000"/>
-            </a:schemeClr>
-          </a:lnRef>
-          <a:fillRef idx="1">
-            <a:schemeClr val="accent1"/>
-          </a:fillRef>
-          <a:effectRef idx="0">
-            <a:schemeClr val="accent1"/>
-          </a:effectRef>
-          <a:fontRef idx="minor">
-            <a:schemeClr val="lt1"/>
-          </a:fontRef>
-        </p:style>
-        <p:txBody>
-          <a:bodyPr rtlCol="0" anchor="ctr"/>
-          <a:lstStyle/>
-          <a:p>
-            <a:pPr algn="ctr"/>
-            <a:r>
-              <a:rPr lang="en-US" sz="1400" dirty="0" smtClean="0">
-                <a:solidFill>
-                  <a:schemeClr val="tx1"/>
-                </a:solidFill>
-              </a:rPr>
-              <a:t>password</a:t>
-            </a:r>
-            <a:endParaRPr lang="en-US" sz="1400" dirty="0">
-              <a:solidFill>
-                <a:schemeClr val="tx1"/>
-              </a:solidFill>
-            </a:endParaRPr>
-          </a:p>
-        </p:txBody>
-      </p:sp>
-      <p:sp>
-        <p:nvSpPr>
           <p:cNvPr id="382" name="Oval 381"/>
           <p:cNvSpPr/>
           <p:nvPr/>
         </p:nvSpPr>
         <p:spPr>
           <a:xfrm>
-            <a:off x="2218617" y="5838713"/>
+            <a:off x="9768331" y="6287530"/>
             <a:ext cx="1805238" cy="349624"/>
           </a:xfrm>
           <a:prstGeom prst="ellipse">
@@ -5892,7 +4944,7 @@
         </p:nvSpPr>
         <p:spPr>
           <a:xfrm>
-            <a:off x="4415447" y="4506000"/>
+            <a:off x="6264500" y="4541146"/>
             <a:ext cx="1507198" cy="349624"/>
           </a:xfrm>
           <a:prstGeom prst="ellipse">
@@ -5955,8 +5007,8 @@
         </p:nvSpPr>
         <p:spPr>
           <a:xfrm>
-            <a:off x="5030799" y="389580"/>
-            <a:ext cx="1889534" cy="396775"/>
+            <a:off x="8964820" y="306902"/>
+            <a:ext cx="866562" cy="396775"/>
           </a:xfrm>
           <a:prstGeom prst="ellipse">
             <a:avLst/>
@@ -5995,30 +5047,14 @@
           <a:p>
             <a:pPr algn="ctr"/>
             <a:r>
-              <a:rPr lang="en-US" sz="1400" u="sng" dirty="0" err="1" smtClean="0">
-                <a:solidFill>
-                  <a:schemeClr val="tx1"/>
-                </a:solidFill>
-              </a:rPr>
-              <a:t>territory</a:t>
-            </a:r>
-            <a:r>
-              <a:rPr lang="en-US" sz="1400" u="sng" dirty="0" err="1">
-                <a:solidFill>
-                  <a:schemeClr val="tx1"/>
-                </a:solidFill>
-              </a:rPr>
-              <a:t>_</a:t>
-            </a:r>
-            <a:r>
-              <a:rPr lang="en-US" sz="1400" u="sng" dirty="0" err="1" smtClean="0">
+              <a:rPr lang="en-US" sz="1400" dirty="0" smtClean="0">
                 <a:solidFill>
                   <a:schemeClr val="tx1"/>
                 </a:solidFill>
               </a:rPr>
               <a:t>name</a:t>
             </a:r>
-            <a:endParaRPr lang="en-US" sz="1400" u="sng" dirty="0">
+            <a:endParaRPr lang="en-US" sz="1400" dirty="0">
               <a:solidFill>
                 <a:schemeClr val="tx1"/>
               </a:solidFill>
@@ -6028,14 +5064,14 @@
       </p:sp>
       <p:sp>
         <p:nvSpPr>
-          <p:cNvPr id="434" name="Oval 433"/>
+          <p:cNvPr id="435" name="Oval 434"/>
           <p:cNvSpPr/>
           <p:nvPr/>
         </p:nvSpPr>
         <p:spPr>
           <a:xfrm>
-            <a:off x="8596539" y="80176"/>
-            <a:ext cx="1846249" cy="342964"/>
+            <a:off x="9761215" y="110002"/>
+            <a:ext cx="1412687" cy="349624"/>
           </a:xfrm>
           <a:prstGeom prst="ellipse">
             <a:avLst/>
@@ -6074,14 +5110,14 @@
           <a:p>
             <a:pPr algn="ctr"/>
             <a:r>
-              <a:rPr lang="en-US" sz="1400" u="sng" dirty="0" err="1" smtClean="0">
+              <a:rPr lang="en-US" sz="1400" dirty="0" smtClean="0">
                 <a:solidFill>
                   <a:schemeClr val="tx1"/>
                 </a:solidFill>
               </a:rPr>
-              <a:t>Country_name</a:t>
-            </a:r>
-            <a:endParaRPr lang="en-US" sz="1400" u="sng" dirty="0">
+              <a:t>population</a:t>
+            </a:r>
+            <a:endParaRPr lang="en-US" sz="1400" dirty="0">
               <a:solidFill>
                 <a:schemeClr val="tx1"/>
               </a:solidFill>
@@ -6091,14 +5127,14 @@
       </p:sp>
       <p:sp>
         <p:nvSpPr>
-          <p:cNvPr id="435" name="Oval 434"/>
+          <p:cNvPr id="543" name="Oval 542"/>
           <p:cNvSpPr/>
           <p:nvPr/>
         </p:nvSpPr>
         <p:spPr>
           <a:xfrm>
-            <a:off x="6644098" y="124101"/>
-            <a:ext cx="1412687" cy="349624"/>
+            <a:off x="9613292" y="4774942"/>
+            <a:ext cx="1314550" cy="349624"/>
           </a:xfrm>
           <a:prstGeom prst="ellipse">
             <a:avLst/>
@@ -6137,258 +5173,6 @@
           <a:p>
             <a:pPr algn="ctr"/>
             <a:r>
-              <a:rPr lang="en-US" sz="1400" dirty="0" smtClean="0">
-                <a:solidFill>
-                  <a:schemeClr val="tx1"/>
-                </a:solidFill>
-              </a:rPr>
-              <a:t>population</a:t>
-            </a:r>
-            <a:endParaRPr lang="en-US" sz="1400" dirty="0">
-              <a:solidFill>
-                <a:schemeClr val="tx1"/>
-              </a:solidFill>
-            </a:endParaRPr>
-          </a:p>
-        </p:txBody>
-      </p:sp>
-      <p:sp>
-        <p:nvSpPr>
-          <p:cNvPr id="479" name="Oval 478"/>
-          <p:cNvSpPr/>
-          <p:nvPr/>
-        </p:nvSpPr>
-        <p:spPr>
-          <a:xfrm>
-            <a:off x="6870407" y="3762342"/>
-            <a:ext cx="1647231" cy="461712"/>
-          </a:xfrm>
-          <a:prstGeom prst="ellipse">
-            <a:avLst/>
-          </a:prstGeom>
-          <a:solidFill>
-            <a:schemeClr val="accent1">
-              <a:lumMod val="40000"/>
-              <a:lumOff val="60000"/>
-            </a:schemeClr>
-          </a:solidFill>
-          <a:ln>
-            <a:solidFill>
-              <a:schemeClr val="tx1"/>
-            </a:solidFill>
-          </a:ln>
-        </p:spPr>
-        <p:style>
-          <a:lnRef idx="2">
-            <a:schemeClr val="accent1">
-              <a:shade val="50000"/>
-            </a:schemeClr>
-          </a:lnRef>
-          <a:fillRef idx="1">
-            <a:schemeClr val="accent1"/>
-          </a:fillRef>
-          <a:effectRef idx="0">
-            <a:schemeClr val="accent1"/>
-          </a:effectRef>
-          <a:fontRef idx="minor">
-            <a:schemeClr val="lt1"/>
-          </a:fontRef>
-        </p:style>
-        <p:txBody>
-          <a:bodyPr rtlCol="0" anchor="ctr"/>
-          <a:lstStyle/>
-          <a:p>
-            <a:pPr algn="ctr"/>
-            <a:r>
-              <a:rPr lang="en-US" sz="1400" dirty="0" err="1" smtClean="0">
-                <a:solidFill>
-                  <a:schemeClr val="tx1"/>
-                </a:solidFill>
-              </a:rPr>
-              <a:t>region_Name</a:t>
-            </a:r>
-            <a:endParaRPr lang="en-US" sz="1400" dirty="0">
-              <a:solidFill>
-                <a:schemeClr val="tx1"/>
-              </a:solidFill>
-            </a:endParaRPr>
-          </a:p>
-        </p:txBody>
-      </p:sp>
-      <p:sp>
-        <p:nvSpPr>
-          <p:cNvPr id="480" name="Oval 479"/>
-          <p:cNvSpPr/>
-          <p:nvPr/>
-        </p:nvSpPr>
-        <p:spPr>
-          <a:xfrm>
-            <a:off x="6160756" y="6107501"/>
-            <a:ext cx="2089068" cy="440245"/>
-          </a:xfrm>
-          <a:prstGeom prst="ellipse">
-            <a:avLst/>
-          </a:prstGeom>
-          <a:solidFill>
-            <a:schemeClr val="accent1">
-              <a:lumMod val="40000"/>
-              <a:lumOff val="60000"/>
-            </a:schemeClr>
-          </a:solidFill>
-          <a:ln>
-            <a:solidFill>
-              <a:schemeClr val="tx1"/>
-            </a:solidFill>
-          </a:ln>
-        </p:spPr>
-        <p:style>
-          <a:lnRef idx="2">
-            <a:schemeClr val="accent1">
-              <a:shade val="50000"/>
-            </a:schemeClr>
-          </a:lnRef>
-          <a:fillRef idx="1">
-            <a:schemeClr val="accent1"/>
-          </a:fillRef>
-          <a:effectRef idx="0">
-            <a:schemeClr val="accent1"/>
-          </a:effectRef>
-          <a:fontRef idx="minor">
-            <a:schemeClr val="lt1"/>
-          </a:fontRef>
-        </p:style>
-        <p:txBody>
-          <a:bodyPr rtlCol="0" anchor="ctr"/>
-          <a:lstStyle/>
-          <a:p>
-            <a:pPr algn="ctr"/>
-            <a:r>
-              <a:rPr lang="en-US" sz="1400" u="sng" dirty="0" err="1" smtClean="0">
-                <a:solidFill>
-                  <a:schemeClr val="tx1"/>
-                </a:solidFill>
-              </a:rPr>
-              <a:t>continent_name</a:t>
-            </a:r>
-            <a:endParaRPr lang="en-US" sz="1400" u="sng" dirty="0">
-              <a:solidFill>
-                <a:schemeClr val="tx1"/>
-              </a:solidFill>
-            </a:endParaRPr>
-          </a:p>
-        </p:txBody>
-      </p:sp>
-      <p:sp>
-        <p:nvSpPr>
-          <p:cNvPr id="495" name="Oval 494"/>
-          <p:cNvSpPr/>
-          <p:nvPr/>
-        </p:nvSpPr>
-        <p:spPr>
-          <a:xfrm>
-            <a:off x="9943278" y="456016"/>
-            <a:ext cx="2257036" cy="347058"/>
-          </a:xfrm>
-          <a:prstGeom prst="ellipse">
-            <a:avLst/>
-          </a:prstGeom>
-          <a:solidFill>
-            <a:schemeClr val="accent1">
-              <a:lumMod val="40000"/>
-              <a:lumOff val="60000"/>
-            </a:schemeClr>
-          </a:solidFill>
-          <a:ln>
-            <a:solidFill>
-              <a:schemeClr val="tx1"/>
-            </a:solidFill>
-          </a:ln>
-        </p:spPr>
-        <p:style>
-          <a:lnRef idx="2">
-            <a:schemeClr val="accent1">
-              <a:shade val="50000"/>
-            </a:schemeClr>
-          </a:lnRef>
-          <a:fillRef idx="1">
-            <a:schemeClr val="accent1"/>
-          </a:fillRef>
-          <a:effectRef idx="0">
-            <a:schemeClr val="accent1"/>
-          </a:effectRef>
-          <a:fontRef idx="minor">
-            <a:schemeClr val="lt1"/>
-          </a:fontRef>
-        </p:style>
-        <p:txBody>
-          <a:bodyPr rtlCol="0" anchor="ctr"/>
-          <a:lstStyle/>
-          <a:p>
-            <a:pPr algn="ctr"/>
-            <a:r>
-              <a:rPr lang="en-US" sz="1400" dirty="0" err="1" smtClean="0">
-                <a:solidFill>
-                  <a:schemeClr val="tx1"/>
-                </a:solidFill>
-              </a:rPr>
-              <a:t>Governing_system</a:t>
-            </a:r>
-            <a:endParaRPr lang="en-US" sz="1400" dirty="0">
-              <a:solidFill>
-                <a:schemeClr val="tx1"/>
-              </a:solidFill>
-            </a:endParaRPr>
-          </a:p>
-        </p:txBody>
-      </p:sp>
-      <p:sp>
-        <p:nvSpPr>
-          <p:cNvPr id="543" name="Oval 542"/>
-          <p:cNvSpPr/>
-          <p:nvPr/>
-        </p:nvSpPr>
-        <p:spPr>
-          <a:xfrm>
-            <a:off x="1776130" y="6426336"/>
-            <a:ext cx="1314550" cy="349624"/>
-          </a:xfrm>
-          <a:prstGeom prst="ellipse">
-            <a:avLst/>
-          </a:prstGeom>
-          <a:solidFill>
-            <a:schemeClr val="accent1">
-              <a:lumMod val="40000"/>
-              <a:lumOff val="60000"/>
-            </a:schemeClr>
-          </a:solidFill>
-          <a:ln>
-            <a:solidFill>
-              <a:schemeClr val="tx1"/>
-            </a:solidFill>
-          </a:ln>
-        </p:spPr>
-        <p:style>
-          <a:lnRef idx="2">
-            <a:schemeClr val="accent1">
-              <a:shade val="50000"/>
-            </a:schemeClr>
-          </a:lnRef>
-          <a:fillRef idx="1">
-            <a:schemeClr val="accent1"/>
-          </a:fillRef>
-          <a:effectRef idx="0">
-            <a:schemeClr val="accent1"/>
-          </a:effectRef>
-          <a:fontRef idx="minor">
-            <a:schemeClr val="lt1"/>
-          </a:fontRef>
-        </p:style>
-        <p:txBody>
-          <a:bodyPr rtlCol="0" anchor="ctr"/>
-          <a:lstStyle/>
-          <a:p>
-            <a:pPr algn="ctr"/>
-            <a:r>
               <a:rPr lang="en-US" sz="1400" u="sng" dirty="0" smtClean="0">
                 <a:solidFill>
                   <a:schemeClr val="tx1"/>
@@ -6408,15 +5192,15 @@
         <p:nvCxnSpPr>
           <p:cNvPr id="545" name="Straight Connector 544"/>
           <p:cNvCxnSpPr>
-            <a:stCxn id="543" idx="1"/>
+            <a:stCxn id="543" idx="3"/>
             <a:endCxn id="144" idx="3"/>
           </p:cNvCxnSpPr>
           <p:nvPr/>
         </p:nvCxnSpPr>
         <p:spPr>
-          <a:xfrm flipH="1" flipV="1">
-            <a:off x="1246936" y="6025652"/>
-            <a:ext cx="721705" cy="451885"/>
+          <a:xfrm flipH="1">
+            <a:off x="9230531" y="5073365"/>
+            <a:ext cx="575272" cy="868610"/>
           </a:xfrm>
           <a:prstGeom prst="line">
             <a:avLst/>
@@ -6450,7 +5234,7 @@
         </p:nvSpPr>
         <p:spPr>
           <a:xfrm>
-            <a:off x="4460200" y="1784955"/>
+            <a:off x="5409198" y="1828238"/>
             <a:ext cx="1216241" cy="510466"/>
           </a:xfrm>
           <a:prstGeom prst="flowChartDecision">
@@ -6504,14 +5288,14 @@
       </p:sp>
       <p:sp>
         <p:nvSpPr>
-          <p:cNvPr id="36" name="Flowchart: Decision 35"/>
+          <p:cNvPr id="99" name="Flowchart: Decision 98"/>
           <p:cNvSpPr/>
           <p:nvPr/>
         </p:nvSpPr>
         <p:spPr>
           <a:xfrm>
-            <a:off x="8022744" y="667973"/>
-            <a:ext cx="983829" cy="559340"/>
+            <a:off x="9323346" y="2498446"/>
+            <a:ext cx="1710601" cy="592266"/>
           </a:xfrm>
           <a:prstGeom prst="flowChartDecision">
             <a:avLst/>
@@ -6552,7 +5336,7 @@
                   <a:schemeClr val="tx1"/>
                 </a:solidFill>
               </a:rPr>
-              <a:t>Part of</a:t>
+              <a:t>Subset Of</a:t>
             </a:r>
             <a:endParaRPr lang="en-US" sz="1400" dirty="0">
               <a:solidFill>
@@ -6564,14 +5348,14 @@
       </p:sp>
       <p:sp>
         <p:nvSpPr>
-          <p:cNvPr id="74" name="Flowchart: Decision 73"/>
+          <p:cNvPr id="153" name="Flowchart: Decision 152"/>
           <p:cNvSpPr/>
           <p:nvPr/>
         </p:nvSpPr>
         <p:spPr>
           <a:xfrm>
-            <a:off x="8974882" y="4873257"/>
-            <a:ext cx="1060021" cy="710214"/>
+            <a:off x="115772" y="4732475"/>
+            <a:ext cx="1250574" cy="536715"/>
           </a:xfrm>
           <a:prstGeom prst="flowChartDecision">
             <a:avLst/>
@@ -6612,7 +5396,7 @@
                   <a:schemeClr val="tx1"/>
                 </a:solidFill>
               </a:rPr>
-              <a:t>Part of </a:t>
+              <a:t>Rates</a:t>
             </a:r>
             <a:endParaRPr lang="en-US" sz="1400" dirty="0">
               <a:solidFill>
@@ -6624,14 +5408,14 @@
       </p:sp>
       <p:sp>
         <p:nvSpPr>
-          <p:cNvPr id="82" name="Flowchart: Decision 81"/>
+          <p:cNvPr id="107" name="Flowchart: Decision 106"/>
           <p:cNvSpPr/>
           <p:nvPr/>
         </p:nvSpPr>
         <p:spPr>
           <a:xfrm>
-            <a:off x="8151814" y="1964136"/>
-            <a:ext cx="1026675" cy="536882"/>
+            <a:off x="2387491" y="3020629"/>
+            <a:ext cx="1645746" cy="639145"/>
           </a:xfrm>
           <a:prstGeom prst="flowChartDecision">
             <a:avLst/>
@@ -6672,7 +5456,7 @@
                   <a:schemeClr val="tx1"/>
                 </a:solidFill>
               </a:rPr>
-              <a:t>Part of</a:t>
+              <a:t>Member of</a:t>
             </a:r>
             <a:endParaRPr lang="en-US" sz="1400" dirty="0">
               <a:solidFill>
@@ -6682,404 +5466,6 @@
           </a:p>
         </p:txBody>
       </p:sp>
-      <p:sp>
-        <p:nvSpPr>
-          <p:cNvPr id="92" name="Flowchart: Decision 91"/>
-          <p:cNvSpPr/>
-          <p:nvPr/>
-        </p:nvSpPr>
-        <p:spPr>
-          <a:xfrm>
-            <a:off x="11041778" y="1202010"/>
-            <a:ext cx="1166052" cy="575781"/>
-          </a:xfrm>
-          <a:prstGeom prst="flowChartDecision">
-            <a:avLst/>
-          </a:prstGeom>
-          <a:solidFill>
-            <a:srgbClr val="F4B183"/>
-          </a:solidFill>
-          <a:ln>
-            <a:solidFill>
-              <a:schemeClr val="tx1"/>
-            </a:solidFill>
-          </a:ln>
-        </p:spPr>
-        <p:style>
-          <a:lnRef idx="2">
-            <a:schemeClr val="accent1">
-              <a:shade val="50000"/>
-            </a:schemeClr>
-          </a:lnRef>
-          <a:fillRef idx="1">
-            <a:schemeClr val="accent1"/>
-          </a:fillRef>
-          <a:effectRef idx="0">
-            <a:schemeClr val="accent1"/>
-          </a:effectRef>
-          <a:fontRef idx="minor">
-            <a:schemeClr val="lt1"/>
-          </a:fontRef>
-        </p:style>
-        <p:txBody>
-          <a:bodyPr rtlCol="0" anchor="ctr"/>
-          <a:lstStyle/>
-          <a:p>
-            <a:pPr algn="ctr"/>
-            <a:r>
-              <a:rPr lang="en-US" sz="1400" dirty="0" smtClean="0">
-                <a:solidFill>
-                  <a:schemeClr val="tx1"/>
-                </a:solidFill>
-              </a:rPr>
-              <a:t>Allies with</a:t>
-            </a:r>
-            <a:endParaRPr lang="en-US" sz="1400" dirty="0">
-              <a:solidFill>
-                <a:schemeClr val="tx1"/>
-              </a:solidFill>
-            </a:endParaRPr>
-          </a:p>
-        </p:txBody>
-      </p:sp>
-      <p:sp>
-        <p:nvSpPr>
-          <p:cNvPr id="99" name="Flowchart: Decision 98"/>
-          <p:cNvSpPr/>
-          <p:nvPr/>
-        </p:nvSpPr>
-        <p:spPr>
-          <a:xfrm>
-            <a:off x="6259952" y="2296687"/>
-            <a:ext cx="1710601" cy="592266"/>
-          </a:xfrm>
-          <a:prstGeom prst="flowChartDecision">
-            <a:avLst/>
-          </a:prstGeom>
-          <a:solidFill>
-            <a:srgbClr val="F4B183"/>
-          </a:solidFill>
-          <a:ln>
-            <a:solidFill>
-              <a:schemeClr val="tx1"/>
-            </a:solidFill>
-          </a:ln>
-        </p:spPr>
-        <p:style>
-          <a:lnRef idx="2">
-            <a:schemeClr val="accent1">
-              <a:shade val="50000"/>
-            </a:schemeClr>
-          </a:lnRef>
-          <a:fillRef idx="1">
-            <a:schemeClr val="accent1"/>
-          </a:fillRef>
-          <a:effectRef idx="0">
-            <a:schemeClr val="accent1"/>
-          </a:effectRef>
-          <a:fontRef idx="minor">
-            <a:schemeClr val="lt1"/>
-          </a:fontRef>
-        </p:style>
-        <p:txBody>
-          <a:bodyPr rtlCol="0" anchor="ctr"/>
-          <a:lstStyle/>
-          <a:p>
-            <a:pPr algn="ctr"/>
-            <a:r>
-              <a:rPr lang="en-US" sz="1400" dirty="0" smtClean="0">
-                <a:solidFill>
-                  <a:schemeClr val="tx1"/>
-                </a:solidFill>
-              </a:rPr>
-              <a:t>Adjacent to</a:t>
-            </a:r>
-            <a:endParaRPr lang="en-US" sz="1400" dirty="0">
-              <a:solidFill>
-                <a:schemeClr val="tx1"/>
-              </a:solidFill>
-            </a:endParaRPr>
-          </a:p>
-        </p:txBody>
-      </p:sp>
-      <p:sp>
-        <p:nvSpPr>
-          <p:cNvPr id="153" name="Flowchart: Decision 152"/>
-          <p:cNvSpPr/>
-          <p:nvPr/>
-        </p:nvSpPr>
-        <p:spPr>
-          <a:xfrm>
-            <a:off x="134743" y="3691090"/>
-            <a:ext cx="1250574" cy="536715"/>
-          </a:xfrm>
-          <a:prstGeom prst="flowChartDecision">
-            <a:avLst/>
-          </a:prstGeom>
-          <a:solidFill>
-            <a:srgbClr val="F4B183"/>
-          </a:solidFill>
-          <a:ln>
-            <a:solidFill>
-              <a:schemeClr val="tx1"/>
-            </a:solidFill>
-          </a:ln>
-        </p:spPr>
-        <p:style>
-          <a:lnRef idx="2">
-            <a:schemeClr val="accent1">
-              <a:shade val="50000"/>
-            </a:schemeClr>
-          </a:lnRef>
-          <a:fillRef idx="1">
-            <a:schemeClr val="accent1"/>
-          </a:fillRef>
-          <a:effectRef idx="0">
-            <a:schemeClr val="accent1"/>
-          </a:effectRef>
-          <a:fontRef idx="minor">
-            <a:schemeClr val="lt1"/>
-          </a:fontRef>
-        </p:style>
-        <p:txBody>
-          <a:bodyPr rtlCol="0" anchor="ctr"/>
-          <a:lstStyle/>
-          <a:p>
-            <a:pPr algn="ctr"/>
-            <a:r>
-              <a:rPr lang="en-US" sz="1400" dirty="0" smtClean="0">
-                <a:solidFill>
-                  <a:schemeClr val="tx1"/>
-                </a:solidFill>
-              </a:rPr>
-              <a:t>Rates</a:t>
-            </a:r>
-            <a:endParaRPr lang="en-US" sz="1400" dirty="0">
-              <a:solidFill>
-                <a:schemeClr val="tx1"/>
-              </a:solidFill>
-            </a:endParaRPr>
-          </a:p>
-        </p:txBody>
-      </p:sp>
-      <p:sp>
-        <p:nvSpPr>
-          <p:cNvPr id="471" name="Flowchart: Decision 470"/>
-          <p:cNvSpPr/>
-          <p:nvPr/>
-        </p:nvSpPr>
-        <p:spPr>
-          <a:xfrm>
-            <a:off x="11319178" y="4952977"/>
-            <a:ext cx="1026675" cy="536882"/>
-          </a:xfrm>
-          <a:prstGeom prst="flowChartDecision">
-            <a:avLst/>
-          </a:prstGeom>
-          <a:solidFill>
-            <a:srgbClr val="F4B183"/>
-          </a:solidFill>
-          <a:ln>
-            <a:solidFill>
-              <a:schemeClr val="tx1"/>
-            </a:solidFill>
-          </a:ln>
-        </p:spPr>
-        <p:style>
-          <a:lnRef idx="2">
-            <a:schemeClr val="accent1">
-              <a:shade val="50000"/>
-            </a:schemeClr>
-          </a:lnRef>
-          <a:fillRef idx="1">
-            <a:schemeClr val="accent1"/>
-          </a:fillRef>
-          <a:effectRef idx="0">
-            <a:schemeClr val="accent1"/>
-          </a:effectRef>
-          <a:fontRef idx="minor">
-            <a:schemeClr val="lt1"/>
-          </a:fontRef>
-        </p:style>
-        <p:txBody>
-          <a:bodyPr rtlCol="0" anchor="ctr"/>
-          <a:lstStyle/>
-          <a:p>
-            <a:pPr algn="ctr"/>
-            <a:r>
-              <a:rPr lang="en-US" sz="1400" dirty="0" smtClean="0">
-                <a:solidFill>
-                  <a:schemeClr val="tx1"/>
-                </a:solidFill>
-              </a:rPr>
-              <a:t>Part of</a:t>
-            </a:r>
-            <a:endParaRPr lang="en-US" sz="1400" dirty="0">
-              <a:solidFill>
-                <a:schemeClr val="tx1"/>
-              </a:solidFill>
-            </a:endParaRPr>
-          </a:p>
-        </p:txBody>
-      </p:sp>
-      <p:sp>
-        <p:nvSpPr>
-          <p:cNvPr id="527" name="Flowchart: Decision 526"/>
-          <p:cNvSpPr/>
-          <p:nvPr/>
-        </p:nvSpPr>
-        <p:spPr>
-          <a:xfrm>
-            <a:off x="9988661" y="3976005"/>
-            <a:ext cx="1710601" cy="592266"/>
-          </a:xfrm>
-          <a:prstGeom prst="flowChartDecision">
-            <a:avLst/>
-          </a:prstGeom>
-          <a:solidFill>
-            <a:srgbClr val="F4B183"/>
-          </a:solidFill>
-          <a:ln>
-            <a:solidFill>
-              <a:schemeClr val="tx1"/>
-            </a:solidFill>
-          </a:ln>
-        </p:spPr>
-        <p:style>
-          <a:lnRef idx="2">
-            <a:schemeClr val="accent1">
-              <a:shade val="50000"/>
-            </a:schemeClr>
-          </a:lnRef>
-          <a:fillRef idx="1">
-            <a:schemeClr val="accent1"/>
-          </a:fillRef>
-          <a:effectRef idx="0">
-            <a:schemeClr val="accent1"/>
-          </a:effectRef>
-          <a:fontRef idx="minor">
-            <a:schemeClr val="lt1"/>
-          </a:fontRef>
-        </p:style>
-        <p:txBody>
-          <a:bodyPr rtlCol="0" anchor="ctr"/>
-          <a:lstStyle/>
-          <a:p>
-            <a:pPr algn="ctr"/>
-            <a:r>
-              <a:rPr lang="en-US" sz="1400" dirty="0" smtClean="0">
-                <a:solidFill>
-                  <a:schemeClr val="tx1"/>
-                </a:solidFill>
-              </a:rPr>
-              <a:t>Adjacent to</a:t>
-            </a:r>
-            <a:endParaRPr lang="en-US" sz="1400" dirty="0">
-              <a:solidFill>
-                <a:schemeClr val="tx1"/>
-              </a:solidFill>
-            </a:endParaRPr>
-          </a:p>
-        </p:txBody>
-      </p:sp>
-      <p:sp>
-        <p:nvSpPr>
-          <p:cNvPr id="107" name="Flowchart: Decision 106"/>
-          <p:cNvSpPr/>
-          <p:nvPr/>
-        </p:nvSpPr>
-        <p:spPr>
-          <a:xfrm>
-            <a:off x="2387491" y="3020629"/>
-            <a:ext cx="1645746" cy="639145"/>
-          </a:xfrm>
-          <a:prstGeom prst="flowChartDecision">
-            <a:avLst/>
-          </a:prstGeom>
-          <a:solidFill>
-            <a:srgbClr val="F4B183"/>
-          </a:solidFill>
-          <a:ln>
-            <a:solidFill>
-              <a:schemeClr val="tx1"/>
-            </a:solidFill>
-          </a:ln>
-        </p:spPr>
-        <p:style>
-          <a:lnRef idx="2">
-            <a:schemeClr val="accent1">
-              <a:shade val="50000"/>
-            </a:schemeClr>
-          </a:lnRef>
-          <a:fillRef idx="1">
-            <a:schemeClr val="accent1"/>
-          </a:fillRef>
-          <a:effectRef idx="0">
-            <a:schemeClr val="accent1"/>
-          </a:effectRef>
-          <a:fontRef idx="minor">
-            <a:schemeClr val="lt1"/>
-          </a:fontRef>
-        </p:style>
-        <p:txBody>
-          <a:bodyPr rtlCol="0" anchor="ctr"/>
-          <a:lstStyle/>
-          <a:p>
-            <a:pPr algn="ctr"/>
-            <a:r>
-              <a:rPr lang="en-US" sz="1400" dirty="0" smtClean="0">
-                <a:solidFill>
-                  <a:schemeClr val="tx1"/>
-                </a:solidFill>
-              </a:rPr>
-              <a:t>Member of</a:t>
-            </a:r>
-            <a:endParaRPr lang="en-US" sz="1400" dirty="0">
-              <a:solidFill>
-                <a:schemeClr val="tx1"/>
-              </a:solidFill>
-            </a:endParaRPr>
-          </a:p>
-        </p:txBody>
-      </p:sp>
-      <p:cxnSp>
-        <p:nvCxnSpPr>
-          <p:cNvPr id="35" name="Straight Connector 34"/>
-          <p:cNvCxnSpPr>
-            <a:stCxn id="144" idx="0"/>
-            <a:endCxn id="153" idx="2"/>
-          </p:cNvCxnSpPr>
-          <p:nvPr/>
-        </p:nvCxnSpPr>
-        <p:spPr>
-          <a:xfrm flipV="1">
-            <a:off x="751848" y="4227805"/>
-            <a:ext cx="8182" cy="1385035"/>
-          </a:xfrm>
-          <a:prstGeom prst="line">
-            <a:avLst/>
-          </a:prstGeom>
-          <a:ln>
-            <a:solidFill>
-              <a:schemeClr val="tx1"/>
-            </a:solidFill>
-          </a:ln>
-        </p:spPr>
-        <p:style>
-          <a:lnRef idx="1">
-            <a:schemeClr val="accent1"/>
-          </a:lnRef>
-          <a:fillRef idx="0">
-            <a:schemeClr val="accent1"/>
-          </a:fillRef>
-          <a:effectRef idx="0">
-            <a:schemeClr val="accent1"/>
-          </a:effectRef>
-          <a:fontRef idx="minor">
-            <a:schemeClr val="tx1"/>
-          </a:fontRef>
-        </p:style>
-      </p:cxnSp>
       <p:cxnSp>
         <p:nvCxnSpPr>
           <p:cNvPr id="38" name="Straight Connector 37"/>
@@ -7091,8 +5477,8 @@
         </p:nvCxnSpPr>
         <p:spPr>
           <a:xfrm flipH="1">
-            <a:off x="760030" y="2314119"/>
-            <a:ext cx="1324" cy="1376971"/>
+            <a:off x="741059" y="2314119"/>
+            <a:ext cx="20295" cy="2418356"/>
           </a:xfrm>
           <a:prstGeom prst="line">
             <a:avLst/>
@@ -7129,235 +5515,10 @@
         </p:nvCxnSpPr>
         <p:spPr>
           <a:xfrm flipV="1">
-            <a:off x="5676441" y="1461609"/>
-            <a:ext cx="908685" cy="578579"/>
+            <a:off x="6625439" y="1447510"/>
+            <a:ext cx="3076804" cy="635961"/>
           </a:xfrm>
           <a:prstGeom prst="bentConnector3">
-            <a:avLst/>
-          </a:prstGeom>
-          <a:ln>
-            <a:solidFill>
-              <a:schemeClr val="tx1"/>
-            </a:solidFill>
-          </a:ln>
-        </p:spPr>
-        <p:style>
-          <a:lnRef idx="1">
-            <a:schemeClr val="accent1"/>
-          </a:lnRef>
-          <a:fillRef idx="0">
-            <a:schemeClr val="accent1"/>
-          </a:fillRef>
-          <a:effectRef idx="0">
-            <a:schemeClr val="accent1"/>
-          </a:effectRef>
-          <a:fontRef idx="minor">
-            <a:schemeClr val="tx1"/>
-          </a:fontRef>
-        </p:style>
-      </p:cxnSp>
-      <p:cxnSp>
-        <p:nvCxnSpPr>
-          <p:cNvPr id="68" name="Straight Connector 67"/>
-          <p:cNvCxnSpPr>
-            <a:stCxn id="92" idx="0"/>
-            <a:endCxn id="292" idx="3"/>
-          </p:cNvCxnSpPr>
-          <p:nvPr/>
-        </p:nvCxnSpPr>
-        <p:spPr>
-          <a:xfrm flipH="1">
-            <a:off x="10534225" y="1202010"/>
-            <a:ext cx="1090579" cy="250133"/>
-          </a:xfrm>
-          <a:prstGeom prst="line">
-            <a:avLst/>
-          </a:prstGeom>
-          <a:ln>
-            <a:solidFill>
-              <a:schemeClr val="tx1"/>
-            </a:solidFill>
-          </a:ln>
-        </p:spPr>
-        <p:style>
-          <a:lnRef idx="1">
-            <a:schemeClr val="accent1"/>
-          </a:lnRef>
-          <a:fillRef idx="0">
-            <a:schemeClr val="accent1"/>
-          </a:fillRef>
-          <a:effectRef idx="0">
-            <a:schemeClr val="accent1"/>
-          </a:effectRef>
-          <a:fontRef idx="minor">
-            <a:schemeClr val="tx1"/>
-          </a:fontRef>
-        </p:style>
-      </p:cxnSp>
-      <p:cxnSp>
-        <p:nvCxnSpPr>
-          <p:cNvPr id="72" name="Straight Connector 71"/>
-          <p:cNvCxnSpPr>
-            <a:stCxn id="293" idx="3"/>
-            <a:endCxn id="92" idx="2"/>
-          </p:cNvCxnSpPr>
-          <p:nvPr/>
-        </p:nvCxnSpPr>
-        <p:spPr>
-          <a:xfrm>
-            <a:off x="10543682" y="1694126"/>
-            <a:ext cx="1081122" cy="83665"/>
-          </a:xfrm>
-          <a:prstGeom prst="line">
-            <a:avLst/>
-          </a:prstGeom>
-          <a:ln>
-            <a:solidFill>
-              <a:schemeClr val="tx1"/>
-            </a:solidFill>
-          </a:ln>
-        </p:spPr>
-        <p:style>
-          <a:lnRef idx="1">
-            <a:schemeClr val="accent1"/>
-          </a:lnRef>
-          <a:fillRef idx="0">
-            <a:schemeClr val="accent1"/>
-          </a:fillRef>
-          <a:effectRef idx="0">
-            <a:schemeClr val="accent1"/>
-          </a:effectRef>
-          <a:fontRef idx="minor">
-            <a:schemeClr val="tx1"/>
-          </a:fontRef>
-        </p:style>
-      </p:cxnSp>
-      <p:cxnSp>
-        <p:nvCxnSpPr>
-          <p:cNvPr id="75" name="Straight Connector 74"/>
-          <p:cNvCxnSpPr>
-            <a:stCxn id="527" idx="0"/>
-            <a:endCxn id="281" idx="3"/>
-          </p:cNvCxnSpPr>
-          <p:nvPr/>
-        </p:nvCxnSpPr>
-        <p:spPr>
-          <a:xfrm flipH="1">
-            <a:off x="9962076" y="3976005"/>
-            <a:ext cx="881886" cy="78266"/>
-          </a:xfrm>
-          <a:prstGeom prst="line">
-            <a:avLst/>
-          </a:prstGeom>
-          <a:ln>
-            <a:solidFill>
-              <a:schemeClr val="tx1"/>
-            </a:solidFill>
-          </a:ln>
-        </p:spPr>
-        <p:style>
-          <a:lnRef idx="1">
-            <a:schemeClr val="accent1"/>
-          </a:lnRef>
-          <a:fillRef idx="0">
-            <a:schemeClr val="accent1"/>
-          </a:fillRef>
-          <a:effectRef idx="0">
-            <a:schemeClr val="accent1"/>
-          </a:effectRef>
-          <a:fontRef idx="minor">
-            <a:schemeClr val="tx1"/>
-          </a:fontRef>
-        </p:style>
-      </p:cxnSp>
-      <p:cxnSp>
-        <p:nvCxnSpPr>
-          <p:cNvPr id="77" name="Straight Connector 76"/>
-          <p:cNvCxnSpPr>
-            <a:stCxn id="527" idx="2"/>
-            <a:endCxn id="282" idx="3"/>
-          </p:cNvCxnSpPr>
-          <p:nvPr/>
-        </p:nvCxnSpPr>
-        <p:spPr>
-          <a:xfrm flipH="1" flipV="1">
-            <a:off x="9952110" y="4489307"/>
-            <a:ext cx="891852" cy="78964"/>
-          </a:xfrm>
-          <a:prstGeom prst="line">
-            <a:avLst/>
-          </a:prstGeom>
-          <a:ln>
-            <a:solidFill>
-              <a:schemeClr val="tx1"/>
-            </a:solidFill>
-          </a:ln>
-        </p:spPr>
-        <p:style>
-          <a:lnRef idx="1">
-            <a:schemeClr val="accent1"/>
-          </a:lnRef>
-          <a:fillRef idx="0">
-            <a:schemeClr val="accent1"/>
-          </a:fillRef>
-          <a:effectRef idx="0">
-            <a:schemeClr val="accent1"/>
-          </a:effectRef>
-          <a:fontRef idx="minor">
-            <a:schemeClr val="tx1"/>
-          </a:fontRef>
-        </p:style>
-      </p:cxnSp>
-      <p:cxnSp>
-        <p:nvCxnSpPr>
-          <p:cNvPr id="81" name="Straight Connector 80"/>
-          <p:cNvCxnSpPr>
-            <a:stCxn id="74" idx="2"/>
-            <a:endCxn id="71" idx="0"/>
-          </p:cNvCxnSpPr>
-          <p:nvPr/>
-        </p:nvCxnSpPr>
-        <p:spPr>
-          <a:xfrm flipH="1">
-            <a:off x="9498750" y="5583471"/>
-            <a:ext cx="6143" cy="284354"/>
-          </a:xfrm>
-          <a:prstGeom prst="line">
-            <a:avLst/>
-          </a:prstGeom>
-          <a:ln>
-            <a:solidFill>
-              <a:schemeClr val="tx1"/>
-            </a:solidFill>
-          </a:ln>
-        </p:spPr>
-        <p:style>
-          <a:lnRef idx="1">
-            <a:schemeClr val="accent1"/>
-          </a:lnRef>
-          <a:fillRef idx="0">
-            <a:schemeClr val="accent1"/>
-          </a:fillRef>
-          <a:effectRef idx="0">
-            <a:schemeClr val="accent1"/>
-          </a:effectRef>
-          <a:fontRef idx="minor">
-            <a:schemeClr val="tx1"/>
-          </a:fontRef>
-        </p:style>
-      </p:cxnSp>
-      <p:cxnSp>
-        <p:nvCxnSpPr>
-          <p:cNvPr id="171" name="Straight Connector 170"/>
-          <p:cNvCxnSpPr/>
-          <p:nvPr/>
-        </p:nvCxnSpPr>
-        <p:spPr>
-          <a:xfrm>
-            <a:off x="9515528" y="4676096"/>
-            <a:ext cx="6143" cy="197161"/>
-          </a:xfrm>
-          <a:prstGeom prst="line">
             <a:avLst/>
           </a:prstGeom>
           <a:ln>
@@ -7393,7 +5554,7 @@
         <p:spPr>
           <a:xfrm>
             <a:off x="1301221" y="1901308"/>
-            <a:ext cx="3158979" cy="138880"/>
+            <a:ext cx="4107977" cy="182163"/>
           </a:xfrm>
           <a:prstGeom prst="bentConnector3">
             <a:avLst/>
@@ -7427,7 +5588,7 @@
         </p:nvSpPr>
         <p:spPr>
           <a:xfrm>
-            <a:off x="5901426" y="2509875"/>
+            <a:off x="8964820" y="2711634"/>
             <a:ext cx="421910" cy="369332"/>
           </a:xfrm>
           <a:prstGeom prst="rect">
@@ -7452,192 +5613,6 @@
           </a:p>
         </p:txBody>
       </p:sp>
-      <p:cxnSp>
-        <p:nvCxnSpPr>
-          <p:cNvPr id="158" name="Elbow Connector 157"/>
-          <p:cNvCxnSpPr/>
-          <p:nvPr/>
-        </p:nvCxnSpPr>
-        <p:spPr>
-          <a:xfrm>
-            <a:off x="7690575" y="1487487"/>
-            <a:ext cx="940073" cy="502527"/>
-          </a:xfrm>
-          <a:prstGeom prst="bentConnector2">
-            <a:avLst/>
-          </a:prstGeom>
-          <a:ln>
-            <a:solidFill>
-              <a:schemeClr val="tx1"/>
-            </a:solidFill>
-          </a:ln>
-        </p:spPr>
-        <p:style>
-          <a:lnRef idx="1">
-            <a:schemeClr val="accent1"/>
-          </a:lnRef>
-          <a:fillRef idx="0">
-            <a:schemeClr val="accent1"/>
-          </a:fillRef>
-          <a:effectRef idx="0">
-            <a:schemeClr val="accent1"/>
-          </a:effectRef>
-          <a:fontRef idx="minor">
-            <a:schemeClr val="tx1"/>
-          </a:fontRef>
-        </p:style>
-      </p:cxnSp>
-      <p:cxnSp>
-        <p:nvCxnSpPr>
-          <p:cNvPr id="164" name="Elbow Connector 163"/>
-          <p:cNvCxnSpPr>
-            <a:stCxn id="82" idx="2"/>
-            <a:endCxn id="70" idx="0"/>
-          </p:cNvCxnSpPr>
-          <p:nvPr/>
-        </p:nvCxnSpPr>
-        <p:spPr>
-          <a:xfrm rot="16200000" flipH="1">
-            <a:off x="8407224" y="2758946"/>
-            <a:ext cx="1349455" cy="833598"/>
-          </a:xfrm>
-          <a:prstGeom prst="bentConnector3">
-            <a:avLst/>
-          </a:prstGeom>
-          <a:ln>
-            <a:solidFill>
-              <a:schemeClr val="tx1"/>
-            </a:solidFill>
-          </a:ln>
-        </p:spPr>
-        <p:style>
-          <a:lnRef idx="1">
-            <a:schemeClr val="accent1"/>
-          </a:lnRef>
-          <a:fillRef idx="0">
-            <a:schemeClr val="accent1"/>
-          </a:fillRef>
-          <a:effectRef idx="0">
-            <a:schemeClr val="accent1"/>
-          </a:effectRef>
-          <a:fontRef idx="minor">
-            <a:schemeClr val="tx1"/>
-          </a:fontRef>
-        </p:style>
-      </p:cxnSp>
-      <p:cxnSp>
-        <p:nvCxnSpPr>
-          <p:cNvPr id="168" name="Elbow Connector 167"/>
-          <p:cNvCxnSpPr/>
-          <p:nvPr/>
-        </p:nvCxnSpPr>
-        <p:spPr>
-          <a:xfrm flipV="1">
-            <a:off x="7681672" y="982147"/>
-            <a:ext cx="375576" cy="339096"/>
-          </a:xfrm>
-          <a:prstGeom prst="bentConnector3">
-            <a:avLst/>
-          </a:prstGeom>
-          <a:ln>
-            <a:solidFill>
-              <a:schemeClr val="tx1"/>
-            </a:solidFill>
-          </a:ln>
-        </p:spPr>
-        <p:style>
-          <a:lnRef idx="1">
-            <a:schemeClr val="accent1"/>
-          </a:lnRef>
-          <a:fillRef idx="0">
-            <a:schemeClr val="accent1"/>
-          </a:fillRef>
-          <a:effectRef idx="0">
-            <a:schemeClr val="accent1"/>
-          </a:effectRef>
-          <a:fontRef idx="minor">
-            <a:schemeClr val="tx1"/>
-          </a:fontRef>
-        </p:style>
-      </p:cxnSp>
-      <p:cxnSp>
-        <p:nvCxnSpPr>
-          <p:cNvPr id="174" name="Elbow Connector 173"/>
-          <p:cNvCxnSpPr>
-            <a:stCxn id="36" idx="3"/>
-            <a:endCxn id="178" idx="1"/>
-          </p:cNvCxnSpPr>
-          <p:nvPr/>
-        </p:nvCxnSpPr>
-        <p:spPr>
-          <a:xfrm>
-            <a:off x="9006573" y="947643"/>
-            <a:ext cx="441114" cy="468793"/>
-          </a:xfrm>
-          <a:prstGeom prst="bentConnector3">
-            <a:avLst>
-              <a:gd name="adj1" fmla="val 50000"/>
-            </a:avLst>
-          </a:prstGeom>
-          <a:ln>
-            <a:solidFill>
-              <a:schemeClr val="tx1"/>
-            </a:solidFill>
-          </a:ln>
-        </p:spPr>
-        <p:style>
-          <a:lnRef idx="1">
-            <a:schemeClr val="accent1"/>
-          </a:lnRef>
-          <a:fillRef idx="0">
-            <a:schemeClr val="accent1"/>
-          </a:fillRef>
-          <a:effectRef idx="0">
-            <a:schemeClr val="accent1"/>
-          </a:effectRef>
-          <a:fontRef idx="minor">
-            <a:schemeClr val="tx1"/>
-          </a:fontRef>
-        </p:style>
-      </p:cxnSp>
-      <p:cxnSp>
-        <p:nvCxnSpPr>
-          <p:cNvPr id="228" name="Elbow Connector 227"/>
-          <p:cNvCxnSpPr>
-            <a:stCxn id="471" idx="2"/>
-            <a:endCxn id="71" idx="3"/>
-          </p:cNvCxnSpPr>
-          <p:nvPr/>
-        </p:nvCxnSpPr>
-        <p:spPr>
-          <a:xfrm rot="5400000">
-            <a:off x="10550782" y="4998903"/>
-            <a:ext cx="790778" cy="1772690"/>
-          </a:xfrm>
-          <a:prstGeom prst="bentConnector2">
-            <a:avLst/>
-          </a:prstGeom>
-          <a:ln>
-            <a:solidFill>
-              <a:schemeClr val="tx1"/>
-            </a:solidFill>
-          </a:ln>
-        </p:spPr>
-        <p:style>
-          <a:lnRef idx="1">
-            <a:schemeClr val="accent1"/>
-          </a:lnRef>
-          <a:fillRef idx="0">
-            <a:schemeClr val="accent1"/>
-          </a:fillRef>
-          <a:effectRef idx="0">
-            <a:schemeClr val="accent1"/>
-          </a:effectRef>
-          <a:fontRef idx="minor">
-            <a:schemeClr val="tx1"/>
-          </a:fontRef>
-        </p:style>
-      </p:cxnSp>
       <p:sp>
         <p:nvSpPr>
           <p:cNvPr id="5" name="Rectangle 4"/>
@@ -7703,14 +5678,14 @@
       </p:sp>
       <p:sp>
         <p:nvSpPr>
-          <p:cNvPr id="9" name="Rectangle 8"/>
+          <p:cNvPr id="144" name="Rectangle 143"/>
           <p:cNvSpPr/>
           <p:nvPr/>
         </p:nvSpPr>
         <p:spPr>
           <a:xfrm>
-            <a:off x="9447687" y="1184639"/>
-            <a:ext cx="1094694" cy="825623"/>
+            <a:off x="8240355" y="5529163"/>
+            <a:ext cx="990176" cy="825623"/>
           </a:xfrm>
           <a:prstGeom prst="rect">
             <a:avLst/>
@@ -7754,7 +5729,7 @@
                   <a:schemeClr val="tx1"/>
                 </a:solidFill>
               </a:rPr>
-              <a:t>Country</a:t>
+              <a:t>User</a:t>
             </a:r>
             <a:endParaRPr lang="en-US" dirty="0">
               <a:solidFill>
@@ -7766,14 +5741,14 @@
       </p:sp>
       <p:sp>
         <p:nvSpPr>
-          <p:cNvPr id="70" name="Rectangle 69"/>
+          <p:cNvPr id="179" name="Rectangle 178"/>
           <p:cNvSpPr/>
           <p:nvPr/>
         </p:nvSpPr>
         <p:spPr>
           <a:xfrm>
-            <a:off x="9032934" y="3850473"/>
-            <a:ext cx="931632" cy="825623"/>
+            <a:off x="5251513" y="3180635"/>
+            <a:ext cx="1108726" cy="825623"/>
           </a:xfrm>
           <a:prstGeom prst="rect">
             <a:avLst/>
@@ -7817,7 +5792,7 @@
                   <a:schemeClr val="tx1"/>
                 </a:solidFill>
               </a:rPr>
-              <a:t>Region</a:t>
+              <a:t>Political Party</a:t>
             </a:r>
             <a:endParaRPr lang="en-US" dirty="0">
               <a:solidFill>
@@ -7829,436 +5804,13 @@
       </p:sp>
       <p:sp>
         <p:nvSpPr>
-          <p:cNvPr id="71" name="Rectangle 70"/>
-          <p:cNvSpPr/>
-          <p:nvPr/>
-        </p:nvSpPr>
-        <p:spPr>
-          <a:xfrm>
-            <a:off x="8937674" y="5867825"/>
-            <a:ext cx="1122152" cy="825623"/>
-          </a:xfrm>
-          <a:prstGeom prst="rect">
-            <a:avLst/>
-          </a:prstGeom>
-          <a:solidFill>
-            <a:schemeClr val="accent6">
-              <a:lumMod val="60000"/>
-              <a:lumOff val="40000"/>
-            </a:schemeClr>
-          </a:solidFill>
-          <a:ln>
-            <a:solidFill>
-              <a:schemeClr val="tx1"/>
-            </a:solidFill>
-          </a:ln>
-        </p:spPr>
-        <p:style>
-          <a:lnRef idx="2">
-            <a:schemeClr val="accent1">
-              <a:shade val="50000"/>
-            </a:schemeClr>
-          </a:lnRef>
-          <a:fillRef idx="1">
-            <a:schemeClr val="accent1"/>
-          </a:fillRef>
-          <a:effectRef idx="0">
-            <a:schemeClr val="accent1"/>
-          </a:effectRef>
-          <a:fontRef idx="minor">
-            <a:schemeClr val="lt1"/>
-          </a:fontRef>
-        </p:style>
-        <p:txBody>
-          <a:bodyPr rtlCol="0" anchor="ctr"/>
-          <a:lstStyle/>
-          <a:p>
-            <a:pPr algn="ctr"/>
-            <a:r>
-              <a:rPr lang="en-US" dirty="0" smtClean="0">
-                <a:solidFill>
-                  <a:schemeClr val="tx1"/>
-                </a:solidFill>
-              </a:rPr>
-              <a:t>Continent</a:t>
-            </a:r>
-            <a:endParaRPr lang="en-US" dirty="0">
-              <a:solidFill>
-                <a:schemeClr val="tx1"/>
-              </a:solidFill>
-            </a:endParaRPr>
-          </a:p>
-        </p:txBody>
-      </p:sp>
-      <p:sp>
-        <p:nvSpPr>
-          <p:cNvPr id="144" name="Rectangle 143"/>
-          <p:cNvSpPr/>
-          <p:nvPr/>
-        </p:nvSpPr>
-        <p:spPr>
-          <a:xfrm>
-            <a:off x="256760" y="5612840"/>
-            <a:ext cx="990176" cy="825623"/>
-          </a:xfrm>
-          <a:prstGeom prst="rect">
-            <a:avLst/>
-          </a:prstGeom>
-          <a:solidFill>
-            <a:schemeClr val="accent6">
-              <a:lumMod val="60000"/>
-              <a:lumOff val="40000"/>
-            </a:schemeClr>
-          </a:solidFill>
-          <a:ln>
-            <a:solidFill>
-              <a:schemeClr val="tx1"/>
-            </a:solidFill>
-          </a:ln>
-        </p:spPr>
-        <p:style>
-          <a:lnRef idx="2">
-            <a:schemeClr val="accent1">
-              <a:shade val="50000"/>
-            </a:schemeClr>
-          </a:lnRef>
-          <a:fillRef idx="1">
-            <a:schemeClr val="accent1"/>
-          </a:fillRef>
-          <a:effectRef idx="0">
-            <a:schemeClr val="accent1"/>
-          </a:effectRef>
-          <a:fontRef idx="minor">
-            <a:schemeClr val="lt1"/>
-          </a:fontRef>
-        </p:style>
-        <p:txBody>
-          <a:bodyPr rtlCol="0" anchor="ctr"/>
-          <a:lstStyle/>
-          <a:p>
-            <a:pPr algn="ctr"/>
-            <a:r>
-              <a:rPr lang="en-US" dirty="0" smtClean="0">
-                <a:solidFill>
-                  <a:schemeClr val="tx1"/>
-                </a:solidFill>
-              </a:rPr>
-              <a:t>User</a:t>
-            </a:r>
-            <a:endParaRPr lang="en-US" dirty="0">
-              <a:solidFill>
-                <a:schemeClr val="tx1"/>
-              </a:solidFill>
-            </a:endParaRPr>
-          </a:p>
-        </p:txBody>
-      </p:sp>
-      <p:sp>
-        <p:nvSpPr>
-          <p:cNvPr id="179" name="Rectangle 178"/>
-          <p:cNvSpPr/>
-          <p:nvPr/>
-        </p:nvSpPr>
-        <p:spPr>
-          <a:xfrm>
-            <a:off x="4703658" y="3168328"/>
-            <a:ext cx="1108726" cy="825623"/>
-          </a:xfrm>
-          <a:prstGeom prst="rect">
-            <a:avLst/>
-          </a:prstGeom>
-          <a:solidFill>
-            <a:schemeClr val="accent6">
-              <a:lumMod val="60000"/>
-              <a:lumOff val="40000"/>
-            </a:schemeClr>
-          </a:solidFill>
-          <a:ln>
-            <a:solidFill>
-              <a:schemeClr val="tx1"/>
-            </a:solidFill>
-          </a:ln>
-        </p:spPr>
-        <p:style>
-          <a:lnRef idx="2">
-            <a:schemeClr val="accent1">
-              <a:shade val="50000"/>
-            </a:schemeClr>
-          </a:lnRef>
-          <a:fillRef idx="1">
-            <a:schemeClr val="accent1"/>
-          </a:fillRef>
-          <a:effectRef idx="0">
-            <a:schemeClr val="accent1"/>
-          </a:effectRef>
-          <a:fontRef idx="minor">
-            <a:schemeClr val="lt1"/>
-          </a:fontRef>
-        </p:style>
-        <p:txBody>
-          <a:bodyPr rtlCol="0" anchor="ctr"/>
-          <a:lstStyle/>
-          <a:p>
-            <a:pPr algn="ctr"/>
-            <a:r>
-              <a:rPr lang="en-US" dirty="0" smtClean="0">
-                <a:solidFill>
-                  <a:schemeClr val="tx1"/>
-                </a:solidFill>
-              </a:rPr>
-              <a:t>Political Party</a:t>
-            </a:r>
-            <a:endParaRPr lang="en-US" dirty="0">
-              <a:solidFill>
-                <a:schemeClr val="tx1"/>
-              </a:solidFill>
-            </a:endParaRPr>
-          </a:p>
-        </p:txBody>
-      </p:sp>
-      <p:sp>
-        <p:nvSpPr>
-          <p:cNvPr id="376" name="TextBox 375"/>
-          <p:cNvSpPr txBox="1"/>
-          <p:nvPr/>
-        </p:nvSpPr>
-        <p:spPr>
-          <a:xfrm>
-            <a:off x="11165931" y="1682186"/>
-            <a:ext cx="306494" cy="369332"/>
-          </a:xfrm>
-          <a:prstGeom prst="rect">
-            <a:avLst/>
-          </a:prstGeom>
-          <a:noFill/>
-          <a:ln>
-            <a:noFill/>
-          </a:ln>
-        </p:spPr>
-        <p:txBody>
-          <a:bodyPr wrap="none" rtlCol="0">
-            <a:spAutoFit/>
-          </a:bodyPr>
-          <a:lstStyle/>
-          <a:p>
-            <a:r>
-              <a:rPr lang="en-US" dirty="0" smtClean="0"/>
-              <a:t>n</a:t>
-            </a:r>
-            <a:endParaRPr lang="en-US" dirty="0"/>
-          </a:p>
-        </p:txBody>
-      </p:sp>
-      <p:sp>
-        <p:nvSpPr>
-          <p:cNvPr id="377" name="TextBox 376"/>
-          <p:cNvSpPr txBox="1"/>
-          <p:nvPr/>
-        </p:nvSpPr>
-        <p:spPr>
-          <a:xfrm>
-            <a:off x="11043382" y="922981"/>
-            <a:ext cx="421910" cy="369332"/>
-          </a:xfrm>
-          <a:prstGeom prst="rect">
-            <a:avLst/>
-          </a:prstGeom>
-          <a:noFill/>
-          <a:ln>
-            <a:noFill/>
-          </a:ln>
-        </p:spPr>
-        <p:txBody>
-          <a:bodyPr wrap="none" rtlCol="0">
-            <a:spAutoFit/>
-          </a:bodyPr>
-          <a:lstStyle/>
-          <a:p>
-            <a:r>
-              <a:rPr lang="en-US" dirty="0" smtClean="0"/>
-              <a:t> m</a:t>
-            </a:r>
-            <a:endParaRPr lang="en-US" dirty="0"/>
-          </a:p>
-        </p:txBody>
-      </p:sp>
-      <p:cxnSp>
-        <p:nvCxnSpPr>
-          <p:cNvPr id="432" name="Straight Connector 431"/>
-          <p:cNvCxnSpPr/>
-          <p:nvPr/>
-        </p:nvCxnSpPr>
-        <p:spPr>
-          <a:xfrm>
-            <a:off x="9473583" y="4676096"/>
-            <a:ext cx="6143" cy="197161"/>
-          </a:xfrm>
-          <a:prstGeom prst="line">
-            <a:avLst/>
-          </a:prstGeom>
-          <a:ln>
-            <a:solidFill>
-              <a:schemeClr val="tx1"/>
-            </a:solidFill>
-          </a:ln>
-        </p:spPr>
-        <p:style>
-          <a:lnRef idx="1">
-            <a:schemeClr val="accent1"/>
-          </a:lnRef>
-          <a:fillRef idx="0">
-            <a:schemeClr val="accent1"/>
-          </a:fillRef>
-          <a:effectRef idx="0">
-            <a:schemeClr val="accent1"/>
-          </a:effectRef>
-          <a:fontRef idx="minor">
-            <a:schemeClr val="tx1"/>
-          </a:fontRef>
-        </p:style>
-      </p:cxnSp>
-      <p:cxnSp>
-        <p:nvCxnSpPr>
-          <p:cNvPr id="436" name="Elbow Connector 435"/>
-          <p:cNvCxnSpPr/>
-          <p:nvPr/>
-        </p:nvCxnSpPr>
-        <p:spPr>
-          <a:xfrm>
-            <a:off x="7725079" y="1461609"/>
-            <a:ext cx="940073" cy="502527"/>
-          </a:xfrm>
-          <a:prstGeom prst="bentConnector2">
-            <a:avLst/>
-          </a:prstGeom>
-          <a:ln>
-            <a:solidFill>
-              <a:schemeClr val="tx1"/>
-            </a:solidFill>
-          </a:ln>
-        </p:spPr>
-        <p:style>
-          <a:lnRef idx="1">
-            <a:schemeClr val="accent1"/>
-          </a:lnRef>
-          <a:fillRef idx="0">
-            <a:schemeClr val="accent1"/>
-          </a:fillRef>
-          <a:effectRef idx="0">
-            <a:schemeClr val="accent1"/>
-          </a:effectRef>
-          <a:fontRef idx="minor">
-            <a:schemeClr val="tx1"/>
-          </a:fontRef>
-        </p:style>
-      </p:cxnSp>
-      <p:cxnSp>
-        <p:nvCxnSpPr>
-          <p:cNvPr id="444" name="Elbow Connector 443"/>
-          <p:cNvCxnSpPr/>
-          <p:nvPr/>
-        </p:nvCxnSpPr>
-        <p:spPr>
-          <a:xfrm flipV="1">
-            <a:off x="7647168" y="947643"/>
-            <a:ext cx="375576" cy="339096"/>
-          </a:xfrm>
-          <a:prstGeom prst="bentConnector3">
-            <a:avLst/>
-          </a:prstGeom>
-          <a:ln>
-            <a:solidFill>
-              <a:schemeClr val="tx1"/>
-            </a:solidFill>
-          </a:ln>
-        </p:spPr>
-        <p:style>
-          <a:lnRef idx="1">
-            <a:schemeClr val="accent1"/>
-          </a:lnRef>
-          <a:fillRef idx="0">
-            <a:schemeClr val="accent1"/>
-          </a:fillRef>
-          <a:effectRef idx="0">
-            <a:schemeClr val="accent1"/>
-          </a:effectRef>
-          <a:fontRef idx="minor">
-            <a:schemeClr val="tx1"/>
-          </a:fontRef>
-        </p:style>
-      </p:cxnSp>
-      <p:sp>
-        <p:nvSpPr>
-          <p:cNvPr id="10" name="Rectangle 9"/>
-          <p:cNvSpPr/>
-          <p:nvPr/>
-        </p:nvSpPr>
-        <p:spPr>
-          <a:xfrm>
-            <a:off x="6585126" y="1048797"/>
-            <a:ext cx="1139953" cy="825623"/>
-          </a:xfrm>
-          <a:prstGeom prst="rect">
-            <a:avLst/>
-          </a:prstGeom>
-          <a:solidFill>
-            <a:schemeClr val="accent6">
-              <a:lumMod val="60000"/>
-              <a:lumOff val="40000"/>
-            </a:schemeClr>
-          </a:solidFill>
-          <a:ln>
-            <a:solidFill>
-              <a:schemeClr val="tx1"/>
-            </a:solidFill>
-          </a:ln>
-        </p:spPr>
-        <p:style>
-          <a:lnRef idx="2">
-            <a:schemeClr val="accent1">
-              <a:shade val="50000"/>
-            </a:schemeClr>
-          </a:lnRef>
-          <a:fillRef idx="1">
-            <a:schemeClr val="accent1"/>
-          </a:fillRef>
-          <a:effectRef idx="0">
-            <a:schemeClr val="accent1"/>
-          </a:effectRef>
-          <a:fontRef idx="minor">
-            <a:schemeClr val="lt1"/>
-          </a:fontRef>
-        </p:style>
-        <p:txBody>
-          <a:bodyPr rtlCol="0" anchor="ctr"/>
-          <a:lstStyle/>
-          <a:p>
-            <a:pPr algn="ctr"/>
-            <a:r>
-              <a:rPr lang="en-US" dirty="0" smtClean="0">
-                <a:solidFill>
-                  <a:schemeClr val="tx1"/>
-                </a:solidFill>
-              </a:rPr>
-              <a:t>State or Territory</a:t>
-            </a:r>
-            <a:endParaRPr lang="en-US" dirty="0">
-              <a:solidFill>
-                <a:schemeClr val="tx1"/>
-              </a:solidFill>
-            </a:endParaRPr>
-          </a:p>
-        </p:txBody>
-      </p:sp>
-      <p:sp>
-        <p:nvSpPr>
           <p:cNvPr id="130" name="Oval 129"/>
           <p:cNvSpPr/>
           <p:nvPr/>
         </p:nvSpPr>
         <p:spPr>
           <a:xfrm>
-            <a:off x="3002333" y="3989155"/>
+            <a:off x="5001493" y="4848189"/>
             <a:ext cx="1427859" cy="349624"/>
           </a:xfrm>
           <a:prstGeom prst="ellipse">
@@ -8321,7 +5873,7 @@
         </p:nvSpPr>
         <p:spPr>
           <a:xfrm>
-            <a:off x="3898110" y="787864"/>
+            <a:off x="5252814" y="347556"/>
             <a:ext cx="1268587" cy="396775"/>
           </a:xfrm>
           <a:prstGeom prst="ellipse">
@@ -8384,7 +5936,7 @@
         </p:nvSpPr>
         <p:spPr>
           <a:xfrm>
-            <a:off x="3322244" y="2350265"/>
+            <a:off x="3210364" y="3932995"/>
             <a:ext cx="1158328" cy="396775"/>
           </a:xfrm>
           <a:prstGeom prst="ellipse">
@@ -8450,8 +6002,8 @@
         </p:nvCxnSpPr>
         <p:spPr>
           <a:xfrm>
-            <a:off x="4532404" y="1184639"/>
-            <a:ext cx="535917" cy="600316"/>
+            <a:off x="5887108" y="744331"/>
+            <a:ext cx="130211" cy="1083907"/>
           </a:xfrm>
           <a:prstGeom prst="line">
             <a:avLst/>
@@ -8481,15 +6033,15 @@
         <p:nvCxnSpPr>
           <p:cNvPr id="24" name="Straight Connector 23"/>
           <p:cNvCxnSpPr>
-            <a:stCxn id="107" idx="0"/>
-            <a:endCxn id="138" idx="3"/>
+            <a:stCxn id="107" idx="2"/>
+            <a:endCxn id="138" idx="1"/>
           </p:cNvCxnSpPr>
           <p:nvPr/>
         </p:nvCxnSpPr>
         <p:spPr>
-          <a:xfrm flipV="1">
-            <a:off x="3210364" y="2688934"/>
-            <a:ext cx="281513" cy="331695"/>
+          <a:xfrm>
+            <a:off x="3210364" y="3659774"/>
+            <a:ext cx="169633" cy="331327"/>
           </a:xfrm>
           <a:prstGeom prst="line">
             <a:avLst/>
@@ -8547,14 +6099,14 @@
       </p:sp>
       <p:sp>
         <p:nvSpPr>
-          <p:cNvPr id="114" name="Oval 113"/>
+          <p:cNvPr id="117" name="Oval 116"/>
           <p:cNvSpPr/>
           <p:nvPr/>
         </p:nvSpPr>
         <p:spPr>
           <a:xfrm>
-            <a:off x="6866573" y="4775580"/>
-            <a:ext cx="1647231" cy="461712"/>
+            <a:off x="732207" y="133247"/>
+            <a:ext cx="921388" cy="386142"/>
           </a:xfrm>
           <a:prstGeom prst="ellipse">
             <a:avLst/>
@@ -8593,110 +6145,6 @@
           <a:p>
             <a:pPr algn="ctr"/>
             <a:r>
-              <a:rPr lang="en-US" sz="1400" u="sng" dirty="0" err="1">
-                <a:solidFill>
-                  <a:schemeClr val="tx1"/>
-                </a:solidFill>
-              </a:rPr>
-              <a:t>r</a:t>
-            </a:r>
-            <a:r>
-              <a:rPr lang="en-US" sz="1400" u="sng" dirty="0" err="1" smtClean="0">
-                <a:solidFill>
-                  <a:schemeClr val="tx1"/>
-                </a:solidFill>
-              </a:rPr>
-              <a:t>egion_id</a:t>
-            </a:r>
-            <a:endParaRPr lang="en-US" sz="1400" u="sng" dirty="0">
-              <a:solidFill>
-                <a:schemeClr val="tx1"/>
-              </a:solidFill>
-            </a:endParaRPr>
-          </a:p>
-        </p:txBody>
-      </p:sp>
-      <p:cxnSp>
-        <p:nvCxnSpPr>
-          <p:cNvPr id="6" name="Straight Connector 5"/>
-          <p:cNvCxnSpPr>
-            <a:stCxn id="114" idx="6"/>
-            <a:endCxn id="70" idx="1"/>
-          </p:cNvCxnSpPr>
-          <p:nvPr/>
-        </p:nvCxnSpPr>
-        <p:spPr>
-          <a:xfrm flipV="1">
-            <a:off x="8513804" y="4263285"/>
-            <a:ext cx="519130" cy="743151"/>
-          </a:xfrm>
-          <a:prstGeom prst="line">
-            <a:avLst/>
-          </a:prstGeom>
-        </p:spPr>
-        <p:style>
-          <a:lnRef idx="1">
-            <a:schemeClr val="dk1"/>
-          </a:lnRef>
-          <a:fillRef idx="0">
-            <a:schemeClr val="dk1"/>
-          </a:fillRef>
-          <a:effectRef idx="0">
-            <a:schemeClr val="dk1"/>
-          </a:effectRef>
-          <a:fontRef idx="minor">
-            <a:schemeClr val="tx1"/>
-          </a:fontRef>
-        </p:style>
-      </p:cxnSp>
-      <p:sp>
-        <p:nvSpPr>
-          <p:cNvPr id="117" name="Oval 116"/>
-          <p:cNvSpPr/>
-          <p:nvPr/>
-        </p:nvSpPr>
-        <p:spPr>
-          <a:xfrm>
-            <a:off x="933028" y="568627"/>
-            <a:ext cx="921388" cy="386142"/>
-          </a:xfrm>
-          <a:prstGeom prst="ellipse">
-            <a:avLst/>
-          </a:prstGeom>
-          <a:solidFill>
-            <a:schemeClr val="accent1">
-              <a:lumMod val="40000"/>
-              <a:lumOff val="60000"/>
-            </a:schemeClr>
-          </a:solidFill>
-          <a:ln>
-            <a:solidFill>
-              <a:schemeClr val="tx1"/>
-            </a:solidFill>
-          </a:ln>
-        </p:spPr>
-        <p:style>
-          <a:lnRef idx="2">
-            <a:schemeClr val="accent1">
-              <a:shade val="50000"/>
-            </a:schemeClr>
-          </a:lnRef>
-          <a:fillRef idx="1">
-            <a:schemeClr val="accent1"/>
-          </a:fillRef>
-          <a:effectRef idx="0">
-            <a:schemeClr val="accent1"/>
-          </a:effectRef>
-          <a:fontRef idx="minor">
-            <a:schemeClr val="lt1"/>
-          </a:fontRef>
-        </p:style>
-        <p:txBody>
-          <a:bodyPr rtlCol="0" anchor="ctr"/>
-          <a:lstStyle/>
-          <a:p>
-            <a:pPr algn="ctr"/>
-            <a:r>
               <a:rPr lang="en-US" sz="1400" dirty="0" err="1" smtClean="0">
                 <a:solidFill>
                   <a:schemeClr val="tx1"/>
@@ -8720,7 +6168,7 @@
         </p:nvSpPr>
         <p:spPr>
           <a:xfrm>
-            <a:off x="1730348" y="262727"/>
+            <a:off x="1746612" y="245745"/>
             <a:ext cx="921388" cy="386142"/>
           </a:xfrm>
           <a:prstGeom prst="ellipse">
@@ -8895,8 +6343,8 @@
         </p:nvCxnSpPr>
         <p:spPr>
           <a:xfrm flipH="1">
-            <a:off x="761354" y="898220"/>
-            <a:ext cx="306608" cy="590276"/>
+            <a:off x="761354" y="462840"/>
+            <a:ext cx="105787" cy="1025656"/>
           </a:xfrm>
           <a:prstGeom prst="line">
             <a:avLst/>
@@ -8933,8 +6381,8 @@
         </p:nvCxnSpPr>
         <p:spPr>
           <a:xfrm flipH="1">
-            <a:off x="761354" y="648869"/>
-            <a:ext cx="1429688" cy="839627"/>
+            <a:off x="761354" y="631887"/>
+            <a:ext cx="1445952" cy="856609"/>
           </a:xfrm>
           <a:prstGeom prst="line">
             <a:avLst/>
@@ -8968,7 +6416,7 @@
         </p:nvSpPr>
         <p:spPr>
           <a:xfrm>
-            <a:off x="4859390" y="1182039"/>
+            <a:off x="6170274" y="923233"/>
             <a:ext cx="1127474" cy="396775"/>
           </a:xfrm>
           <a:prstGeom prst="ellipse">
@@ -9034,8 +6482,8 @@
         </p:nvCxnSpPr>
         <p:spPr>
           <a:xfrm flipH="1">
-            <a:off x="5068321" y="1578814"/>
-            <a:ext cx="354806" cy="206141"/>
+            <a:off x="6017319" y="1320008"/>
+            <a:ext cx="716692" cy="508230"/>
           </a:xfrm>
           <a:prstGeom prst="line">
             <a:avLst/>
@@ -9069,7 +6517,7 @@
         </p:nvSpPr>
         <p:spPr>
           <a:xfrm>
-            <a:off x="1923798" y="2383282"/>
+            <a:off x="1853916" y="3910636"/>
             <a:ext cx="1268587" cy="396775"/>
           </a:xfrm>
           <a:prstGeom prst="ellipse">
@@ -9128,17 +6576,478 @@
         <p:nvCxnSpPr>
           <p:cNvPr id="25" name="Straight Connector 24"/>
           <p:cNvCxnSpPr>
-            <a:stCxn id="131" idx="5"/>
-            <a:endCxn id="107" idx="0"/>
+            <a:stCxn id="131" idx="7"/>
+            <a:endCxn id="107" idx="2"/>
           </p:cNvCxnSpPr>
           <p:nvPr/>
         </p:nvCxnSpPr>
         <p:spPr>
-          <a:xfrm>
-            <a:off x="3006605" y="2721951"/>
-            <a:ext cx="203759" cy="298678"/>
+          <a:xfrm flipV="1">
+            <a:off x="2936723" y="3659774"/>
+            <a:ext cx="273641" cy="308968"/>
           </a:xfrm>
           <a:prstGeom prst="line">
+            <a:avLst/>
+          </a:prstGeom>
+          <a:ln>
+            <a:solidFill>
+              <a:schemeClr val="tx1"/>
+            </a:solidFill>
+          </a:ln>
+        </p:spPr>
+        <p:style>
+          <a:lnRef idx="1">
+            <a:schemeClr val="accent1"/>
+          </a:lnRef>
+          <a:fillRef idx="0">
+            <a:schemeClr val="accent1"/>
+          </a:fillRef>
+          <a:effectRef idx="0">
+            <a:schemeClr val="accent1"/>
+          </a:effectRef>
+          <a:fontRef idx="minor">
+            <a:schemeClr val="tx1"/>
+          </a:fontRef>
+        </p:style>
+      </p:cxnSp>
+      <p:sp>
+        <p:nvSpPr>
+          <p:cNvPr id="133" name="Oval 132"/>
+          <p:cNvSpPr/>
+          <p:nvPr/>
+        </p:nvSpPr>
+        <p:spPr>
+          <a:xfrm>
+            <a:off x="10850828" y="550367"/>
+            <a:ext cx="866562" cy="396775"/>
+          </a:xfrm>
+          <a:prstGeom prst="ellipse">
+            <a:avLst/>
+          </a:prstGeom>
+          <a:solidFill>
+            <a:schemeClr val="accent1">
+              <a:lumMod val="40000"/>
+              <a:lumOff val="60000"/>
+            </a:schemeClr>
+          </a:solidFill>
+          <a:ln>
+            <a:solidFill>
+              <a:schemeClr val="tx1"/>
+            </a:solidFill>
+          </a:ln>
+        </p:spPr>
+        <p:style>
+          <a:lnRef idx="2">
+            <a:schemeClr val="accent1">
+              <a:shade val="50000"/>
+            </a:schemeClr>
+          </a:lnRef>
+          <a:fillRef idx="1">
+            <a:schemeClr val="accent1"/>
+          </a:fillRef>
+          <a:effectRef idx="0">
+            <a:schemeClr val="accent1"/>
+          </a:effectRef>
+          <a:fontRef idx="minor">
+            <a:schemeClr val="lt1"/>
+          </a:fontRef>
+        </p:style>
+        <p:txBody>
+          <a:bodyPr rtlCol="0" anchor="ctr"/>
+          <a:lstStyle/>
+          <a:p>
+            <a:pPr algn="ctr"/>
+            <a:r>
+              <a:rPr lang="en-US" sz="1400" dirty="0" smtClean="0">
+                <a:solidFill>
+                  <a:schemeClr val="tx1"/>
+                </a:solidFill>
+              </a:rPr>
+              <a:t>type</a:t>
+            </a:r>
+            <a:endParaRPr lang="en-US" sz="1400" dirty="0">
+              <a:solidFill>
+                <a:schemeClr val="tx1"/>
+              </a:solidFill>
+            </a:endParaRPr>
+          </a:p>
+        </p:txBody>
+      </p:sp>
+      <p:sp>
+        <p:nvSpPr>
+          <p:cNvPr id="134" name="Oval 133"/>
+          <p:cNvSpPr/>
+          <p:nvPr/>
+        </p:nvSpPr>
+        <p:spPr>
+          <a:xfrm>
+            <a:off x="8397880" y="687554"/>
+            <a:ext cx="866562" cy="396775"/>
+          </a:xfrm>
+          <a:prstGeom prst="ellipse">
+            <a:avLst/>
+          </a:prstGeom>
+          <a:solidFill>
+            <a:schemeClr val="accent1">
+              <a:lumMod val="40000"/>
+              <a:lumOff val="60000"/>
+            </a:schemeClr>
+          </a:solidFill>
+          <a:ln>
+            <a:solidFill>
+              <a:schemeClr val="tx1"/>
+            </a:solidFill>
+          </a:ln>
+        </p:spPr>
+        <p:style>
+          <a:lnRef idx="2">
+            <a:schemeClr val="accent1">
+              <a:shade val="50000"/>
+            </a:schemeClr>
+          </a:lnRef>
+          <a:fillRef idx="1">
+            <a:schemeClr val="accent1"/>
+          </a:fillRef>
+          <a:effectRef idx="0">
+            <a:schemeClr val="accent1"/>
+          </a:effectRef>
+          <a:fontRef idx="minor">
+            <a:schemeClr val="lt1"/>
+          </a:fontRef>
+        </p:style>
+        <p:txBody>
+          <a:bodyPr rtlCol="0" anchor="ctr"/>
+          <a:lstStyle/>
+          <a:p>
+            <a:pPr algn="ctr"/>
+            <a:r>
+              <a:rPr lang="en-US" sz="1400" dirty="0" err="1" smtClean="0">
+                <a:solidFill>
+                  <a:schemeClr val="tx1"/>
+                </a:solidFill>
+              </a:rPr>
+              <a:t>ppID</a:t>
+            </a:r>
+            <a:endParaRPr lang="en-US" sz="1400" dirty="0">
+              <a:solidFill>
+                <a:schemeClr val="tx1"/>
+              </a:solidFill>
+            </a:endParaRPr>
+          </a:p>
+        </p:txBody>
+      </p:sp>
+      <p:cxnSp>
+        <p:nvCxnSpPr>
+          <p:cNvPr id="23" name="Straight Connector 22"/>
+          <p:cNvCxnSpPr>
+            <a:stCxn id="133" idx="3"/>
+            <a:endCxn id="10" idx="0"/>
+          </p:cNvCxnSpPr>
+          <p:nvPr/>
+        </p:nvCxnSpPr>
+        <p:spPr>
+          <a:xfrm flipH="1">
+            <a:off x="10272220" y="889036"/>
+            <a:ext cx="705513" cy="145662"/>
+          </a:xfrm>
+          <a:prstGeom prst="line">
+            <a:avLst/>
+          </a:prstGeom>
+          <a:ln>
+            <a:solidFill>
+              <a:schemeClr val="tx1"/>
+            </a:solidFill>
+          </a:ln>
+        </p:spPr>
+        <p:style>
+          <a:lnRef idx="1">
+            <a:schemeClr val="accent1"/>
+          </a:lnRef>
+          <a:fillRef idx="0">
+            <a:schemeClr val="accent1"/>
+          </a:fillRef>
+          <a:effectRef idx="0">
+            <a:schemeClr val="accent1"/>
+          </a:effectRef>
+          <a:fontRef idx="minor">
+            <a:schemeClr val="tx1"/>
+          </a:fontRef>
+        </p:style>
+      </p:cxnSp>
+      <p:cxnSp>
+        <p:nvCxnSpPr>
+          <p:cNvPr id="27" name="Straight Connector 26"/>
+          <p:cNvCxnSpPr>
+            <a:stCxn id="134" idx="6"/>
+            <a:endCxn id="10" idx="0"/>
+          </p:cNvCxnSpPr>
+          <p:nvPr/>
+        </p:nvCxnSpPr>
+        <p:spPr>
+          <a:xfrm>
+            <a:off x="9264442" y="885942"/>
+            <a:ext cx="1007778" cy="148756"/>
+          </a:xfrm>
+          <a:prstGeom prst="line">
+            <a:avLst/>
+          </a:prstGeom>
+          <a:ln>
+            <a:solidFill>
+              <a:schemeClr val="tx1"/>
+            </a:solidFill>
+          </a:ln>
+        </p:spPr>
+        <p:style>
+          <a:lnRef idx="1">
+            <a:schemeClr val="accent1"/>
+          </a:lnRef>
+          <a:fillRef idx="0">
+            <a:schemeClr val="accent1"/>
+          </a:fillRef>
+          <a:effectRef idx="0">
+            <a:schemeClr val="accent1"/>
+          </a:effectRef>
+          <a:fontRef idx="minor">
+            <a:schemeClr val="tx1"/>
+          </a:fontRef>
+        </p:style>
+      </p:cxnSp>
+      <p:sp>
+        <p:nvSpPr>
+          <p:cNvPr id="162" name="Flowchart: Decision 161"/>
+          <p:cNvSpPr/>
+          <p:nvPr/>
+        </p:nvSpPr>
+        <p:spPr>
+          <a:xfrm>
+            <a:off x="6783551" y="3310488"/>
+            <a:ext cx="1710601" cy="592266"/>
+          </a:xfrm>
+          <a:prstGeom prst="flowChartDecision">
+            <a:avLst/>
+          </a:prstGeom>
+          <a:solidFill>
+            <a:srgbClr val="F4B183"/>
+          </a:solidFill>
+          <a:ln>
+            <a:solidFill>
+              <a:schemeClr val="tx1"/>
+            </a:solidFill>
+          </a:ln>
+        </p:spPr>
+        <p:style>
+          <a:lnRef idx="2">
+            <a:schemeClr val="accent1">
+              <a:shade val="50000"/>
+            </a:schemeClr>
+          </a:lnRef>
+          <a:fillRef idx="1">
+            <a:schemeClr val="accent1"/>
+          </a:fillRef>
+          <a:effectRef idx="0">
+            <a:schemeClr val="accent1"/>
+          </a:effectRef>
+          <a:fontRef idx="minor">
+            <a:schemeClr val="lt1"/>
+          </a:fontRef>
+        </p:style>
+        <p:txBody>
+          <a:bodyPr rtlCol="0" anchor="ctr"/>
+          <a:lstStyle/>
+          <a:p>
+            <a:pPr algn="ctr"/>
+            <a:r>
+              <a:rPr lang="en-US" sz="1400" dirty="0" smtClean="0">
+                <a:solidFill>
+                  <a:schemeClr val="tx1"/>
+                </a:solidFill>
+              </a:rPr>
+              <a:t>Place of origin</a:t>
+            </a:r>
+            <a:endParaRPr lang="en-US" sz="1400" dirty="0">
+              <a:solidFill>
+                <a:schemeClr val="tx1"/>
+              </a:solidFill>
+            </a:endParaRPr>
+          </a:p>
+        </p:txBody>
+      </p:sp>
+      <p:sp>
+        <p:nvSpPr>
+          <p:cNvPr id="10" name="Rectangle 9"/>
+          <p:cNvSpPr/>
+          <p:nvPr/>
+        </p:nvSpPr>
+        <p:spPr>
+          <a:xfrm>
+            <a:off x="9702243" y="1034698"/>
+            <a:ext cx="1139953" cy="825623"/>
+          </a:xfrm>
+          <a:prstGeom prst="rect">
+            <a:avLst/>
+          </a:prstGeom>
+          <a:solidFill>
+            <a:schemeClr val="accent6">
+              <a:lumMod val="60000"/>
+              <a:lumOff val="40000"/>
+            </a:schemeClr>
+          </a:solidFill>
+          <a:ln>
+            <a:solidFill>
+              <a:schemeClr val="tx1"/>
+            </a:solidFill>
+          </a:ln>
+        </p:spPr>
+        <p:style>
+          <a:lnRef idx="2">
+            <a:schemeClr val="accent1">
+              <a:shade val="50000"/>
+            </a:schemeClr>
+          </a:lnRef>
+          <a:fillRef idx="1">
+            <a:schemeClr val="accent1"/>
+          </a:fillRef>
+          <a:effectRef idx="0">
+            <a:schemeClr val="accent1"/>
+          </a:effectRef>
+          <a:fontRef idx="minor">
+            <a:schemeClr val="lt1"/>
+          </a:fontRef>
+        </p:style>
+        <p:txBody>
+          <a:bodyPr rtlCol="0" anchor="ctr"/>
+          <a:lstStyle/>
+          <a:p>
+            <a:pPr algn="ctr"/>
+            <a:r>
+              <a:rPr lang="en-US" dirty="0" smtClean="0">
+                <a:solidFill>
+                  <a:schemeClr val="tx1"/>
+                </a:solidFill>
+              </a:rPr>
+              <a:t>Location</a:t>
+            </a:r>
+            <a:endParaRPr lang="en-US" dirty="0">
+              <a:solidFill>
+                <a:schemeClr val="tx1"/>
+              </a:solidFill>
+            </a:endParaRPr>
+          </a:p>
+        </p:txBody>
+      </p:sp>
+      <p:cxnSp>
+        <p:nvCxnSpPr>
+          <p:cNvPr id="91" name="Straight Connector 90"/>
+          <p:cNvCxnSpPr>
+            <a:stCxn id="179" idx="3"/>
+            <a:endCxn id="162" idx="1"/>
+          </p:cNvCxnSpPr>
+          <p:nvPr/>
+        </p:nvCxnSpPr>
+        <p:spPr>
+          <a:xfrm>
+            <a:off x="6360239" y="3593447"/>
+            <a:ext cx="423312" cy="13174"/>
+          </a:xfrm>
+          <a:prstGeom prst="line">
+            <a:avLst/>
+          </a:prstGeom>
+          <a:ln>
+            <a:solidFill>
+              <a:schemeClr val="tx1"/>
+            </a:solidFill>
+          </a:ln>
+        </p:spPr>
+        <p:style>
+          <a:lnRef idx="1">
+            <a:schemeClr val="accent1"/>
+          </a:lnRef>
+          <a:fillRef idx="0">
+            <a:schemeClr val="accent1"/>
+          </a:fillRef>
+          <a:effectRef idx="0">
+            <a:schemeClr val="accent1"/>
+          </a:effectRef>
+          <a:fontRef idx="minor">
+            <a:schemeClr val="tx1"/>
+          </a:fontRef>
+        </p:style>
+      </p:cxnSp>
+      <p:sp>
+        <p:nvSpPr>
+          <p:cNvPr id="96" name="TextBox 95"/>
+          <p:cNvSpPr txBox="1"/>
+          <p:nvPr/>
+        </p:nvSpPr>
+        <p:spPr>
+          <a:xfrm>
+            <a:off x="6549262" y="3203408"/>
+            <a:ext cx="301686" cy="369332"/>
+          </a:xfrm>
+          <a:prstGeom prst="rect">
+            <a:avLst/>
+          </a:prstGeom>
+          <a:noFill/>
+        </p:spPr>
+        <p:txBody>
+          <a:bodyPr wrap="none" rtlCol="0">
+            <a:spAutoFit/>
+          </a:bodyPr>
+          <a:lstStyle/>
+          <a:p>
+            <a:r>
+              <a:rPr lang="en-US" dirty="0" smtClean="0"/>
+              <a:t>1</a:t>
+            </a:r>
+            <a:endParaRPr lang="en-US" dirty="0"/>
+          </a:p>
+        </p:txBody>
+      </p:sp>
+      <p:sp>
+        <p:nvSpPr>
+          <p:cNvPr id="191" name="TextBox 190"/>
+          <p:cNvSpPr txBox="1"/>
+          <p:nvPr/>
+        </p:nvSpPr>
+        <p:spPr>
+          <a:xfrm>
+            <a:off x="8388683" y="3155535"/>
+            <a:ext cx="306494" cy="369332"/>
+          </a:xfrm>
+          <a:prstGeom prst="rect">
+            <a:avLst/>
+          </a:prstGeom>
+          <a:noFill/>
+        </p:spPr>
+        <p:txBody>
+          <a:bodyPr wrap="none" rtlCol="0">
+            <a:spAutoFit/>
+          </a:bodyPr>
+          <a:lstStyle/>
+          <a:p>
+            <a:r>
+              <a:rPr lang="en-US" dirty="0" smtClean="0"/>
+              <a:t>n</a:t>
+            </a:r>
+            <a:endParaRPr lang="en-US" dirty="0"/>
+          </a:p>
+        </p:txBody>
+      </p:sp>
+      <p:cxnSp>
+        <p:nvCxnSpPr>
+          <p:cNvPr id="108" name="Elbow Connector 107"/>
+          <p:cNvCxnSpPr>
+            <a:stCxn id="153" idx="2"/>
+            <a:endCxn id="144" idx="1"/>
+          </p:cNvCxnSpPr>
+          <p:nvPr/>
+        </p:nvCxnSpPr>
+        <p:spPr>
+          <a:xfrm rot="16200000" flipH="1">
+            <a:off x="4154315" y="1855934"/>
+            <a:ext cx="672785" cy="7499296"/>
+          </a:xfrm>
+          <a:prstGeom prst="bentConnector2">
             <a:avLst/>
           </a:prstGeom>
           <a:ln>

</xml_diff>

<commit_message>
Er diagram, schema, and challenges added.
</commit_message>
<xml_diff>
--- a/ERdiagram.pptx
+++ b/ERdiagram.pptx
@@ -2,7 +2,7 @@
 <file path=ppt/presentation.xml><?xml version="1.0" encoding="utf-8"?>
 <p:presentation xmlns:a="http://schemas.openxmlformats.org/drawingml/2006/main" xmlns:r="http://schemas.openxmlformats.org/officeDocument/2006/relationships" xmlns:p="http://schemas.openxmlformats.org/presentationml/2006/main" saveSubsetFonts="1">
   <p:sldMasterIdLst>
-    <p:sldMasterId id="2147483648" r:id="rId1"/>
+    <p:sldMasterId id="2147483660" r:id="rId1"/>
   </p:sldMasterIdLst>
   <p:notesMasterIdLst>
     <p:notesMasterId r:id="rId4"/>
@@ -11,7 +11,7 @@
     <p:sldId id="257" r:id="rId2"/>
     <p:sldId id="256" r:id="rId3"/>
   </p:sldIdLst>
-  <p:sldSz cx="12192000" cy="6858000"/>
+  <p:sldSz cx="9144000" cy="6858000" type="screen4x3"/>
   <p:notesSz cx="6858000" cy="9144000"/>
   <p:defaultTextStyle>
     <a:defPPr>
@@ -198,7 +198,7 @@
           <a:p>
             <a:fld id="{CE1FD266-E70F-468C-B73B-9637A32255C0}" type="datetimeFigureOut">
               <a:rPr lang="en-US" smtClean="0"/>
-              <a:t>4/30/2015</a:t>
+              <a:t>5/22/2015</a:t>
             </a:fld>
             <a:endParaRPr lang="en-US"/>
           </a:p>
@@ -216,8 +216,8 @@
         </p:nvSpPr>
         <p:spPr>
           <a:xfrm>
-            <a:off x="685800" y="1143000"/>
-            <a:ext cx="5486400" cy="3086100"/>
+            <a:off x="1371600" y="1143000"/>
+            <a:ext cx="4114800" cy="3086100"/>
           </a:xfrm>
           <a:prstGeom prst="rect">
             <a:avLst/>
@@ -493,7 +493,12 @@
             <p:ph type="sldImg"/>
           </p:nvPr>
         </p:nvSpPr>
-        <p:spPr/>
+        <p:spPr>
+          <a:xfrm>
+            <a:off x="1371600" y="1143000"/>
+            <a:ext cx="4114800" cy="3086100"/>
+          </a:xfrm>
+        </p:spPr>
       </p:sp>
       <p:sp>
         <p:nvSpPr>
@@ -577,7 +582,12 @@
             <p:ph type="sldImg"/>
           </p:nvPr>
         </p:nvSpPr>
-        <p:spPr/>
+        <p:spPr>
+          <a:xfrm>
+            <a:off x="1371600" y="1143000"/>
+            <a:ext cx="4114800" cy="3086100"/>
+          </a:xfrm>
+        </p:spPr>
       </p:sp>
       <p:sp>
         <p:nvSpPr>
@@ -663,8 +673,8 @@
         </p:nvSpPr>
         <p:spPr>
           <a:xfrm>
-            <a:off x="1524000" y="1122363"/>
-            <a:ext cx="9144000" cy="2387600"/>
+            <a:off x="685800" y="1122363"/>
+            <a:ext cx="7772400" cy="2387600"/>
           </a:xfrm>
         </p:spPr>
         <p:txBody>
@@ -679,7 +689,7 @@
               <a:rPr lang="en-US" smtClean="0"/>
               <a:t>Click to edit Master title style</a:t>
             </a:r>
-            <a:endParaRPr lang="en-US"/>
+            <a:endParaRPr lang="en-US" dirty="0"/>
           </a:p>
         </p:txBody>
       </p:sp>
@@ -695,8 +705,8 @@
         </p:nvSpPr>
         <p:spPr>
           <a:xfrm>
-            <a:off x="1524000" y="3602038"/>
-            <a:ext cx="9144000" cy="1655762"/>
+            <a:off x="1143000" y="3602038"/>
+            <a:ext cx="6858000" cy="1655762"/>
           </a:xfrm>
         </p:spPr>
         <p:txBody>
@@ -744,7 +754,7 @@
               <a:rPr lang="en-US" smtClean="0"/>
               <a:t>Click to edit Master subtitle style</a:t>
             </a:r>
-            <a:endParaRPr lang="en-US"/>
+            <a:endParaRPr lang="en-US" dirty="0"/>
           </a:p>
         </p:txBody>
       </p:sp>
@@ -765,7 +775,7 @@
           <a:p>
             <a:fld id="{3B86C474-5A3B-4572-83DF-E10892B0A5A0}" type="datetimeFigureOut">
               <a:rPr lang="en-US" smtClean="0"/>
-              <a:t>4/30/2015</a:t>
+              <a:t>5/22/2015</a:t>
             </a:fld>
             <a:endParaRPr lang="en-US"/>
           </a:p>
@@ -816,7 +826,7 @@
     </p:spTree>
     <p:extLst>
       <p:ext uri="{BB962C8B-B14F-4D97-AF65-F5344CB8AC3E}">
-        <p14:creationId xmlns:p14="http://schemas.microsoft.com/office/powerpoint/2010/main" val="4031131518"/>
+        <p14:creationId xmlns:p14="http://schemas.microsoft.com/office/powerpoint/2010/main" val="2819058189"/>
       </p:ext>
     </p:extLst>
   </p:cSld>
@@ -862,7 +872,7 @@
               <a:rPr lang="en-US" smtClean="0"/>
               <a:t>Click to edit Master title style</a:t>
             </a:r>
-            <a:endParaRPr lang="en-US"/>
+            <a:endParaRPr lang="en-US" dirty="0"/>
           </a:p>
         </p:txBody>
       </p:sp>
@@ -914,7 +924,7 @@
               <a:rPr lang="en-US" smtClean="0"/>
               <a:t>Fifth level</a:t>
             </a:r>
-            <a:endParaRPr lang="en-US"/>
+            <a:endParaRPr lang="en-US" dirty="0"/>
           </a:p>
         </p:txBody>
       </p:sp>
@@ -935,7 +945,7 @@
           <a:p>
             <a:fld id="{3B86C474-5A3B-4572-83DF-E10892B0A5A0}" type="datetimeFigureOut">
               <a:rPr lang="en-US" smtClean="0"/>
-              <a:t>4/30/2015</a:t>
+              <a:t>5/22/2015</a:t>
             </a:fld>
             <a:endParaRPr lang="en-US"/>
           </a:p>
@@ -986,7 +996,7 @@
     </p:spTree>
     <p:extLst>
       <p:ext uri="{BB962C8B-B14F-4D97-AF65-F5344CB8AC3E}">
-        <p14:creationId xmlns:p14="http://schemas.microsoft.com/office/powerpoint/2010/main" val="2325257138"/>
+        <p14:creationId xmlns:p14="http://schemas.microsoft.com/office/powerpoint/2010/main" val="1630388563"/>
       </p:ext>
     </p:extLst>
   </p:cSld>
@@ -1025,8 +1035,8 @@
         </p:nvSpPr>
         <p:spPr>
           <a:xfrm>
-            <a:off x="8724900" y="365125"/>
-            <a:ext cx="2628900" cy="5811838"/>
+            <a:off x="6543675" y="365125"/>
+            <a:ext cx="1971675" cy="5811838"/>
           </a:xfrm>
         </p:spPr>
         <p:txBody>
@@ -1037,7 +1047,7 @@
               <a:rPr lang="en-US" smtClean="0"/>
               <a:t>Click to edit Master title style</a:t>
             </a:r>
-            <a:endParaRPr lang="en-US"/>
+            <a:endParaRPr lang="en-US" dirty="0"/>
           </a:p>
         </p:txBody>
       </p:sp>
@@ -1053,8 +1063,8 @@
         </p:nvSpPr>
         <p:spPr>
           <a:xfrm>
-            <a:off x="838200" y="365125"/>
-            <a:ext cx="7734300" cy="5811838"/>
+            <a:off x="628650" y="365125"/>
+            <a:ext cx="5800725" cy="5811838"/>
           </a:xfrm>
         </p:spPr>
         <p:txBody>
@@ -1094,7 +1104,7 @@
               <a:rPr lang="en-US" smtClean="0"/>
               <a:t>Fifth level</a:t>
             </a:r>
-            <a:endParaRPr lang="en-US"/>
+            <a:endParaRPr lang="en-US" dirty="0"/>
           </a:p>
         </p:txBody>
       </p:sp>
@@ -1115,7 +1125,7 @@
           <a:p>
             <a:fld id="{3B86C474-5A3B-4572-83DF-E10892B0A5A0}" type="datetimeFigureOut">
               <a:rPr lang="en-US" smtClean="0"/>
-              <a:t>4/30/2015</a:t>
+              <a:t>5/22/2015</a:t>
             </a:fld>
             <a:endParaRPr lang="en-US"/>
           </a:p>
@@ -1166,7 +1176,7 @@
     </p:spTree>
     <p:extLst>
       <p:ext uri="{BB962C8B-B14F-4D97-AF65-F5344CB8AC3E}">
-        <p14:creationId xmlns:p14="http://schemas.microsoft.com/office/powerpoint/2010/main" val="3625348630"/>
+        <p14:creationId xmlns:p14="http://schemas.microsoft.com/office/powerpoint/2010/main" val="2711326566"/>
       </p:ext>
     </p:extLst>
   </p:cSld>
@@ -1212,7 +1222,7 @@
               <a:rPr lang="en-US" smtClean="0"/>
               <a:t>Click to edit Master title style</a:t>
             </a:r>
-            <a:endParaRPr lang="en-US"/>
+            <a:endParaRPr lang="en-US" dirty="0"/>
           </a:p>
         </p:txBody>
       </p:sp>
@@ -1264,7 +1274,7 @@
               <a:rPr lang="en-US" smtClean="0"/>
               <a:t>Fifth level</a:t>
             </a:r>
-            <a:endParaRPr lang="en-US"/>
+            <a:endParaRPr lang="en-US" dirty="0"/>
           </a:p>
         </p:txBody>
       </p:sp>
@@ -1285,7 +1295,7 @@
           <a:p>
             <a:fld id="{3B86C474-5A3B-4572-83DF-E10892B0A5A0}" type="datetimeFigureOut">
               <a:rPr lang="en-US" smtClean="0"/>
-              <a:t>4/30/2015</a:t>
+              <a:t>5/22/2015</a:t>
             </a:fld>
             <a:endParaRPr lang="en-US"/>
           </a:p>
@@ -1336,7 +1346,7 @@
     </p:spTree>
     <p:extLst>
       <p:ext uri="{BB962C8B-B14F-4D97-AF65-F5344CB8AC3E}">
-        <p14:creationId xmlns:p14="http://schemas.microsoft.com/office/powerpoint/2010/main" val="2551259789"/>
+        <p14:creationId xmlns:p14="http://schemas.microsoft.com/office/powerpoint/2010/main" val="780312027"/>
       </p:ext>
     </p:extLst>
   </p:cSld>
@@ -1375,8 +1385,8 @@
         </p:nvSpPr>
         <p:spPr>
           <a:xfrm>
-            <a:off x="831850" y="1709738"/>
-            <a:ext cx="10515600" cy="2852737"/>
+            <a:off x="623888" y="1709739"/>
+            <a:ext cx="7886700" cy="2852737"/>
           </a:xfrm>
         </p:spPr>
         <p:txBody>
@@ -1391,7 +1401,7 @@
               <a:rPr lang="en-US" smtClean="0"/>
               <a:t>Click to edit Master title style</a:t>
             </a:r>
-            <a:endParaRPr lang="en-US"/>
+            <a:endParaRPr lang="en-US" dirty="0"/>
           </a:p>
         </p:txBody>
       </p:sp>
@@ -1407,8 +1417,8 @@
         </p:nvSpPr>
         <p:spPr>
           <a:xfrm>
-            <a:off x="831850" y="4589463"/>
-            <a:ext cx="10515600" cy="1500187"/>
+            <a:off x="623888" y="4589464"/>
+            <a:ext cx="7886700" cy="1500187"/>
           </a:xfrm>
         </p:spPr>
         <p:txBody>
@@ -1418,9 +1428,7 @@
               <a:buNone/>
               <a:defRPr sz="2400">
                 <a:solidFill>
-                  <a:schemeClr val="tx1">
-                    <a:tint val="75000"/>
-                  </a:schemeClr>
+                  <a:schemeClr val="tx1"/>
                 </a:solidFill>
               </a:defRPr>
             </a:lvl1pPr>
@@ -1531,7 +1539,7 @@
           <a:p>
             <a:fld id="{3B86C474-5A3B-4572-83DF-E10892B0A5A0}" type="datetimeFigureOut">
               <a:rPr lang="en-US" smtClean="0"/>
-              <a:t>4/30/2015</a:t>
+              <a:t>5/22/2015</a:t>
             </a:fld>
             <a:endParaRPr lang="en-US"/>
           </a:p>
@@ -1582,7 +1590,7 @@
     </p:spTree>
     <p:extLst>
       <p:ext uri="{BB962C8B-B14F-4D97-AF65-F5344CB8AC3E}">
-        <p14:creationId xmlns:p14="http://schemas.microsoft.com/office/powerpoint/2010/main" val="2201918968"/>
+        <p14:creationId xmlns:p14="http://schemas.microsoft.com/office/powerpoint/2010/main" val="4042610045"/>
       </p:ext>
     </p:extLst>
   </p:cSld>
@@ -1628,7 +1636,7 @@
               <a:rPr lang="en-US" smtClean="0"/>
               <a:t>Click to edit Master title style</a:t>
             </a:r>
-            <a:endParaRPr lang="en-US"/>
+            <a:endParaRPr lang="en-US" dirty="0"/>
           </a:p>
         </p:txBody>
       </p:sp>
@@ -1644,8 +1652,8 @@
         </p:nvSpPr>
         <p:spPr>
           <a:xfrm>
-            <a:off x="838200" y="1825625"/>
-            <a:ext cx="5181600" cy="4351338"/>
+            <a:off x="628650" y="1825625"/>
+            <a:ext cx="3886200" cy="4351338"/>
           </a:xfrm>
         </p:spPr>
         <p:txBody>
@@ -1685,7 +1693,7 @@
               <a:rPr lang="en-US" smtClean="0"/>
               <a:t>Fifth level</a:t>
             </a:r>
-            <a:endParaRPr lang="en-US"/>
+            <a:endParaRPr lang="en-US" dirty="0"/>
           </a:p>
         </p:txBody>
       </p:sp>
@@ -1701,8 +1709,8 @@
         </p:nvSpPr>
         <p:spPr>
           <a:xfrm>
-            <a:off x="6172200" y="1825625"/>
-            <a:ext cx="5181600" cy="4351338"/>
+            <a:off x="4629150" y="1825625"/>
+            <a:ext cx="3886200" cy="4351338"/>
           </a:xfrm>
         </p:spPr>
         <p:txBody>
@@ -1742,7 +1750,7 @@
               <a:rPr lang="en-US" smtClean="0"/>
               <a:t>Fifth level</a:t>
             </a:r>
-            <a:endParaRPr lang="en-US"/>
+            <a:endParaRPr lang="en-US" dirty="0"/>
           </a:p>
         </p:txBody>
       </p:sp>
@@ -1763,7 +1771,7 @@
           <a:p>
             <a:fld id="{3B86C474-5A3B-4572-83DF-E10892B0A5A0}" type="datetimeFigureOut">
               <a:rPr lang="en-US" smtClean="0"/>
-              <a:t>4/30/2015</a:t>
+              <a:t>5/22/2015</a:t>
             </a:fld>
             <a:endParaRPr lang="en-US"/>
           </a:p>
@@ -1814,7 +1822,7 @@
     </p:spTree>
     <p:extLst>
       <p:ext uri="{BB962C8B-B14F-4D97-AF65-F5344CB8AC3E}">
-        <p14:creationId xmlns:p14="http://schemas.microsoft.com/office/powerpoint/2010/main" val="3577434032"/>
+        <p14:creationId xmlns:p14="http://schemas.microsoft.com/office/powerpoint/2010/main" val="673563059"/>
       </p:ext>
     </p:extLst>
   </p:cSld>
@@ -1853,8 +1861,8 @@
         </p:nvSpPr>
         <p:spPr>
           <a:xfrm>
-            <a:off x="839788" y="365125"/>
-            <a:ext cx="10515600" cy="1325563"/>
+            <a:off x="629841" y="365126"/>
+            <a:ext cx="7886700" cy="1325563"/>
           </a:xfrm>
         </p:spPr>
         <p:txBody>
@@ -1865,7 +1873,7 @@
               <a:rPr lang="en-US" smtClean="0"/>
               <a:t>Click to edit Master title style</a:t>
             </a:r>
-            <a:endParaRPr lang="en-US"/>
+            <a:endParaRPr lang="en-US" dirty="0"/>
           </a:p>
         </p:txBody>
       </p:sp>
@@ -1881,8 +1889,8 @@
         </p:nvSpPr>
         <p:spPr>
           <a:xfrm>
-            <a:off x="839788" y="1681163"/>
-            <a:ext cx="5157787" cy="823912"/>
+            <a:off x="629842" y="1681163"/>
+            <a:ext cx="3868340" cy="823912"/>
           </a:xfrm>
         </p:spPr>
         <p:txBody>
@@ -1946,8 +1954,8 @@
         </p:nvSpPr>
         <p:spPr>
           <a:xfrm>
-            <a:off x="839788" y="2505075"/>
-            <a:ext cx="5157787" cy="3684588"/>
+            <a:off x="629842" y="2505075"/>
+            <a:ext cx="3868340" cy="3684588"/>
           </a:xfrm>
         </p:spPr>
         <p:txBody>
@@ -1987,7 +1995,7 @@
               <a:rPr lang="en-US" smtClean="0"/>
               <a:t>Fifth level</a:t>
             </a:r>
-            <a:endParaRPr lang="en-US"/>
+            <a:endParaRPr lang="en-US" dirty="0"/>
           </a:p>
         </p:txBody>
       </p:sp>
@@ -2003,8 +2011,8 @@
         </p:nvSpPr>
         <p:spPr>
           <a:xfrm>
-            <a:off x="6172200" y="1681163"/>
-            <a:ext cx="5183188" cy="823912"/>
+            <a:off x="4629150" y="1681163"/>
+            <a:ext cx="3887391" cy="823912"/>
           </a:xfrm>
         </p:spPr>
         <p:txBody>
@@ -2068,8 +2076,8 @@
         </p:nvSpPr>
         <p:spPr>
           <a:xfrm>
-            <a:off x="6172200" y="2505075"/>
-            <a:ext cx="5183188" cy="3684588"/>
+            <a:off x="4629150" y="2505075"/>
+            <a:ext cx="3887391" cy="3684588"/>
           </a:xfrm>
         </p:spPr>
         <p:txBody>
@@ -2109,7 +2117,7 @@
               <a:rPr lang="en-US" smtClean="0"/>
               <a:t>Fifth level</a:t>
             </a:r>
-            <a:endParaRPr lang="en-US"/>
+            <a:endParaRPr lang="en-US" dirty="0"/>
           </a:p>
         </p:txBody>
       </p:sp>
@@ -2130,7 +2138,7 @@
           <a:p>
             <a:fld id="{3B86C474-5A3B-4572-83DF-E10892B0A5A0}" type="datetimeFigureOut">
               <a:rPr lang="en-US" smtClean="0"/>
-              <a:t>4/30/2015</a:t>
+              <a:t>5/22/2015</a:t>
             </a:fld>
             <a:endParaRPr lang="en-US"/>
           </a:p>
@@ -2181,7 +2189,7 @@
     </p:spTree>
     <p:extLst>
       <p:ext uri="{BB962C8B-B14F-4D97-AF65-F5344CB8AC3E}">
-        <p14:creationId xmlns:p14="http://schemas.microsoft.com/office/powerpoint/2010/main" val="3939312147"/>
+        <p14:creationId xmlns:p14="http://schemas.microsoft.com/office/powerpoint/2010/main" val="2189015782"/>
       </p:ext>
     </p:extLst>
   </p:cSld>
@@ -2227,7 +2235,7 @@
               <a:rPr lang="en-US" smtClean="0"/>
               <a:t>Click to edit Master title style</a:t>
             </a:r>
-            <a:endParaRPr lang="en-US"/>
+            <a:endParaRPr lang="en-US" dirty="0"/>
           </a:p>
         </p:txBody>
       </p:sp>
@@ -2248,7 +2256,7 @@
           <a:p>
             <a:fld id="{3B86C474-5A3B-4572-83DF-E10892B0A5A0}" type="datetimeFigureOut">
               <a:rPr lang="en-US" smtClean="0"/>
-              <a:t>4/30/2015</a:t>
+              <a:t>5/22/2015</a:t>
             </a:fld>
             <a:endParaRPr lang="en-US"/>
           </a:p>
@@ -2299,7 +2307,7 @@
     </p:spTree>
     <p:extLst>
       <p:ext uri="{BB962C8B-B14F-4D97-AF65-F5344CB8AC3E}">
-        <p14:creationId xmlns:p14="http://schemas.microsoft.com/office/powerpoint/2010/main" val="1128857767"/>
+        <p14:creationId xmlns:p14="http://schemas.microsoft.com/office/powerpoint/2010/main" val="3091676753"/>
       </p:ext>
     </p:extLst>
   </p:cSld>
@@ -2343,7 +2351,7 @@
           <a:p>
             <a:fld id="{3B86C474-5A3B-4572-83DF-E10892B0A5A0}" type="datetimeFigureOut">
               <a:rPr lang="en-US" smtClean="0"/>
-              <a:t>4/30/2015</a:t>
+              <a:t>5/22/2015</a:t>
             </a:fld>
             <a:endParaRPr lang="en-US"/>
           </a:p>
@@ -2394,7 +2402,7 @@
     </p:spTree>
     <p:extLst>
       <p:ext uri="{BB962C8B-B14F-4D97-AF65-F5344CB8AC3E}">
-        <p14:creationId xmlns:p14="http://schemas.microsoft.com/office/powerpoint/2010/main" val="1154585052"/>
+        <p14:creationId xmlns:p14="http://schemas.microsoft.com/office/powerpoint/2010/main" val="784441973"/>
       </p:ext>
     </p:extLst>
   </p:cSld>
@@ -2433,8 +2441,8 @@
         </p:nvSpPr>
         <p:spPr>
           <a:xfrm>
-            <a:off x="839788" y="457200"/>
-            <a:ext cx="3932237" cy="1600200"/>
+            <a:off x="629841" y="457200"/>
+            <a:ext cx="2949178" cy="1600200"/>
           </a:xfrm>
         </p:spPr>
         <p:txBody>
@@ -2449,7 +2457,7 @@
               <a:rPr lang="en-US" smtClean="0"/>
               <a:t>Click to edit Master title style</a:t>
             </a:r>
-            <a:endParaRPr lang="en-US"/>
+            <a:endParaRPr lang="en-US" dirty="0"/>
           </a:p>
         </p:txBody>
       </p:sp>
@@ -2465,8 +2473,8 @@
         </p:nvSpPr>
         <p:spPr>
           <a:xfrm>
-            <a:off x="5183188" y="987425"/>
-            <a:ext cx="6172200" cy="4873625"/>
+            <a:off x="3887391" y="987426"/>
+            <a:ext cx="4629150" cy="4873625"/>
           </a:xfrm>
         </p:spPr>
         <p:txBody>
@@ -2534,7 +2542,7 @@
               <a:rPr lang="en-US" smtClean="0"/>
               <a:t>Fifth level</a:t>
             </a:r>
-            <a:endParaRPr lang="en-US"/>
+            <a:endParaRPr lang="en-US" dirty="0"/>
           </a:p>
         </p:txBody>
       </p:sp>
@@ -2550,8 +2558,8 @@
         </p:nvSpPr>
         <p:spPr>
           <a:xfrm>
-            <a:off x="839788" y="2057400"/>
-            <a:ext cx="3932237" cy="3811588"/>
+            <a:off x="629841" y="2057400"/>
+            <a:ext cx="2949178" cy="3811588"/>
           </a:xfrm>
         </p:spPr>
         <p:txBody>
@@ -2620,7 +2628,7 @@
           <a:p>
             <a:fld id="{3B86C474-5A3B-4572-83DF-E10892B0A5A0}" type="datetimeFigureOut">
               <a:rPr lang="en-US" smtClean="0"/>
-              <a:t>4/30/2015</a:t>
+              <a:t>5/22/2015</a:t>
             </a:fld>
             <a:endParaRPr lang="en-US"/>
           </a:p>
@@ -2671,7 +2679,7 @@
     </p:spTree>
     <p:extLst>
       <p:ext uri="{BB962C8B-B14F-4D97-AF65-F5344CB8AC3E}">
-        <p14:creationId xmlns:p14="http://schemas.microsoft.com/office/powerpoint/2010/main" val="2254214464"/>
+        <p14:creationId xmlns:p14="http://schemas.microsoft.com/office/powerpoint/2010/main" val="4044724466"/>
       </p:ext>
     </p:extLst>
   </p:cSld>
@@ -2710,8 +2718,8 @@
         </p:nvSpPr>
         <p:spPr>
           <a:xfrm>
-            <a:off x="839788" y="457200"/>
-            <a:ext cx="3932237" cy="1600200"/>
+            <a:off x="629841" y="457200"/>
+            <a:ext cx="2949178" cy="1600200"/>
           </a:xfrm>
         </p:spPr>
         <p:txBody>
@@ -2726,7 +2734,7 @@
               <a:rPr lang="en-US" smtClean="0"/>
               <a:t>Click to edit Master title style</a:t>
             </a:r>
-            <a:endParaRPr lang="en-US"/>
+            <a:endParaRPr lang="en-US" dirty="0"/>
           </a:p>
         </p:txBody>
       </p:sp>
@@ -2734,7 +2742,7 @@
         <p:nvSpPr>
           <p:cNvPr id="3" name="Picture Placeholder 2"/>
           <p:cNvSpPr>
-            <a:spLocks noGrp="1"/>
+            <a:spLocks noGrp="1" noChangeAspect="1"/>
           </p:cNvSpPr>
           <p:nvPr>
             <p:ph type="pic" idx="1"/>
@@ -2742,12 +2750,12 @@
         </p:nvSpPr>
         <p:spPr>
           <a:xfrm>
-            <a:off x="5183188" y="987425"/>
-            <a:ext cx="6172200" cy="4873625"/>
-          </a:xfrm>
-        </p:spPr>
-        <p:txBody>
-          <a:bodyPr/>
+            <a:off x="3887391" y="987426"/>
+            <a:ext cx="4629150" cy="4873625"/>
+          </a:xfrm>
+        </p:spPr>
+        <p:txBody>
+          <a:bodyPr anchor="t"/>
           <a:lstStyle>
             <a:lvl1pPr marL="0" indent="0">
               <a:buNone/>
@@ -2787,7 +2795,11 @@
             </a:lvl9pPr>
           </a:lstStyle>
           <a:p>
-            <a:endParaRPr lang="en-US"/>
+            <a:r>
+              <a:rPr lang="en-US" smtClean="0"/>
+              <a:t>Click icon to add picture</a:t>
+            </a:r>
+            <a:endParaRPr lang="en-US" dirty="0"/>
           </a:p>
         </p:txBody>
       </p:sp>
@@ -2803,8 +2815,8 @@
         </p:nvSpPr>
         <p:spPr>
           <a:xfrm>
-            <a:off x="839788" y="2057400"/>
-            <a:ext cx="3932237" cy="3811588"/>
+            <a:off x="629841" y="2057400"/>
+            <a:ext cx="2949178" cy="3811588"/>
           </a:xfrm>
         </p:spPr>
         <p:txBody>
@@ -2873,7 +2885,7 @@
           <a:p>
             <a:fld id="{3B86C474-5A3B-4572-83DF-E10892B0A5A0}" type="datetimeFigureOut">
               <a:rPr lang="en-US" smtClean="0"/>
-              <a:t>4/30/2015</a:t>
+              <a:t>5/22/2015</a:t>
             </a:fld>
             <a:endParaRPr lang="en-US"/>
           </a:p>
@@ -2924,7 +2936,7 @@
     </p:spTree>
     <p:extLst>
       <p:ext uri="{BB962C8B-B14F-4D97-AF65-F5344CB8AC3E}">
-        <p14:creationId xmlns:p14="http://schemas.microsoft.com/office/powerpoint/2010/main" val="1068524672"/>
+        <p14:creationId xmlns:p14="http://schemas.microsoft.com/office/powerpoint/2010/main" val="3762271089"/>
       </p:ext>
     </p:extLst>
   </p:cSld>
@@ -2968,8 +2980,8 @@
         </p:nvSpPr>
         <p:spPr>
           <a:xfrm>
-            <a:off x="838200" y="365125"/>
-            <a:ext cx="10515600" cy="1325563"/>
+            <a:off x="628650" y="365126"/>
+            <a:ext cx="7886700" cy="1325563"/>
           </a:xfrm>
           <a:prstGeom prst="rect">
             <a:avLst/>
@@ -2985,7 +2997,7 @@
               <a:rPr lang="en-US" smtClean="0"/>
               <a:t>Click to edit Master title style</a:t>
             </a:r>
-            <a:endParaRPr lang="en-US"/>
+            <a:endParaRPr lang="en-US" dirty="0"/>
           </a:p>
         </p:txBody>
       </p:sp>
@@ -3001,8 +3013,8 @@
         </p:nvSpPr>
         <p:spPr>
           <a:xfrm>
-            <a:off x="838200" y="1825625"/>
-            <a:ext cx="10515600" cy="4351338"/>
+            <a:off x="628650" y="1825625"/>
+            <a:ext cx="7886700" cy="4351338"/>
           </a:xfrm>
           <a:prstGeom prst="rect">
             <a:avLst/>
@@ -3047,7 +3059,7 @@
               <a:rPr lang="en-US" smtClean="0"/>
               <a:t>Fifth level</a:t>
             </a:r>
-            <a:endParaRPr lang="en-US"/>
+            <a:endParaRPr lang="en-US" dirty="0"/>
           </a:p>
         </p:txBody>
       </p:sp>
@@ -3063,8 +3075,8 @@
         </p:nvSpPr>
         <p:spPr>
           <a:xfrm>
-            <a:off x="838200" y="6356350"/>
-            <a:ext cx="2743200" cy="365125"/>
+            <a:off x="628650" y="6356351"/>
+            <a:ext cx="2057400" cy="365125"/>
           </a:xfrm>
           <a:prstGeom prst="rect">
             <a:avLst/>
@@ -3086,7 +3098,7 @@
           <a:p>
             <a:fld id="{3B86C474-5A3B-4572-83DF-E10892B0A5A0}" type="datetimeFigureOut">
               <a:rPr lang="en-US" smtClean="0"/>
-              <a:t>4/30/2015</a:t>
+              <a:t>5/22/2015</a:t>
             </a:fld>
             <a:endParaRPr lang="en-US"/>
           </a:p>
@@ -3104,8 +3116,8 @@
         </p:nvSpPr>
         <p:spPr>
           <a:xfrm>
-            <a:off x="4038600" y="6356350"/>
-            <a:ext cx="4114800" cy="365125"/>
+            <a:off x="3028950" y="6356351"/>
+            <a:ext cx="3086100" cy="365125"/>
           </a:xfrm>
           <a:prstGeom prst="rect">
             <a:avLst/>
@@ -3141,8 +3153,8 @@
         </p:nvSpPr>
         <p:spPr>
           <a:xfrm>
-            <a:off x="8610600" y="6356350"/>
-            <a:ext cx="2743200" cy="365125"/>
+            <a:off x="6457950" y="6356351"/>
+            <a:ext cx="2057400" cy="365125"/>
           </a:xfrm>
           <a:prstGeom prst="rect">
             <a:avLst/>
@@ -3173,23 +3185,23 @@
     </p:spTree>
     <p:extLst>
       <p:ext uri="{BB962C8B-B14F-4D97-AF65-F5344CB8AC3E}">
-        <p14:creationId xmlns:p14="http://schemas.microsoft.com/office/powerpoint/2010/main" val="3642464771"/>
+        <p14:creationId xmlns:p14="http://schemas.microsoft.com/office/powerpoint/2010/main" val="3474717654"/>
       </p:ext>
     </p:extLst>
   </p:cSld>
   <p:clrMap bg1="lt1" tx1="dk1" bg2="lt2" tx2="dk2" accent1="accent1" accent2="accent2" accent3="accent3" accent4="accent4" accent5="accent5" accent6="accent6" hlink="hlink" folHlink="folHlink"/>
   <p:sldLayoutIdLst>
-    <p:sldLayoutId id="2147483649" r:id="rId1"/>
-    <p:sldLayoutId id="2147483650" r:id="rId2"/>
-    <p:sldLayoutId id="2147483651" r:id="rId3"/>
-    <p:sldLayoutId id="2147483652" r:id="rId4"/>
-    <p:sldLayoutId id="2147483653" r:id="rId5"/>
-    <p:sldLayoutId id="2147483654" r:id="rId6"/>
-    <p:sldLayoutId id="2147483655" r:id="rId7"/>
-    <p:sldLayoutId id="2147483656" r:id="rId8"/>
-    <p:sldLayoutId id="2147483657" r:id="rId9"/>
-    <p:sldLayoutId id="2147483658" r:id="rId10"/>
-    <p:sldLayoutId id="2147483659" r:id="rId11"/>
+    <p:sldLayoutId id="2147483661" r:id="rId1"/>
+    <p:sldLayoutId id="2147483662" r:id="rId2"/>
+    <p:sldLayoutId id="2147483663" r:id="rId3"/>
+    <p:sldLayoutId id="2147483664" r:id="rId4"/>
+    <p:sldLayoutId id="2147483665" r:id="rId5"/>
+    <p:sldLayoutId id="2147483666" r:id="rId6"/>
+    <p:sldLayoutId id="2147483667" r:id="rId7"/>
+    <p:sldLayoutId id="2147483668" r:id="rId8"/>
+    <p:sldLayoutId id="2147483669" r:id="rId9"/>
+    <p:sldLayoutId id="2147483670" r:id="rId10"/>
+    <p:sldLayoutId id="2147483671" r:id="rId11"/>
   </p:sldLayoutIdLst>
   <p:txStyles>
     <p:titleStyle>
@@ -3493,6 +3505,158 @@
       </p:grpSpPr>
       <p:cxnSp>
         <p:nvCxnSpPr>
+          <p:cNvPr id="22" name="Straight Connector 21"/>
+          <p:cNvCxnSpPr>
+            <a:stCxn id="137" idx="7"/>
+            <a:endCxn id="4" idx="0"/>
+          </p:cNvCxnSpPr>
+          <p:nvPr/>
+        </p:nvCxnSpPr>
+        <p:spPr>
+          <a:xfrm flipV="1">
+            <a:off x="4254610" y="1545579"/>
+            <a:ext cx="136973" cy="566231"/>
+          </a:xfrm>
+          <a:prstGeom prst="line">
+            <a:avLst/>
+          </a:prstGeom>
+          <a:ln>
+            <a:solidFill>
+              <a:schemeClr val="tx1"/>
+            </a:solidFill>
+          </a:ln>
+        </p:spPr>
+        <p:style>
+          <a:lnRef idx="1">
+            <a:schemeClr val="accent1"/>
+          </a:lnRef>
+          <a:fillRef idx="0">
+            <a:schemeClr val="accent1"/>
+          </a:fillRef>
+          <a:effectRef idx="0">
+            <a:schemeClr val="accent1"/>
+          </a:effectRef>
+          <a:fontRef idx="minor">
+            <a:schemeClr val="tx1"/>
+          </a:fontRef>
+        </p:style>
+      </p:cxnSp>
+      <p:cxnSp>
+        <p:nvCxnSpPr>
+          <p:cNvPr id="13" name="Straight Connector 12"/>
+          <p:cNvCxnSpPr>
+            <a:stCxn id="124" idx="1"/>
+            <a:endCxn id="4" idx="0"/>
+          </p:cNvCxnSpPr>
+          <p:nvPr/>
+        </p:nvCxnSpPr>
+        <p:spPr>
+          <a:xfrm flipH="1" flipV="1">
+            <a:off x="4391583" y="1545579"/>
+            <a:ext cx="261844" cy="544180"/>
+          </a:xfrm>
+          <a:prstGeom prst="line">
+            <a:avLst/>
+          </a:prstGeom>
+          <a:ln>
+            <a:solidFill>
+              <a:schemeClr val="tx1"/>
+            </a:solidFill>
+          </a:ln>
+        </p:spPr>
+        <p:style>
+          <a:lnRef idx="1">
+            <a:schemeClr val="accent1"/>
+          </a:lnRef>
+          <a:fillRef idx="0">
+            <a:schemeClr val="accent1"/>
+          </a:fillRef>
+          <a:effectRef idx="0">
+            <a:schemeClr val="accent1"/>
+          </a:effectRef>
+          <a:fontRef idx="minor">
+            <a:schemeClr val="tx1"/>
+          </a:fontRef>
+        </p:style>
+      </p:cxnSp>
+      <p:cxnSp>
+        <p:nvCxnSpPr>
+          <p:cNvPr id="59" name="Straight Connector 58"/>
+          <p:cNvCxnSpPr>
+            <a:stCxn id="114" idx="0"/>
+            <a:endCxn id="153" idx="2"/>
+          </p:cNvCxnSpPr>
+          <p:nvPr/>
+        </p:nvCxnSpPr>
+        <p:spPr>
+          <a:xfrm flipV="1">
+            <a:off x="1710786" y="4819916"/>
+            <a:ext cx="3204" cy="260051"/>
+          </a:xfrm>
+          <a:prstGeom prst="line">
+            <a:avLst/>
+          </a:prstGeom>
+          <a:ln>
+            <a:solidFill>
+              <a:schemeClr val="tx1"/>
+            </a:solidFill>
+          </a:ln>
+        </p:spPr>
+        <p:style>
+          <a:lnRef idx="1">
+            <a:schemeClr val="accent1"/>
+          </a:lnRef>
+          <a:fillRef idx="0">
+            <a:schemeClr val="accent1"/>
+          </a:fillRef>
+          <a:effectRef idx="0">
+            <a:schemeClr val="accent1"/>
+          </a:effectRef>
+          <a:fontRef idx="minor">
+            <a:schemeClr val="tx1"/>
+          </a:fontRef>
+        </p:style>
+      </p:cxnSp>
+      <p:cxnSp>
+        <p:nvCxnSpPr>
+          <p:cNvPr id="20" name="Straight Connector 19"/>
+          <p:cNvCxnSpPr>
+            <a:stCxn id="118" idx="3"/>
+            <a:endCxn id="5" idx="0"/>
+          </p:cNvCxnSpPr>
+          <p:nvPr/>
+        </p:nvCxnSpPr>
+        <p:spPr>
+          <a:xfrm flipH="1">
+            <a:off x="796569" y="473434"/>
+            <a:ext cx="2160701" cy="902017"/>
+          </a:xfrm>
+          <a:prstGeom prst="line">
+            <a:avLst/>
+          </a:prstGeom>
+          <a:ln>
+            <a:solidFill>
+              <a:schemeClr val="tx1"/>
+            </a:solidFill>
+          </a:ln>
+        </p:spPr>
+        <p:style>
+          <a:lnRef idx="1">
+            <a:schemeClr val="accent1"/>
+          </a:lnRef>
+          <a:fillRef idx="0">
+            <a:schemeClr val="accent1"/>
+          </a:fillRef>
+          <a:effectRef idx="0">
+            <a:schemeClr val="accent1"/>
+          </a:effectRef>
+          <a:fontRef idx="minor">
+            <a:schemeClr val="tx1"/>
+          </a:fontRef>
+        </p:style>
+      </p:cxnSp>
+      <p:cxnSp>
+        <p:nvCxnSpPr>
           <p:cNvPr id="60" name="Elbow Connector 59"/>
           <p:cNvCxnSpPr>
             <a:stCxn id="162" idx="3"/>
@@ -3502,12 +3666,12 @@
         </p:nvCxnSpPr>
         <p:spPr>
           <a:xfrm flipV="1">
-            <a:off x="8494152" y="1766572"/>
-            <a:ext cx="1265573" cy="1840049"/>
+            <a:off x="6040133" y="1917011"/>
+            <a:ext cx="958965" cy="1327408"/>
           </a:xfrm>
           <a:prstGeom prst="bentConnector3">
             <a:avLst>
-              <a:gd name="adj1" fmla="val 20834"/>
+              <a:gd name="adj1" fmla="val 50000"/>
             </a:avLst>
           </a:prstGeom>
           <a:ln>
@@ -3536,14 +3700,14 @@
           <p:cNvPr id="3" name="Straight Connector 2"/>
           <p:cNvCxnSpPr>
             <a:stCxn id="179" idx="2"/>
-            <a:endCxn id="130" idx="0"/>
+            <a:endCxn id="130" idx="2"/>
           </p:cNvCxnSpPr>
           <p:nvPr/>
         </p:nvCxnSpPr>
         <p:spPr>
-          <a:xfrm flipH="1">
-            <a:off x="5715423" y="4006258"/>
-            <a:ext cx="90453" cy="841931"/>
+          <a:xfrm>
+            <a:off x="3351857" y="3644056"/>
+            <a:ext cx="781789" cy="262811"/>
           </a:xfrm>
           <a:prstGeom prst="line">
             <a:avLst/>
@@ -3579,12 +3743,16 @@
           <p:nvPr/>
         </p:nvCxnSpPr>
         <p:spPr>
-          <a:xfrm>
-            <a:off x="1301221" y="1901308"/>
-            <a:ext cx="1086270" cy="1438894"/>
-          </a:xfrm>
-          <a:prstGeom prst="bentConnector3">
-            <a:avLst/>
+          <a:xfrm flipH="1">
+            <a:off x="838668" y="1788263"/>
+            <a:ext cx="497768" cy="1158548"/>
+          </a:xfrm>
+          <a:prstGeom prst="bentConnector5">
+            <a:avLst>
+              <a:gd name="adj1" fmla="val -45925"/>
+              <a:gd name="adj2" fmla="val 54024"/>
+              <a:gd name="adj3" fmla="val 145925"/>
+            </a:avLst>
           </a:prstGeom>
           <a:ln>
             <a:solidFill>
@@ -3615,7 +3783,7 @@
         </p:nvSpPr>
         <p:spPr>
           <a:xfrm>
-            <a:off x="10524334" y="1681389"/>
+            <a:off x="7763707" y="1831828"/>
             <a:ext cx="227800" cy="173132"/>
           </a:xfrm>
           <a:prstGeom prst="rect">
@@ -3667,7 +3835,7 @@
         </p:nvSpPr>
         <p:spPr>
           <a:xfrm>
-            <a:off x="9759725" y="1680006"/>
+            <a:off x="6999098" y="1830445"/>
             <a:ext cx="227800" cy="173132"/>
           </a:xfrm>
           <a:prstGeom prst="rect">
@@ -3722,8 +3890,8 @@
         </p:nvCxnSpPr>
         <p:spPr>
           <a:xfrm flipH="1">
-            <a:off x="9323346" y="1853138"/>
-            <a:ext cx="550279" cy="941441"/>
+            <a:off x="6830502" y="2003577"/>
+            <a:ext cx="282496" cy="481713"/>
           </a:xfrm>
           <a:prstGeom prst="line">
             <a:avLst/>
@@ -3760,8 +3928,8 @@
         </p:nvCxnSpPr>
         <p:spPr>
           <a:xfrm flipH="1" flipV="1">
-            <a:off x="10638234" y="1854521"/>
-            <a:ext cx="395713" cy="940058"/>
+            <a:off x="7877607" y="2004960"/>
+            <a:ext cx="663496" cy="480330"/>
           </a:xfrm>
           <a:prstGeom prst="line">
             <a:avLst/>
@@ -3798,8 +3966,8 @@
         </p:nvCxnSpPr>
         <p:spPr>
           <a:xfrm>
-            <a:off x="4033237" y="3340202"/>
-            <a:ext cx="1218276" cy="253245"/>
+            <a:off x="2484414" y="2946811"/>
+            <a:ext cx="313080" cy="284434"/>
           </a:xfrm>
           <a:prstGeom prst="bentConnector3">
             <a:avLst/>
@@ -3833,7 +4001,7 @@
         </p:nvSpPr>
         <p:spPr>
           <a:xfrm>
-            <a:off x="10996611" y="2676376"/>
+            <a:off x="8503767" y="2367087"/>
             <a:ext cx="306494" cy="369332"/>
           </a:xfrm>
           <a:prstGeom prst="rect">
@@ -3851,7 +4019,7 @@
           <a:lstStyle/>
           <a:p>
             <a:r>
-              <a:rPr lang="en-US" dirty="0" smtClean="0"/>
+              <a:rPr lang="en-US" dirty="0"/>
               <a:t>n</a:t>
             </a:r>
             <a:endParaRPr lang="en-US" dirty="0"/>
@@ -3868,9 +4036,9 @@
           <p:nvPr/>
         </p:nvCxnSpPr>
         <p:spPr>
-          <a:xfrm flipH="1" flipV="1">
-            <a:off x="389004" y="934756"/>
-            <a:ext cx="372350" cy="553740"/>
+          <a:xfrm flipV="1">
+            <a:off x="796569" y="908890"/>
+            <a:ext cx="2973394" cy="466561"/>
           </a:xfrm>
           <a:prstGeom prst="line">
             <a:avLst/>
@@ -3907,8 +4075,8 @@
         </p:nvCxnSpPr>
         <p:spPr>
           <a:xfrm flipH="1">
-            <a:off x="761354" y="1034698"/>
-            <a:ext cx="1776937" cy="453798"/>
+            <a:off x="796569" y="1258680"/>
+            <a:ext cx="3047389" cy="116771"/>
           </a:xfrm>
           <a:prstGeom prst="line">
             <a:avLst/>
@@ -3938,15 +4106,15 @@
         <p:nvCxnSpPr>
           <p:cNvPr id="365" name="Straight Connector 364"/>
           <p:cNvCxnSpPr>
-            <a:stCxn id="363" idx="3"/>
+            <a:stCxn id="363" idx="4"/>
             <a:endCxn id="5" idx="0"/>
           </p:cNvCxnSpPr>
           <p:nvPr/>
         </p:nvCxnSpPr>
         <p:spPr>
           <a:xfrm flipH="1">
-            <a:off x="761354" y="505628"/>
-            <a:ext cx="2158232" cy="982868"/>
+            <a:off x="796569" y="677565"/>
+            <a:ext cx="205847" cy="697886"/>
           </a:xfrm>
           <a:prstGeom prst="line">
             <a:avLst/>
@@ -3977,14 +4145,14 @@
           <p:cNvPr id="373" name="Straight Connector 372"/>
           <p:cNvCxnSpPr>
             <a:stCxn id="371" idx="2"/>
-            <a:endCxn id="153" idx="3"/>
+            <a:endCxn id="153" idx="2"/>
           </p:cNvCxnSpPr>
           <p:nvPr/>
         </p:nvCxnSpPr>
         <p:spPr>
           <a:xfrm flipH="1" flipV="1">
-            <a:off x="1366346" y="5000833"/>
-            <a:ext cx="495441" cy="136125"/>
+            <a:off x="1713990" y="4819916"/>
+            <a:ext cx="359758" cy="141437"/>
           </a:xfrm>
           <a:prstGeom prst="line">
             <a:avLst/>
@@ -4014,15 +4182,15 @@
         <p:nvCxnSpPr>
           <p:cNvPr id="375" name="Straight Connector 374"/>
           <p:cNvCxnSpPr>
-            <a:stCxn id="153" idx="3"/>
-            <a:endCxn id="370" idx="1"/>
+            <a:stCxn id="153" idx="2"/>
+            <a:endCxn id="370" idx="6"/>
           </p:cNvCxnSpPr>
           <p:nvPr/>
         </p:nvCxnSpPr>
         <p:spPr>
-          <a:xfrm>
-            <a:off x="1366346" y="5000833"/>
-            <a:ext cx="180936" cy="404719"/>
+          <a:xfrm flipH="1">
+            <a:off x="1333474" y="4819916"/>
+            <a:ext cx="380516" cy="139766"/>
           </a:xfrm>
           <a:prstGeom prst="line">
             <a:avLst/>
@@ -4059,8 +4227,8 @@
         </p:nvCxnSpPr>
         <p:spPr>
           <a:xfrm>
-            <a:off x="5805876" y="4006258"/>
-            <a:ext cx="679348" cy="586089"/>
+            <a:off x="3351857" y="3644056"/>
+            <a:ext cx="506850" cy="576823"/>
           </a:xfrm>
           <a:prstGeom prst="line">
             <a:avLst/>
@@ -4094,7 +4262,7 @@
         </p:nvSpPr>
         <p:spPr>
           <a:xfrm>
-            <a:off x="2063853" y="3047811"/>
+            <a:off x="641562" y="2513184"/>
             <a:ext cx="369012" cy="369332"/>
           </a:xfrm>
           <a:prstGeom prst="rect">
@@ -4123,7 +4291,7 @@
         </p:nvSpPr>
         <p:spPr>
           <a:xfrm>
-            <a:off x="5216176" y="1641330"/>
+            <a:off x="3590440" y="1358671"/>
             <a:ext cx="306494" cy="369332"/>
           </a:xfrm>
           <a:prstGeom prst="rect">
@@ -4138,7 +4306,7 @@
           <a:lstStyle/>
           <a:p>
             <a:r>
-              <a:rPr lang="en-US" dirty="0" smtClean="0"/>
+              <a:rPr lang="en-US" dirty="0"/>
               <a:t>n</a:t>
             </a:r>
             <a:endParaRPr lang="en-US" dirty="0"/>
@@ -4153,7 +4321,7 @@
         </p:nvSpPr>
         <p:spPr>
           <a:xfrm>
-            <a:off x="6596818" y="1655328"/>
+            <a:off x="4971082" y="1372669"/>
             <a:ext cx="301686" cy="369332"/>
           </a:xfrm>
           <a:prstGeom prst="rect">
@@ -4185,7 +4353,7 @@
         </p:nvCxnSpPr>
         <p:spPr>
           <a:xfrm>
-            <a:off x="9704477" y="645571"/>
+            <a:off x="6943850" y="796010"/>
             <a:ext cx="567743" cy="389127"/>
           </a:xfrm>
           <a:prstGeom prst="line">
@@ -4223,7 +4391,7 @@
         </p:nvCxnSpPr>
         <p:spPr>
           <a:xfrm flipH="1">
-            <a:off x="10272220" y="459626"/>
+            <a:off x="7511593" y="610065"/>
             <a:ext cx="195339" cy="575072"/>
           </a:xfrm>
           <a:prstGeom prst="line">
@@ -4261,7 +4429,7 @@
         </p:nvCxnSpPr>
         <p:spPr>
           <a:xfrm flipH="1">
-            <a:off x="9230531" y="5520179"/>
+            <a:off x="6551681" y="4467218"/>
             <a:ext cx="905833" cy="421796"/>
           </a:xfrm>
           <a:prstGeom prst="line">
@@ -4299,7 +4467,7 @@
         </p:nvCxnSpPr>
         <p:spPr>
           <a:xfrm flipH="1" flipV="1">
-            <a:off x="9230531" y="5941975"/>
+            <a:off x="6551681" y="4889014"/>
             <a:ext cx="900034" cy="45178"/>
           </a:xfrm>
           <a:prstGeom prst="line">
@@ -4337,7 +4505,7 @@
         </p:nvCxnSpPr>
         <p:spPr>
           <a:xfrm flipH="1" flipV="1">
-            <a:off x="9230531" y="5941975"/>
+            <a:off x="6551681" y="4889014"/>
             <a:ext cx="537800" cy="520367"/>
           </a:xfrm>
           <a:prstGeom prst="line">
@@ -4372,8 +4540,38 @@
         </p:nvSpPr>
         <p:spPr>
           <a:xfrm>
-            <a:off x="741059" y="4265500"/>
-            <a:ext cx="306494" cy="369332"/>
+            <a:off x="688063" y="4144083"/>
+            <a:ext cx="286245" cy="369332"/>
+          </a:xfrm>
+          <a:prstGeom prst="rect">
+            <a:avLst/>
+          </a:prstGeom>
+          <a:noFill/>
+        </p:spPr>
+        <p:txBody>
+          <a:bodyPr wrap="square" rtlCol="0">
+            <a:spAutoFit/>
+          </a:bodyPr>
+          <a:lstStyle/>
+          <a:p>
+            <a:r>
+              <a:rPr lang="en-US" dirty="0"/>
+              <a:t>n</a:t>
+            </a:r>
+            <a:endParaRPr lang="en-US" dirty="0"/>
+          </a:p>
+        </p:txBody>
+      </p:sp>
+      <p:sp>
+        <p:nvSpPr>
+          <p:cNvPr id="511" name="TextBox 510"/>
+          <p:cNvSpPr txBox="1"/>
+          <p:nvPr/>
+        </p:nvSpPr>
+        <p:spPr>
+          <a:xfrm>
+            <a:off x="2607844" y="4203032"/>
+            <a:ext cx="369012" cy="369332"/>
           </a:xfrm>
           <a:prstGeom prst="rect">
             <a:avLst/>
@@ -4387,36 +4585,6 @@
           <a:lstStyle/>
           <a:p>
             <a:r>
-              <a:rPr lang="en-US" dirty="0" smtClean="0"/>
-              <a:t>n</a:t>
-            </a:r>
-            <a:endParaRPr lang="en-US" dirty="0"/>
-          </a:p>
-        </p:txBody>
-      </p:sp>
-      <p:sp>
-        <p:nvSpPr>
-          <p:cNvPr id="511" name="TextBox 510"/>
-          <p:cNvSpPr txBox="1"/>
-          <p:nvPr/>
-        </p:nvSpPr>
-        <p:spPr>
-          <a:xfrm>
-            <a:off x="713236" y="5385508"/>
-            <a:ext cx="369012" cy="369332"/>
-          </a:xfrm>
-          <a:prstGeom prst="rect">
-            <a:avLst/>
-          </a:prstGeom>
-          <a:noFill/>
-        </p:spPr>
-        <p:txBody>
-          <a:bodyPr wrap="none" rtlCol="0">
-            <a:spAutoFit/>
-          </a:bodyPr>
-          <a:lstStyle/>
-          <a:p>
-            <a:r>
               <a:rPr lang="en-US" dirty="0"/>
               <a:t>m</a:t>
             </a:r>
@@ -4431,7 +4599,7 @@
         </p:nvSpPr>
         <p:spPr>
           <a:xfrm>
-            <a:off x="993" y="585132"/>
+            <a:off x="3381952" y="559266"/>
             <a:ext cx="776022" cy="349624"/>
           </a:xfrm>
           <a:prstGeom prst="ellipse">
@@ -4471,7 +4639,7 @@
           <a:p>
             <a:pPr algn="ctr"/>
             <a:r>
-              <a:rPr lang="en-US" sz="1400" dirty="0" err="1" smtClean="0">
+              <a:rPr lang="en-US" sz="1400" dirty="0" err="1">
                 <a:solidFill>
                   <a:schemeClr val="tx1"/>
                 </a:solidFill>
@@ -4494,7 +4662,7 @@
         </p:nvSpPr>
         <p:spPr>
           <a:xfrm>
-            <a:off x="2391260" y="736275"/>
+            <a:off x="3696927" y="960257"/>
             <a:ext cx="1003993" cy="349624"/>
           </a:xfrm>
           <a:prstGeom prst="ellipse">
@@ -4534,7 +4702,7 @@
           <a:p>
             <a:pPr algn="ctr"/>
             <a:r>
-              <a:rPr lang="en-US" sz="1400" dirty="0" smtClean="0">
+              <a:rPr lang="en-US" sz="1400" dirty="0">
                 <a:solidFill>
                   <a:schemeClr val="tx1"/>
                 </a:solidFill>
@@ -4557,7 +4725,7 @@
         </p:nvSpPr>
         <p:spPr>
           <a:xfrm>
-            <a:off x="2747060" y="176035"/>
+            <a:off x="413377" y="291423"/>
             <a:ext cx="1178078" cy="386142"/>
           </a:xfrm>
           <a:prstGeom prst="ellipse">
@@ -4597,7 +4765,7 @@
           <a:p>
             <a:pPr algn="ctr"/>
             <a:r>
-              <a:rPr lang="en-US" sz="1400" u="sng" dirty="0" err="1" smtClean="0">
+              <a:rPr lang="en-US" sz="1400" u="sng" dirty="0" err="1">
                 <a:solidFill>
                   <a:schemeClr val="tx1"/>
                 </a:solidFill>
@@ -4620,7 +4788,7 @@
         </p:nvSpPr>
         <p:spPr>
           <a:xfrm>
-            <a:off x="10136364" y="5345367"/>
+            <a:off x="7457514" y="4292406"/>
             <a:ext cx="1308751" cy="349624"/>
           </a:xfrm>
           <a:prstGeom prst="ellipse">
@@ -4660,7 +4828,7 @@
           <a:p>
             <a:pPr algn="ctr"/>
             <a:r>
-              <a:rPr lang="en-US" sz="1400" u="sng" dirty="0" smtClean="0">
+              <a:rPr lang="en-US" sz="1400" u="sng" dirty="0">
                 <a:solidFill>
                   <a:schemeClr val="tx1"/>
                 </a:solidFill>
@@ -4683,7 +4851,7 @@
         </p:nvSpPr>
         <p:spPr>
           <a:xfrm>
-            <a:off x="1412809" y="5354351"/>
+            <a:off x="415234" y="4784870"/>
             <a:ext cx="918240" cy="349624"/>
           </a:xfrm>
           <a:prstGeom prst="ellipse">
@@ -4723,7 +4891,7 @@
           <a:p>
             <a:pPr algn="ctr"/>
             <a:r>
-              <a:rPr lang="en-US" sz="1400" dirty="0" smtClean="0">
+              <a:rPr lang="en-US" sz="1400" dirty="0">
                 <a:solidFill>
                   <a:schemeClr val="tx1"/>
                 </a:solidFill>
@@ -4746,7 +4914,7 @@
         </p:nvSpPr>
         <p:spPr>
           <a:xfrm>
-            <a:off x="1861787" y="4962146"/>
+            <a:off x="2073748" y="4786541"/>
             <a:ext cx="1427859" cy="349624"/>
           </a:xfrm>
           <a:prstGeom prst="ellipse">
@@ -4786,7 +4954,7 @@
           <a:p>
             <a:pPr algn="ctr"/>
             <a:r>
-              <a:rPr lang="en-US" sz="1400" dirty="0" smtClean="0">
+              <a:rPr lang="en-US" sz="1400" dirty="0">
                 <a:solidFill>
                   <a:schemeClr val="tx1"/>
                 </a:solidFill>
@@ -4809,7 +4977,7 @@
         </p:nvSpPr>
         <p:spPr>
           <a:xfrm>
-            <a:off x="10130565" y="5812341"/>
+            <a:off x="7451715" y="4759380"/>
             <a:ext cx="1314550" cy="349624"/>
           </a:xfrm>
           <a:prstGeom prst="ellipse">
@@ -4849,7 +5017,7 @@
           <a:p>
             <a:pPr algn="ctr"/>
             <a:r>
-              <a:rPr lang="en-US" sz="1400" dirty="0" smtClean="0">
+              <a:rPr lang="en-US" sz="1400" dirty="0">
                 <a:solidFill>
                   <a:schemeClr val="tx1"/>
                 </a:solidFill>
@@ -4872,7 +5040,7 @@
         </p:nvSpPr>
         <p:spPr>
           <a:xfrm>
-            <a:off x="9768331" y="6287530"/>
+            <a:off x="7089481" y="5234569"/>
             <a:ext cx="1805238" cy="349624"/>
           </a:xfrm>
           <a:prstGeom prst="ellipse">
@@ -4921,7 +5089,7 @@
               <a:t>n</a:t>
             </a:r>
             <a:r>
-              <a:rPr lang="en-US" sz="1400" dirty="0" err="1" smtClean="0">
+              <a:rPr lang="en-US" sz="1400" dirty="0" err="1">
                 <a:solidFill>
                   <a:schemeClr val="tx1"/>
                 </a:solidFill>
@@ -4944,7 +5112,7 @@
         </p:nvSpPr>
         <p:spPr>
           <a:xfrm>
-            <a:off x="6264500" y="4541146"/>
+            <a:off x="3637983" y="4169678"/>
             <a:ext cx="1507198" cy="349624"/>
           </a:xfrm>
           <a:prstGeom prst="ellipse">
@@ -4984,7 +5152,7 @@
           <a:p>
             <a:pPr algn="ctr"/>
             <a:r>
-              <a:rPr lang="en-US" sz="1400" dirty="0" err="1" smtClean="0">
+              <a:rPr lang="en-US" sz="1400" dirty="0" err="1">
                 <a:solidFill>
                   <a:schemeClr val="tx1"/>
                 </a:solidFill>
@@ -5007,7 +5175,7 @@
         </p:nvSpPr>
         <p:spPr>
           <a:xfrm>
-            <a:off x="8964820" y="306902"/>
+            <a:off x="6204193" y="457341"/>
             <a:ext cx="866562" cy="396775"/>
           </a:xfrm>
           <a:prstGeom prst="ellipse">
@@ -5047,7 +5215,7 @@
           <a:p>
             <a:pPr algn="ctr"/>
             <a:r>
-              <a:rPr lang="en-US" sz="1400" dirty="0" smtClean="0">
+              <a:rPr lang="en-US" sz="1400" dirty="0">
                 <a:solidFill>
                   <a:schemeClr val="tx1"/>
                 </a:solidFill>
@@ -5070,7 +5238,7 @@
         </p:nvSpPr>
         <p:spPr>
           <a:xfrm>
-            <a:off x="9761215" y="110002"/>
+            <a:off x="7000588" y="260441"/>
             <a:ext cx="1412687" cy="349624"/>
           </a:xfrm>
           <a:prstGeom prst="ellipse">
@@ -5110,7 +5278,7 @@
           <a:p>
             <a:pPr algn="ctr"/>
             <a:r>
-              <a:rPr lang="en-US" sz="1400" dirty="0" smtClean="0">
+              <a:rPr lang="en-US" sz="1400" dirty="0">
                 <a:solidFill>
                   <a:schemeClr val="tx1"/>
                 </a:solidFill>
@@ -5133,7 +5301,7 @@
         </p:nvSpPr>
         <p:spPr>
           <a:xfrm>
-            <a:off x="9613292" y="4774942"/>
+            <a:off x="6934442" y="3721981"/>
             <a:ext cx="1314550" cy="349624"/>
           </a:xfrm>
           <a:prstGeom prst="ellipse">
@@ -5173,7 +5341,7 @@
           <a:p>
             <a:pPr algn="ctr"/>
             <a:r>
-              <a:rPr lang="en-US" sz="1400" u="sng" dirty="0" smtClean="0">
+              <a:rPr lang="en-US" sz="1400" u="sng" dirty="0">
                 <a:solidFill>
                   <a:schemeClr val="tx1"/>
                 </a:solidFill>
@@ -5199,7 +5367,7 @@
         </p:nvCxnSpPr>
         <p:spPr>
           <a:xfrm flipH="1">
-            <a:off x="9230531" y="5073365"/>
+            <a:off x="6551681" y="4020404"/>
             <a:ext cx="575272" cy="868610"/>
           </a:xfrm>
           <a:prstGeom prst="line">
@@ -5234,7 +5402,7 @@
         </p:nvSpPr>
         <p:spPr>
           <a:xfrm>
-            <a:off x="5409198" y="1828238"/>
+            <a:off x="3783462" y="1545579"/>
             <a:ext cx="1216241" cy="510466"/>
           </a:xfrm>
           <a:prstGeom prst="flowChartDecision">
@@ -5271,7 +5439,7 @@
           <a:p>
             <a:pPr algn="ctr"/>
             <a:r>
-              <a:rPr lang="en-US" sz="1400" dirty="0" smtClean="0">
+              <a:rPr lang="en-US" sz="1400" dirty="0">
                 <a:solidFill>
                   <a:schemeClr val="tx1"/>
                 </a:solidFill>
@@ -5294,7 +5462,7 @@
         </p:nvSpPr>
         <p:spPr>
           <a:xfrm>
-            <a:off x="9323346" y="2498446"/>
+            <a:off x="6830502" y="2189157"/>
             <a:ext cx="1710601" cy="592266"/>
           </a:xfrm>
           <a:prstGeom prst="flowChartDecision">
@@ -5331,7 +5499,7 @@
           <a:p>
             <a:pPr algn="ctr"/>
             <a:r>
-              <a:rPr lang="en-US" sz="1400" dirty="0" smtClean="0">
+              <a:rPr lang="en-US" sz="1400" dirty="0">
                 <a:solidFill>
                   <a:schemeClr val="tx1"/>
                 </a:solidFill>
@@ -5354,7 +5522,7 @@
         </p:nvSpPr>
         <p:spPr>
           <a:xfrm>
-            <a:off x="115772" y="4732475"/>
+            <a:off x="1088703" y="4283201"/>
             <a:ext cx="1250574" cy="536715"/>
           </a:xfrm>
           <a:prstGeom prst="flowChartDecision">
@@ -5391,7 +5559,7 @@
           <a:p>
             <a:pPr algn="ctr"/>
             <a:r>
-              <a:rPr lang="en-US" sz="1400" dirty="0" smtClean="0">
+              <a:rPr lang="en-US" sz="1400" dirty="0">
                 <a:solidFill>
                   <a:schemeClr val="tx1"/>
                 </a:solidFill>
@@ -5414,7 +5582,7 @@
         </p:nvSpPr>
         <p:spPr>
           <a:xfrm>
-            <a:off x="2387491" y="3020629"/>
+            <a:off x="838668" y="2627238"/>
             <a:ext cx="1645746" cy="639145"/>
           </a:xfrm>
           <a:prstGeom prst="flowChartDecision">
@@ -5451,7 +5619,7 @@
           <a:p>
             <a:pPr algn="ctr"/>
             <a:r>
-              <a:rPr lang="en-US" sz="1400" dirty="0" smtClean="0">
+              <a:rPr lang="en-US" sz="1400" dirty="0">
                 <a:solidFill>
                   <a:schemeClr val="tx1"/>
                 </a:solidFill>
@@ -5466,44 +5634,6 @@
           </a:p>
         </p:txBody>
       </p:sp>
-      <p:cxnSp>
-        <p:nvCxnSpPr>
-          <p:cNvPr id="38" name="Straight Connector 37"/>
-          <p:cNvCxnSpPr>
-            <a:stCxn id="5" idx="2"/>
-            <a:endCxn id="153" idx="0"/>
-          </p:cNvCxnSpPr>
-          <p:nvPr/>
-        </p:nvCxnSpPr>
-        <p:spPr>
-          <a:xfrm flipH="1">
-            <a:off x="741059" y="2314119"/>
-            <a:ext cx="20295" cy="2418356"/>
-          </a:xfrm>
-          <a:prstGeom prst="line">
-            <a:avLst/>
-          </a:prstGeom>
-          <a:ln>
-            <a:solidFill>
-              <a:schemeClr val="tx1"/>
-            </a:solidFill>
-          </a:ln>
-        </p:spPr>
-        <p:style>
-          <a:lnRef idx="1">
-            <a:schemeClr val="accent1"/>
-          </a:lnRef>
-          <a:fillRef idx="0">
-            <a:schemeClr val="accent1"/>
-          </a:fillRef>
-          <a:effectRef idx="0">
-            <a:schemeClr val="accent1"/>
-          </a:effectRef>
-          <a:fontRef idx="minor">
-            <a:schemeClr val="tx1"/>
-          </a:fontRef>
-        </p:style>
-      </p:cxnSp>
       <p:cxnSp>
         <p:nvCxnSpPr>
           <p:cNvPr id="51" name="Elbow Connector 50"/>
@@ -5515,8 +5645,8 @@
         </p:nvCxnSpPr>
         <p:spPr>
           <a:xfrm flipV="1">
-            <a:off x="6625439" y="1447510"/>
-            <a:ext cx="3076804" cy="635961"/>
+            <a:off x="4999703" y="1597949"/>
+            <a:ext cx="1941913" cy="202863"/>
           </a:xfrm>
           <a:prstGeom prst="bentConnector3">
             <a:avLst/>
@@ -5553,8 +5683,8 @@
         </p:nvCxnSpPr>
         <p:spPr>
           <a:xfrm>
-            <a:off x="1301221" y="1901308"/>
-            <a:ext cx="4107977" cy="182163"/>
+            <a:off x="1336436" y="1788263"/>
+            <a:ext cx="2447026" cy="12549"/>
           </a:xfrm>
           <a:prstGeom prst="bentConnector3">
             <a:avLst/>
@@ -5588,7 +5718,7 @@
         </p:nvSpPr>
         <p:spPr>
           <a:xfrm>
-            <a:off x="8964820" y="2711634"/>
+            <a:off x="6471976" y="2402345"/>
             <a:ext cx="421910" cy="369332"/>
           </a:xfrm>
           <a:prstGeom prst="rect">
@@ -5606,7 +5736,7 @@
           <a:lstStyle/>
           <a:p>
             <a:r>
-              <a:rPr lang="en-US" dirty="0" smtClean="0"/>
+              <a:rPr lang="en-US" dirty="0"/>
               <a:t> m</a:t>
             </a:r>
             <a:endParaRPr lang="en-US" dirty="0"/>
@@ -5621,7 +5751,7 @@
         </p:nvSpPr>
         <p:spPr>
           <a:xfrm>
-            <a:off x="221486" y="1488496"/>
+            <a:off x="256701" y="1375451"/>
             <a:ext cx="1079735" cy="825623"/>
           </a:xfrm>
           <a:prstGeom prst="rect">
@@ -5661,7 +5791,7 @@
           <a:p>
             <a:pPr algn="ctr"/>
             <a:r>
-              <a:rPr lang="en-US" dirty="0" smtClean="0">
+              <a:rPr lang="en-US" dirty="0">
                 <a:solidFill>
                   <a:schemeClr val="tx1"/>
                 </a:solidFill>
@@ -5684,7 +5814,7 @@
         </p:nvSpPr>
         <p:spPr>
           <a:xfrm>
-            <a:off x="8240355" y="5529163"/>
+            <a:off x="5561505" y="4476202"/>
             <a:ext cx="990176" cy="825623"/>
           </a:xfrm>
           <a:prstGeom prst="rect">
@@ -5724,13 +5854,24 @@
           <a:p>
             <a:pPr algn="ctr"/>
             <a:r>
-              <a:rPr lang="en-US" dirty="0" smtClean="0">
+              <a:rPr lang="en-US" dirty="0">
                 <a:solidFill>
                   <a:schemeClr val="tx1"/>
                 </a:solidFill>
               </a:rPr>
               <a:t>User</a:t>
             </a:r>
+          </a:p>
+          <a:p>
+            <a:pPr algn="ctr"/>
+            <a:r>
+              <a:rPr lang="en-US" dirty="0">
+                <a:solidFill>
+                  <a:schemeClr val="tx1"/>
+                </a:solidFill>
+              </a:rPr>
+              <a:t>Account</a:t>
+            </a:r>
             <a:endParaRPr lang="en-US" dirty="0">
               <a:solidFill>
                 <a:schemeClr val="tx1"/>
@@ -5747,7 +5888,7 @@
         </p:nvSpPr>
         <p:spPr>
           <a:xfrm>
-            <a:off x="5251513" y="3180635"/>
+            <a:off x="2797494" y="2818433"/>
             <a:ext cx="1108726" cy="825623"/>
           </a:xfrm>
           <a:prstGeom prst="rect">
@@ -5787,7 +5928,7 @@
           <a:p>
             <a:pPr algn="ctr"/>
             <a:r>
-              <a:rPr lang="en-US" dirty="0" smtClean="0">
+              <a:rPr lang="en-US" dirty="0">
                 <a:solidFill>
                   <a:schemeClr val="tx1"/>
                 </a:solidFill>
@@ -5810,7 +5951,7 @@
         </p:nvSpPr>
         <p:spPr>
           <a:xfrm>
-            <a:off x="5001493" y="4848189"/>
+            <a:off x="4133646" y="3732055"/>
             <a:ext cx="1427859" cy="349624"/>
           </a:xfrm>
           <a:prstGeom prst="ellipse">
@@ -5850,7 +5991,7 @@
           <a:p>
             <a:pPr algn="ctr"/>
             <a:r>
-              <a:rPr lang="en-US" sz="1400" u="sng" dirty="0" smtClean="0">
+              <a:rPr lang="en-US" sz="1400" u="sng" dirty="0">
                 <a:solidFill>
                   <a:schemeClr val="tx1"/>
                 </a:solidFill>
@@ -5873,7 +6014,7 @@
         </p:nvSpPr>
         <p:spPr>
           <a:xfrm>
-            <a:off x="5252814" y="347556"/>
+            <a:off x="3171803" y="2053704"/>
             <a:ext cx="1268587" cy="396775"/>
           </a:xfrm>
           <a:prstGeom prst="ellipse">
@@ -5913,7 +6054,7 @@
           <a:p>
             <a:pPr algn="ctr"/>
             <a:r>
-              <a:rPr lang="en-US" sz="1400" dirty="0" err="1" smtClean="0">
+              <a:rPr lang="en-US" sz="1400" dirty="0" err="1">
                 <a:solidFill>
                   <a:schemeClr val="tx1"/>
                 </a:solidFill>
@@ -5936,7 +6077,7 @@
         </p:nvSpPr>
         <p:spPr>
           <a:xfrm>
-            <a:off x="3210364" y="3932995"/>
+            <a:off x="1505363" y="3438190"/>
             <a:ext cx="1158328" cy="396775"/>
           </a:xfrm>
           <a:prstGeom prst="ellipse">
@@ -5976,7 +6117,7 @@
           <a:p>
             <a:pPr algn="ctr"/>
             <a:r>
-              <a:rPr lang="en-US" sz="1400" dirty="0" err="1" smtClean="0">
+              <a:rPr lang="en-US" sz="1400" dirty="0" err="1">
                 <a:solidFill>
                   <a:schemeClr val="tx1"/>
                 </a:solidFill>
@@ -5991,44 +6132,6 @@
           </a:p>
         </p:txBody>
       </p:sp>
-      <p:cxnSp>
-        <p:nvCxnSpPr>
-          <p:cNvPr id="22" name="Straight Connector 21"/>
-          <p:cNvCxnSpPr>
-            <a:stCxn id="137" idx="4"/>
-            <a:endCxn id="4" idx="0"/>
-          </p:cNvCxnSpPr>
-          <p:nvPr/>
-        </p:nvCxnSpPr>
-        <p:spPr>
-          <a:xfrm>
-            <a:off x="5887108" y="744331"/>
-            <a:ext cx="130211" cy="1083907"/>
-          </a:xfrm>
-          <a:prstGeom prst="line">
-            <a:avLst/>
-          </a:prstGeom>
-          <a:ln>
-            <a:solidFill>
-              <a:schemeClr val="tx1"/>
-            </a:solidFill>
-          </a:ln>
-        </p:spPr>
-        <p:style>
-          <a:lnRef idx="1">
-            <a:schemeClr val="accent1"/>
-          </a:lnRef>
-          <a:fillRef idx="0">
-            <a:schemeClr val="accent1"/>
-          </a:fillRef>
-          <a:effectRef idx="0">
-            <a:schemeClr val="accent1"/>
-          </a:effectRef>
-          <a:fontRef idx="minor">
-            <a:schemeClr val="tx1"/>
-          </a:fontRef>
-        </p:style>
-      </p:cxnSp>
       <p:cxnSp>
         <p:nvCxnSpPr>
           <p:cNvPr id="24" name="Straight Connector 23"/>
@@ -6040,8 +6143,8 @@
         </p:nvCxnSpPr>
         <p:spPr>
           <a:xfrm>
-            <a:off x="3210364" y="3659774"/>
-            <a:ext cx="169633" cy="331327"/>
+            <a:off x="1661541" y="3266383"/>
+            <a:ext cx="13455" cy="229913"/>
           </a:xfrm>
           <a:prstGeom prst="line">
             <a:avLst/>
@@ -6075,7 +6178,7 @@
         </p:nvSpPr>
         <p:spPr>
           <a:xfrm>
-            <a:off x="4009360" y="3018742"/>
+            <a:off x="2272513" y="2533832"/>
             <a:ext cx="288709" cy="369332"/>
           </a:xfrm>
           <a:prstGeom prst="rect">
@@ -6090,7 +6193,7 @@
           <a:lstStyle/>
           <a:p>
             <a:r>
-              <a:rPr lang="en-US" dirty="0" smtClean="0"/>
+              <a:rPr lang="en-US" dirty="0"/>
               <a:t>n</a:t>
             </a:r>
             <a:endParaRPr lang="en-US" dirty="0"/>
@@ -6105,7 +6208,7 @@
         </p:nvSpPr>
         <p:spPr>
           <a:xfrm>
-            <a:off x="732207" y="133247"/>
+            <a:off x="1748266" y="183707"/>
             <a:ext cx="921388" cy="386142"/>
           </a:xfrm>
           <a:prstGeom prst="ellipse">
@@ -6145,7 +6248,7 @@
           <a:p>
             <a:pPr algn="ctr"/>
             <a:r>
-              <a:rPr lang="en-US" sz="1400" dirty="0" err="1" smtClean="0">
+              <a:rPr lang="en-US" sz="1400" dirty="0" err="1">
                 <a:solidFill>
                   <a:schemeClr val="tx1"/>
                 </a:solidFill>
@@ -6168,7 +6271,7 @@
         </p:nvSpPr>
         <p:spPr>
           <a:xfrm>
-            <a:off x="1746612" y="245745"/>
+            <a:off x="2822336" y="143841"/>
             <a:ext cx="921388" cy="386142"/>
           </a:xfrm>
           <a:prstGeom prst="ellipse">
@@ -6216,7 +6319,7 @@
               <a:t>l</a:t>
             </a:r>
             <a:r>
-              <a:rPr lang="en-US" sz="1400" dirty="0" err="1" smtClean="0">
+              <a:rPr lang="en-US" sz="1400" dirty="0" err="1">
                 <a:solidFill>
                   <a:schemeClr val="tx1"/>
                 </a:solidFill>
@@ -6239,7 +6342,7 @@
         </p:nvSpPr>
         <p:spPr>
           <a:xfrm>
-            <a:off x="2641942" y="1213583"/>
+            <a:off x="1894819" y="606924"/>
             <a:ext cx="1295408" cy="386142"/>
           </a:xfrm>
           <a:prstGeom prst="ellipse">
@@ -6279,7 +6382,7 @@
           <a:p>
             <a:pPr algn="ctr"/>
             <a:r>
-              <a:rPr lang="en-US" sz="1400" smtClean="0">
+              <a:rPr lang="en-US" sz="1400">
                 <a:solidFill>
                   <a:schemeClr val="tx1"/>
                 </a:solidFill>
@@ -6298,15 +6401,15 @@
         <p:nvCxnSpPr>
           <p:cNvPr id="15" name="Straight Connector 14"/>
           <p:cNvCxnSpPr>
-            <a:stCxn id="119" idx="2"/>
+            <a:stCxn id="119" idx="3"/>
             <a:endCxn id="5" idx="0"/>
           </p:cNvCxnSpPr>
           <p:nvPr/>
         </p:nvCxnSpPr>
         <p:spPr>
           <a:xfrm flipH="1">
-            <a:off x="761354" y="1406654"/>
-            <a:ext cx="1880588" cy="81842"/>
+            <a:off x="796569" y="936517"/>
+            <a:ext cx="1287958" cy="438934"/>
           </a:xfrm>
           <a:prstGeom prst="line">
             <a:avLst/>
@@ -6343,8 +6446,8 @@
         </p:nvCxnSpPr>
         <p:spPr>
           <a:xfrm flipH="1">
-            <a:off x="761354" y="462840"/>
-            <a:ext cx="105787" cy="1025656"/>
+            <a:off x="796569" y="513300"/>
+            <a:ext cx="1086631" cy="862151"/>
           </a:xfrm>
           <a:prstGeom prst="line">
             <a:avLst/>
@@ -6370,44 +6473,6 @@
           </a:fontRef>
         </p:style>
       </p:cxnSp>
-      <p:cxnSp>
-        <p:nvCxnSpPr>
-          <p:cNvPr id="20" name="Straight Connector 19"/>
-          <p:cNvCxnSpPr>
-            <a:stCxn id="118" idx="4"/>
-            <a:endCxn id="5" idx="0"/>
-          </p:cNvCxnSpPr>
-          <p:nvPr/>
-        </p:nvCxnSpPr>
-        <p:spPr>
-          <a:xfrm flipH="1">
-            <a:off x="761354" y="631887"/>
-            <a:ext cx="1445952" cy="856609"/>
-          </a:xfrm>
-          <a:prstGeom prst="line">
-            <a:avLst/>
-          </a:prstGeom>
-          <a:ln>
-            <a:solidFill>
-              <a:schemeClr val="tx1"/>
-            </a:solidFill>
-          </a:ln>
-        </p:spPr>
-        <p:style>
-          <a:lnRef idx="1">
-            <a:schemeClr val="accent1"/>
-          </a:lnRef>
-          <a:fillRef idx="0">
-            <a:schemeClr val="accent1"/>
-          </a:fillRef>
-          <a:effectRef idx="0">
-            <a:schemeClr val="accent1"/>
-          </a:effectRef>
-          <a:fontRef idx="minor">
-            <a:schemeClr val="tx1"/>
-          </a:fontRef>
-        </p:style>
-      </p:cxnSp>
       <p:sp>
         <p:nvSpPr>
           <p:cNvPr id="124" name="Oval 123"/>
@@ -6416,7 +6481,7 @@
         </p:nvSpPr>
         <p:spPr>
           <a:xfrm>
-            <a:off x="6170274" y="923233"/>
+            <a:off x="4488312" y="2031653"/>
             <a:ext cx="1127474" cy="396775"/>
           </a:xfrm>
           <a:prstGeom prst="ellipse">
@@ -6456,7 +6521,7 @@
           <a:p>
             <a:pPr algn="ctr"/>
             <a:r>
-              <a:rPr lang="en-US" sz="1400" dirty="0" err="1" smtClean="0">
+              <a:rPr lang="en-US" sz="1400" dirty="0" err="1">
                 <a:solidFill>
                   <a:schemeClr val="tx1"/>
                 </a:solidFill>
@@ -6471,44 +6536,6 @@
           </a:p>
         </p:txBody>
       </p:sp>
-      <p:cxnSp>
-        <p:nvCxnSpPr>
-          <p:cNvPr id="13" name="Straight Connector 12"/>
-          <p:cNvCxnSpPr>
-            <a:stCxn id="124" idx="4"/>
-            <a:endCxn id="4" idx="0"/>
-          </p:cNvCxnSpPr>
-          <p:nvPr/>
-        </p:nvCxnSpPr>
-        <p:spPr>
-          <a:xfrm flipH="1">
-            <a:off x="6017319" y="1320008"/>
-            <a:ext cx="716692" cy="508230"/>
-          </a:xfrm>
-          <a:prstGeom prst="line">
-            <a:avLst/>
-          </a:prstGeom>
-          <a:ln>
-            <a:solidFill>
-              <a:schemeClr val="tx1"/>
-            </a:solidFill>
-          </a:ln>
-        </p:spPr>
-        <p:style>
-          <a:lnRef idx="1">
-            <a:schemeClr val="accent1"/>
-          </a:lnRef>
-          <a:fillRef idx="0">
-            <a:schemeClr val="accent1"/>
-          </a:fillRef>
-          <a:effectRef idx="0">
-            <a:schemeClr val="accent1"/>
-          </a:effectRef>
-          <a:fontRef idx="minor">
-            <a:schemeClr val="tx1"/>
-          </a:fontRef>
-        </p:style>
-      </p:cxnSp>
       <p:sp>
         <p:nvSpPr>
           <p:cNvPr id="131" name="Oval 130"/>
@@ -6517,7 +6544,7 @@
         </p:nvSpPr>
         <p:spPr>
           <a:xfrm>
-            <a:off x="1853916" y="3910636"/>
+            <a:off x="169874" y="3398602"/>
             <a:ext cx="1268587" cy="396775"/>
           </a:xfrm>
           <a:prstGeom prst="ellipse">
@@ -6557,7 +6584,7 @@
           <a:p>
             <a:pPr algn="ctr"/>
             <a:r>
-              <a:rPr lang="en-US" sz="1400" dirty="0" err="1" smtClean="0">
+              <a:rPr lang="en-US" sz="1400" dirty="0" err="1">
                 <a:solidFill>
                   <a:schemeClr val="tx1"/>
                 </a:solidFill>
@@ -6583,8 +6610,8 @@
         </p:nvCxnSpPr>
         <p:spPr>
           <a:xfrm flipV="1">
-            <a:off x="2936723" y="3659774"/>
-            <a:ext cx="273641" cy="308968"/>
+            <a:off x="1252681" y="3266383"/>
+            <a:ext cx="408860" cy="190325"/>
           </a:xfrm>
           <a:prstGeom prst="line">
             <a:avLst/>
@@ -6618,7 +6645,7 @@
         </p:nvSpPr>
         <p:spPr>
           <a:xfrm>
-            <a:off x="10850828" y="550367"/>
+            <a:off x="8090201" y="700806"/>
             <a:ext cx="866562" cy="396775"/>
           </a:xfrm>
           <a:prstGeom prst="ellipse">
@@ -6658,7 +6685,7 @@
           <a:p>
             <a:pPr algn="ctr"/>
             <a:r>
-              <a:rPr lang="en-US" sz="1400" dirty="0" smtClean="0">
+              <a:rPr lang="en-US" sz="1400" dirty="0">
                 <a:solidFill>
                   <a:schemeClr val="tx1"/>
                 </a:solidFill>
@@ -6681,7 +6708,7 @@
         </p:nvSpPr>
         <p:spPr>
           <a:xfrm>
-            <a:off x="8397880" y="687554"/>
+            <a:off x="5637253" y="837993"/>
             <a:ext cx="866562" cy="396775"/>
           </a:xfrm>
           <a:prstGeom prst="ellipse">
@@ -6721,7 +6748,7 @@
           <a:p>
             <a:pPr algn="ctr"/>
             <a:r>
-              <a:rPr lang="en-US" sz="1400" dirty="0" err="1" smtClean="0">
+              <a:rPr lang="en-US" sz="1400" dirty="0" err="1">
                 <a:solidFill>
                   <a:schemeClr val="tx1"/>
                 </a:solidFill>
@@ -6747,7 +6774,7 @@
         </p:nvCxnSpPr>
         <p:spPr>
           <a:xfrm flipH="1">
-            <a:off x="10272220" y="889036"/>
+            <a:off x="7511593" y="1039475"/>
             <a:ext cx="705513" cy="145662"/>
           </a:xfrm>
           <a:prstGeom prst="line">
@@ -6785,7 +6812,7 @@
         </p:nvCxnSpPr>
         <p:spPr>
           <a:xfrm>
-            <a:off x="9264442" y="885942"/>
+            <a:off x="6503815" y="1036381"/>
             <a:ext cx="1007778" cy="148756"/>
           </a:xfrm>
           <a:prstGeom prst="line">
@@ -6820,7 +6847,7 @@
         </p:nvSpPr>
         <p:spPr>
           <a:xfrm>
-            <a:off x="6783551" y="3310488"/>
+            <a:off x="4329532" y="2948286"/>
             <a:ext cx="1710601" cy="592266"/>
           </a:xfrm>
           <a:prstGeom prst="flowChartDecision">
@@ -6857,7 +6884,7 @@
           <a:p>
             <a:pPr algn="ctr"/>
             <a:r>
-              <a:rPr lang="en-US" sz="1400" dirty="0" smtClean="0">
+              <a:rPr lang="en-US" sz="1400" dirty="0">
                 <a:solidFill>
                   <a:schemeClr val="tx1"/>
                 </a:solidFill>
@@ -6880,7 +6907,7 @@
         </p:nvSpPr>
         <p:spPr>
           <a:xfrm>
-            <a:off x="9702243" y="1034698"/>
+            <a:off x="6941616" y="1185137"/>
             <a:ext cx="1139953" cy="825623"/>
           </a:xfrm>
           <a:prstGeom prst="rect">
@@ -6920,7 +6947,7 @@
           <a:p>
             <a:pPr algn="ctr"/>
             <a:r>
-              <a:rPr lang="en-US" dirty="0" smtClean="0">
+              <a:rPr lang="en-US" dirty="0">
                 <a:solidFill>
                   <a:schemeClr val="tx1"/>
                 </a:solidFill>
@@ -6946,7 +6973,7 @@
         </p:nvCxnSpPr>
         <p:spPr>
           <a:xfrm>
-            <a:off x="6360239" y="3593447"/>
+            <a:off x="3906220" y="3231245"/>
             <a:ext cx="423312" cy="13174"/>
           </a:xfrm>
           <a:prstGeom prst="line">
@@ -6981,7 +7008,7 @@
         </p:nvSpPr>
         <p:spPr>
           <a:xfrm>
-            <a:off x="6549262" y="3203408"/>
+            <a:off x="4206409" y="2846557"/>
             <a:ext cx="301686" cy="369332"/>
           </a:xfrm>
           <a:prstGeom prst="rect">
@@ -6996,7 +7023,7 @@
           <a:lstStyle/>
           <a:p>
             <a:r>
-              <a:rPr lang="en-US" dirty="0" smtClean="0"/>
+              <a:rPr lang="en-US" dirty="0"/>
               <a:t>1</a:t>
             </a:r>
             <a:endParaRPr lang="en-US" dirty="0"/>
@@ -7011,7 +7038,7 @@
         </p:nvSpPr>
         <p:spPr>
           <a:xfrm>
-            <a:off x="8388683" y="3155535"/>
+            <a:off x="5841005" y="2793333"/>
             <a:ext cx="306494" cy="369332"/>
           </a:xfrm>
           <a:prstGeom prst="rect">
@@ -7026,7 +7053,7 @@
           <a:lstStyle/>
           <a:p>
             <a:r>
-              <a:rPr lang="en-US" dirty="0" smtClean="0"/>
+              <a:rPr lang="en-US" dirty="0"/>
               <a:t>n</a:t>
             </a:r>
             <a:endParaRPr lang="en-US" dirty="0"/>
@@ -7037,18 +7064,123 @@
         <p:nvCxnSpPr>
           <p:cNvPr id="108" name="Elbow Connector 107"/>
           <p:cNvCxnSpPr>
-            <a:stCxn id="153" idx="2"/>
+            <a:stCxn id="153" idx="3"/>
             <a:endCxn id="144" idx="1"/>
           </p:cNvCxnSpPr>
           <p:nvPr/>
         </p:nvCxnSpPr>
         <p:spPr>
-          <a:xfrm rot="16200000" flipH="1">
-            <a:off x="4154315" y="1855934"/>
-            <a:ext cx="672785" cy="7499296"/>
-          </a:xfrm>
-          <a:prstGeom prst="bentConnector2">
-            <a:avLst/>
+          <a:xfrm>
+            <a:off x="2339277" y="4551559"/>
+            <a:ext cx="3222228" cy="337455"/>
+          </a:xfrm>
+          <a:prstGeom prst="bentConnector3">
+            <a:avLst>
+              <a:gd name="adj1" fmla="val 50000"/>
+            </a:avLst>
+          </a:prstGeom>
+          <a:ln>
+            <a:solidFill>
+              <a:schemeClr val="tx1"/>
+            </a:solidFill>
+          </a:ln>
+        </p:spPr>
+        <p:style>
+          <a:lnRef idx="1">
+            <a:schemeClr val="accent1"/>
+          </a:lnRef>
+          <a:fillRef idx="0">
+            <a:schemeClr val="accent1"/>
+          </a:fillRef>
+          <a:effectRef idx="0">
+            <a:schemeClr val="accent1"/>
+          </a:effectRef>
+          <a:fontRef idx="minor">
+            <a:schemeClr val="tx1"/>
+          </a:fontRef>
+        </p:style>
+      </p:cxnSp>
+      <p:sp>
+        <p:nvSpPr>
+          <p:cNvPr id="114" name="Oval 113"/>
+          <p:cNvSpPr/>
+          <p:nvPr/>
+        </p:nvSpPr>
+        <p:spPr>
+          <a:xfrm>
+            <a:off x="1251666" y="5079967"/>
+            <a:ext cx="918240" cy="349624"/>
+          </a:xfrm>
+          <a:prstGeom prst="ellipse">
+            <a:avLst/>
+          </a:prstGeom>
+          <a:solidFill>
+            <a:schemeClr val="accent1">
+              <a:lumMod val="40000"/>
+              <a:lumOff val="60000"/>
+            </a:schemeClr>
+          </a:solidFill>
+          <a:ln>
+            <a:solidFill>
+              <a:schemeClr val="tx1"/>
+            </a:solidFill>
+          </a:ln>
+        </p:spPr>
+        <p:style>
+          <a:lnRef idx="2">
+            <a:schemeClr val="accent1">
+              <a:shade val="50000"/>
+            </a:schemeClr>
+          </a:lnRef>
+          <a:fillRef idx="1">
+            <a:schemeClr val="accent1"/>
+          </a:fillRef>
+          <a:effectRef idx="0">
+            <a:schemeClr val="accent1"/>
+          </a:effectRef>
+          <a:fontRef idx="minor">
+            <a:schemeClr val="lt1"/>
+          </a:fontRef>
+        </p:style>
+        <p:txBody>
+          <a:bodyPr rtlCol="0" anchor="ctr"/>
+          <a:lstStyle/>
+          <a:p>
+            <a:pPr algn="ctr"/>
+            <a:r>
+              <a:rPr lang="en-US" sz="1400" dirty="0">
+                <a:solidFill>
+                  <a:schemeClr val="tx1"/>
+                </a:solidFill>
+              </a:rPr>
+              <a:t>date</a:t>
+            </a:r>
+            <a:endParaRPr lang="en-US" sz="1400" dirty="0">
+              <a:solidFill>
+                <a:schemeClr val="tx1"/>
+              </a:solidFill>
+            </a:endParaRPr>
+          </a:p>
+        </p:txBody>
+      </p:sp>
+      <p:cxnSp>
+        <p:nvCxnSpPr>
+          <p:cNvPr id="187" name="Elbow Connector 186"/>
+          <p:cNvCxnSpPr>
+            <a:stCxn id="5" idx="1"/>
+            <a:endCxn id="153" idx="1"/>
+          </p:cNvCxnSpPr>
+          <p:nvPr/>
+        </p:nvCxnSpPr>
+        <p:spPr>
+          <a:xfrm rot="10800000" flipH="1" flipV="1">
+            <a:off x="256701" y="1788263"/>
+            <a:ext cx="832002" cy="2763296"/>
+          </a:xfrm>
+          <a:prstGeom prst="bentConnector3">
+            <a:avLst>
+              <a:gd name="adj1" fmla="val -15377"/>
+            </a:avLst>
           </a:prstGeom>
           <a:ln>
             <a:solidFill>
@@ -7081,6 +7213,13 @@
   <p:clrMapOvr>
     <a:masterClrMapping/>
   </p:clrMapOvr>
+  <p:timing>
+    <p:tnLst>
+      <p:par>
+        <p:cTn id="1" dur="indefinite" restart="never" nodeType="tmRoot"/>
+      </p:par>
+    </p:tnLst>
+  </p:timing>
 </p:sld>
 </file>
 
@@ -7109,7 +7248,7 @@
         </p:nvSpPr>
         <p:spPr>
           <a:xfrm>
-            <a:off x="3226279" y="526211"/>
+            <a:off x="1702279" y="526211"/>
             <a:ext cx="2743200" cy="992038"/>
           </a:xfrm>
           <a:prstGeom prst="rect">
@@ -7138,7 +7277,7 @@
           <a:p>
             <a:pPr algn="ctr"/>
             <a:r>
-              <a:rPr lang="en-US" dirty="0" smtClean="0"/>
+              <a:rPr lang="en-US" dirty="0"/>
               <a:t>USA</a:t>
             </a:r>
             <a:endParaRPr lang="en-US" dirty="0"/>
@@ -7153,7 +7292,7 @@
         </p:nvSpPr>
         <p:spPr>
           <a:xfrm>
-            <a:off x="2389516" y="2424022"/>
+            <a:off x="865517" y="2424022"/>
             <a:ext cx="1190445" cy="914400"/>
           </a:xfrm>
           <a:prstGeom prst="rect">
@@ -7182,7 +7321,7 @@
           <a:p>
             <a:pPr algn="ctr"/>
             <a:r>
-              <a:rPr lang="en-US" dirty="0" smtClean="0"/>
+              <a:rPr lang="en-US" dirty="0"/>
               <a:t>Maryland</a:t>
             </a:r>
             <a:endParaRPr lang="en-US" dirty="0"/>
@@ -7197,7 +7336,7 @@
         </p:nvSpPr>
         <p:spPr>
           <a:xfrm>
-            <a:off x="4002656" y="2424022"/>
+            <a:off x="2478657" y="2424022"/>
             <a:ext cx="1190445" cy="914400"/>
           </a:xfrm>
           <a:prstGeom prst="rect">
@@ -7226,7 +7365,7 @@
           <a:p>
             <a:pPr algn="ctr"/>
             <a:r>
-              <a:rPr lang="en-US" dirty="0" smtClean="0"/>
+              <a:rPr lang="en-US" dirty="0"/>
               <a:t>Indiana</a:t>
             </a:r>
             <a:endParaRPr lang="en-US" dirty="0"/>
@@ -7241,7 +7380,7 @@
         </p:nvSpPr>
         <p:spPr>
           <a:xfrm>
-            <a:off x="5615796" y="2424022"/>
+            <a:off x="4091797" y="2424022"/>
             <a:ext cx="1190445" cy="914400"/>
           </a:xfrm>
           <a:prstGeom prst="rect">
@@ -7270,7 +7409,7 @@
           <a:p>
             <a:pPr algn="ctr"/>
             <a:r>
-              <a:rPr lang="en-US" dirty="0" smtClean="0"/>
+              <a:rPr lang="en-US" dirty="0"/>
               <a:t>Federal</a:t>
             </a:r>
             <a:endParaRPr lang="en-US" dirty="0"/>
@@ -7285,7 +7424,7 @@
         </p:nvSpPr>
         <p:spPr>
           <a:xfrm>
-            <a:off x="6142008" y="4123427"/>
+            <a:off x="4618008" y="4123427"/>
             <a:ext cx="914400" cy="914400"/>
           </a:xfrm>
           <a:prstGeom prst="rect">
@@ -7314,7 +7453,7 @@
           <a:p>
             <a:pPr algn="ctr"/>
             <a:r>
-              <a:rPr lang="en-US" dirty="0" smtClean="0"/>
+              <a:rPr lang="en-US" dirty="0"/>
               <a:t>Obama</a:t>
             </a:r>
             <a:endParaRPr lang="en-US" dirty="0"/>
@@ -7332,7 +7471,7 @@
         </p:nvCxnSpPr>
         <p:spPr>
           <a:xfrm rot="16200000" flipV="1">
-            <a:off x="6012612" y="3536830"/>
+            <a:off x="4488613" y="3536831"/>
             <a:ext cx="785005" cy="388189"/>
           </a:xfrm>
           <a:prstGeom prst="bentConnector3">
@@ -7368,7 +7507,7 @@
         </p:nvCxnSpPr>
         <p:spPr>
           <a:xfrm rot="16200000" flipV="1">
-            <a:off x="4951563" y="1164566"/>
+            <a:off x="3427564" y="1164566"/>
             <a:ext cx="905773" cy="1613140"/>
           </a:xfrm>
           <a:prstGeom prst="bentConnector3">
@@ -7406,7 +7545,7 @@
         </p:nvCxnSpPr>
         <p:spPr>
           <a:xfrm rot="5400000" flipH="1" flipV="1">
-            <a:off x="4144993" y="1971136"/>
+            <a:off x="2620994" y="1971136"/>
             <a:ext cx="905773" cy="12700"/>
           </a:xfrm>
           <a:prstGeom prst="bentConnector3">
@@ -7442,7 +7581,7 @@
         </p:nvCxnSpPr>
         <p:spPr>
           <a:xfrm rot="5400000" flipH="1" flipV="1">
-            <a:off x="3338423" y="1164566"/>
+            <a:off x="1814424" y="1164566"/>
             <a:ext cx="905773" cy="1613140"/>
           </a:xfrm>
           <a:prstGeom prst="bentConnector3">
@@ -7477,13 +7616,20 @@
   <p:clrMapOvr>
     <a:masterClrMapping/>
   </p:clrMapOvr>
+  <p:timing>
+    <p:tnLst>
+      <p:par>
+        <p:cTn id="1" dur="indefinite" restart="never" nodeType="tmRoot"/>
+      </p:par>
+    </p:tnLst>
+  </p:timing>
 </p:sld>
 </file>
 
 <file path=ppt/theme/theme1.xml><?xml version="1.0" encoding="utf-8"?>
 <a:theme xmlns:a="http://schemas.openxmlformats.org/drawingml/2006/main" name="Office Theme">
   <a:themeElements>
-    <a:clrScheme name="Office">
+    <a:clrScheme name="Office Theme">
       <a:dk1>
         <a:sysClr val="windowText" lastClr="000000"/>
       </a:dk1>
@@ -7521,7 +7667,7 @@
         <a:srgbClr val="954F72"/>
       </a:folHlink>
     </a:clrScheme>
-    <a:fontScheme name="Office">
+    <a:fontScheme name="Office Theme">
       <a:majorFont>
         <a:latin typeface="Calibri Light" panose="020F0302020204030204"/>
         <a:ea typeface=""/>
@@ -7593,7 +7739,7 @@
         <a:font script="Geor" typeface="Sylfaen"/>
       </a:minorFont>
     </a:fontScheme>
-    <a:fmtScheme name="Office">
+    <a:fmtScheme name="Office Theme">
       <a:fillStyleLst>
         <a:solidFill>
           <a:schemeClr val="phClr"/>

</xml_diff>